<commit_message>
i #10 Updated Cheat Sheet Parallelization
- Parallelization section was updated to reflect revisions.
</commit_message>
<xml_diff>
--- a/cheatsheets/project-analysis-cheatsheet.pptx
+++ b/cheatsheets/project-analysis-cheatsheet.pptx
@@ -312,7 +312,18 @@
   </p:defaultTextStyle>
   <p:extLst>
     <p:ext uri="{EFAFB233-063F-42B5-8137-9DF3F51BA10A}">
-      <p15:sldGuideLst xmlns:p15="http://schemas.microsoft.com/office/powerpoint/2012/main"/>
+      <p15:sldGuideLst xmlns:p15="http://schemas.microsoft.com/office/powerpoint/2012/main">
+        <p15:guide id="1" orient="horz" pos="3400" userDrawn="1">
+          <p15:clr>
+            <a:srgbClr val="A4A3A4"/>
+          </p15:clr>
+        </p15:guide>
+        <p15:guide id="2" pos="4400" userDrawn="1">
+          <p15:clr>
+            <a:srgbClr val="A4A3A4"/>
+          </p15:clr>
+        </p15:guide>
+      </p15:sldGuideLst>
     </p:ext>
   </p:extLst>
 </p:presentation>
@@ -2190,7 +2201,7 @@
           </a:ln>
           <a:extLst>
             <a:ext uri="{C572A759-6A51-4108-AA02-DFA0A04FC94B}">
-              <ma14:wrappingTextBoxFlag xmlns="" xmlns:m="http://schemas.openxmlformats.org/officeDocument/2006/math" xmlns:a14="http://schemas.microsoft.com/office/drawing/2010/main" xmlns:ma14="http://schemas.microsoft.com/office/mac/drawingml/2011/main" val="1"/>
+              <ma14:wrappingTextBoxFlag xmlns:ma14="http://schemas.microsoft.com/office/mac/drawingml/2011/main" xmlns:a14="http://schemas.microsoft.com/office/drawing/2010/main" xmlns:m="http://schemas.openxmlformats.org/officeDocument/2006/math" xmlns="" val="1"/>
             </a:ext>
           </a:extLst>
         </p:spPr>
@@ -2229,7 +2240,7 @@
           </a:ln>
           <a:extLst>
             <a:ext uri="{C572A759-6A51-4108-AA02-DFA0A04FC94B}">
-              <ma14:wrappingTextBoxFlag xmlns="" xmlns:m="http://schemas.openxmlformats.org/officeDocument/2006/math" xmlns:a14="http://schemas.microsoft.com/office/drawing/2010/main" xmlns:ma14="http://schemas.microsoft.com/office/mac/drawingml/2011/main" val="1"/>
+              <ma14:wrappingTextBoxFlag xmlns:ma14="http://schemas.microsoft.com/office/mac/drawingml/2011/main" xmlns:a14="http://schemas.microsoft.com/office/drawing/2010/main" xmlns:m="http://schemas.openxmlformats.org/officeDocument/2006/math" xmlns="" val="1"/>
             </a:ext>
           </a:extLst>
         </p:spPr>
@@ -3375,7 +3386,7 @@
           </a:ln>
           <a:extLst>
             <a:ext uri="{C572A759-6A51-4108-AA02-DFA0A04FC94B}">
-              <ma14:wrappingTextBoxFlag xmlns="" xmlns:m="http://schemas.openxmlformats.org/officeDocument/2006/math" xmlns:a14="http://schemas.microsoft.com/office/drawing/2010/main" xmlns:ma14="http://schemas.microsoft.com/office/mac/drawingml/2011/main" val="1"/>
+              <ma14:wrappingTextBoxFlag xmlns:ma14="http://schemas.microsoft.com/office/mac/drawingml/2011/main" xmlns:a14="http://schemas.microsoft.com/office/drawing/2010/main" xmlns:m="http://schemas.openxmlformats.org/officeDocument/2006/math" xmlns="" val="1"/>
             </a:ext>
           </a:extLst>
         </p:spPr>
@@ -3427,7 +3438,7 @@
           </a:ln>
           <a:extLst>
             <a:ext uri="{C572A759-6A51-4108-AA02-DFA0A04FC94B}">
-              <ma14:wrappingTextBoxFlag xmlns="" xmlns:m="http://schemas.openxmlformats.org/officeDocument/2006/math" xmlns:a14="http://schemas.microsoft.com/office/drawing/2010/main" xmlns:ma14="http://schemas.microsoft.com/office/mac/drawingml/2011/main" val="1"/>
+              <ma14:wrappingTextBoxFlag xmlns:ma14="http://schemas.microsoft.com/office/mac/drawingml/2011/main" xmlns:a14="http://schemas.microsoft.com/office/drawing/2010/main" xmlns:m="http://schemas.openxmlformats.org/officeDocument/2006/math" xmlns="" val="1"/>
             </a:ext>
           </a:extLst>
         </p:spPr>
@@ -3525,7 +3536,7 @@
           </a:ln>
           <a:extLst>
             <a:ext uri="{C572A759-6A51-4108-AA02-DFA0A04FC94B}">
-              <ma14:wrappingTextBoxFlag xmlns="" xmlns:m="http://schemas.openxmlformats.org/officeDocument/2006/math" xmlns:a14="http://schemas.microsoft.com/office/drawing/2010/main" xmlns:ma14="http://schemas.microsoft.com/office/mac/drawingml/2011/main" val="1"/>
+              <ma14:wrappingTextBoxFlag xmlns:ma14="http://schemas.microsoft.com/office/mac/drawingml/2011/main" xmlns:a14="http://schemas.microsoft.com/office/drawing/2010/main" xmlns:m="http://schemas.openxmlformats.org/officeDocument/2006/math" xmlns="" val="1"/>
             </a:ext>
           </a:extLst>
         </p:spPr>
@@ -3662,7 +3673,7 @@
           </a:ln>
           <a:extLst>
             <a:ext uri="{C572A759-6A51-4108-AA02-DFA0A04FC94B}">
-              <ma14:wrappingTextBoxFlag xmlns="" xmlns:m="http://schemas.openxmlformats.org/officeDocument/2006/math" xmlns:a14="http://schemas.microsoft.com/office/drawing/2010/main" xmlns:ma14="http://schemas.microsoft.com/office/mac/drawingml/2011/main" val="1"/>
+              <ma14:wrappingTextBoxFlag xmlns:ma14="http://schemas.microsoft.com/office/mac/drawingml/2011/main" xmlns:a14="http://schemas.microsoft.com/office/drawing/2010/main" xmlns:m="http://schemas.openxmlformats.org/officeDocument/2006/math" xmlns="" val="1"/>
             </a:ext>
           </a:extLst>
         </p:spPr>
@@ -3711,7 +3722,7 @@
           </a:ln>
           <a:extLst>
             <a:ext uri="{C572A759-6A51-4108-AA02-DFA0A04FC94B}">
-              <ma14:wrappingTextBoxFlag xmlns="" xmlns:m="http://schemas.openxmlformats.org/officeDocument/2006/math" xmlns:a14="http://schemas.microsoft.com/office/drawing/2010/main" xmlns:ma14="http://schemas.microsoft.com/office/mac/drawingml/2011/main" val="1"/>
+              <ma14:wrappingTextBoxFlag xmlns:ma14="http://schemas.microsoft.com/office/mac/drawingml/2011/main" xmlns:a14="http://schemas.microsoft.com/office/drawing/2010/main" xmlns:m="http://schemas.openxmlformats.org/officeDocument/2006/math" xmlns="" val="1"/>
             </a:ext>
           </a:extLst>
         </p:spPr>
@@ -4030,7 +4041,7 @@
           </a:ln>
           <a:extLst>
             <a:ext uri="{C572A759-6A51-4108-AA02-DFA0A04FC94B}">
-              <ma14:wrappingTextBoxFlag xmlns="" xmlns:m="http://schemas.openxmlformats.org/officeDocument/2006/math" xmlns:a14="http://schemas.microsoft.com/office/drawing/2010/main" xmlns:ma14="http://schemas.microsoft.com/office/mac/drawingml/2011/main" val="1"/>
+              <ma14:wrappingTextBoxFlag xmlns:ma14="http://schemas.microsoft.com/office/mac/drawingml/2011/main" xmlns:a14="http://schemas.microsoft.com/office/drawing/2010/main" xmlns:m="http://schemas.openxmlformats.org/officeDocument/2006/math" xmlns="" val="1"/>
             </a:ext>
           </a:extLst>
         </p:spPr>
@@ -4210,7 +4221,7 @@
         <p:spPr>
           <a:xfrm flipV="1">
             <a:off x="4930264" y="6723644"/>
-            <a:ext cx="4178808" cy="0"/>
+            <a:ext cx="3944763" cy="0"/>
           </a:xfrm>
           <a:prstGeom prst="line">
             <a:avLst/>
@@ -4268,7 +4279,7 @@
           </a:ln>
           <a:extLst>
             <a:ext uri="{C572A759-6A51-4108-AA02-DFA0A04FC94B}">
-              <ma14:wrappingTextBoxFlag xmlns="" xmlns:m="http://schemas.openxmlformats.org/officeDocument/2006/math" xmlns:a14="http://schemas.microsoft.com/office/drawing/2010/main" xmlns:ma14="http://schemas.microsoft.com/office/mac/drawingml/2011/main" val="1"/>
+              <ma14:wrappingTextBoxFlag xmlns:ma14="http://schemas.microsoft.com/office/mac/drawingml/2011/main" xmlns:a14="http://schemas.microsoft.com/office/drawing/2010/main" xmlns:m="http://schemas.openxmlformats.org/officeDocument/2006/math" xmlns="" val="1"/>
             </a:ext>
           </a:extLst>
         </p:spPr>
@@ -6287,7 +6298,7 @@
           </a:ln>
           <a:extLst>
             <a:ext uri="{C572A759-6A51-4108-AA02-DFA0A04FC94B}">
-              <ma14:wrappingTextBoxFlag xmlns="" xmlns:m="http://schemas.openxmlformats.org/officeDocument/2006/math" xmlns:a14="http://schemas.microsoft.com/office/drawing/2010/main" xmlns:ma14="http://schemas.microsoft.com/office/mac/drawingml/2011/main" val="1"/>
+              <ma14:wrappingTextBoxFlag xmlns:ma14="http://schemas.microsoft.com/office/mac/drawingml/2011/main" xmlns:a14="http://schemas.microsoft.com/office/drawing/2010/main" xmlns:m="http://schemas.openxmlformats.org/officeDocument/2006/math" xmlns="" val="1"/>
             </a:ext>
           </a:extLst>
         </p:spPr>
@@ -6714,7 +6725,7 @@
           </a:ln>
           <a:extLst>
             <a:ext uri="{C572A759-6A51-4108-AA02-DFA0A04FC94B}">
-              <ma14:wrappingTextBoxFlag xmlns="" xmlns:m="http://schemas.openxmlformats.org/officeDocument/2006/math" xmlns:a14="http://schemas.microsoft.com/office/drawing/2010/main" xmlns:ma14="http://schemas.microsoft.com/office/mac/drawingml/2011/main" val="1"/>
+              <ma14:wrappingTextBoxFlag xmlns:ma14="http://schemas.microsoft.com/office/mac/drawingml/2011/main" xmlns:a14="http://schemas.microsoft.com/office/drawing/2010/main" xmlns:m="http://schemas.openxmlformats.org/officeDocument/2006/math" xmlns="" val="1"/>
             </a:ext>
           </a:extLst>
         </p:spPr>
@@ -6905,7 +6916,7 @@
           </a:ln>
           <a:extLst>
             <a:ext uri="{C572A759-6A51-4108-AA02-DFA0A04FC94B}">
-              <ma14:wrappingTextBoxFlag xmlns="" xmlns:m="http://schemas.openxmlformats.org/officeDocument/2006/math" xmlns:a14="http://schemas.microsoft.com/office/drawing/2010/main" xmlns:ma14="http://schemas.microsoft.com/office/mac/drawingml/2011/main" val="1"/>
+              <ma14:wrappingTextBoxFlag xmlns:ma14="http://schemas.microsoft.com/office/mac/drawingml/2011/main" xmlns:a14="http://schemas.microsoft.com/office/drawing/2010/main" xmlns:m="http://schemas.openxmlformats.org/officeDocument/2006/math" xmlns="" val="1"/>
             </a:ext>
           </a:extLst>
         </p:spPr>
@@ -7078,7 +7089,7 @@
           </a:ln>
           <a:extLst>
             <a:ext uri="{C572A759-6A51-4108-AA02-DFA0A04FC94B}">
-              <ma14:wrappingTextBoxFlag xmlns="" xmlns:m="http://schemas.openxmlformats.org/officeDocument/2006/math" xmlns:a14="http://schemas.microsoft.com/office/drawing/2010/main" xmlns:ma14="http://schemas.microsoft.com/office/mac/drawingml/2011/main" val="1"/>
+              <ma14:wrappingTextBoxFlag xmlns:ma14="http://schemas.microsoft.com/office/mac/drawingml/2011/main" xmlns:a14="http://schemas.microsoft.com/office/drawing/2010/main" xmlns:m="http://schemas.openxmlformats.org/officeDocument/2006/math" xmlns="" val="1"/>
             </a:ext>
           </a:extLst>
         </p:spPr>
@@ -7260,7 +7271,7 @@
           </a:ln>
           <a:extLst>
             <a:ext uri="{C572A759-6A51-4108-AA02-DFA0A04FC94B}">
-              <ma14:wrappingTextBoxFlag xmlns="" xmlns:ma14="http://schemas.microsoft.com/office/mac/drawingml/2011/main" xmlns:a14="http://schemas.microsoft.com/office/drawing/2010/main" xmlns:m="http://schemas.openxmlformats.org/officeDocument/2006/math" val="1"/>
+              <ma14:wrappingTextBoxFlag xmlns:m="http://schemas.openxmlformats.org/officeDocument/2006/math" xmlns:a14="http://schemas.microsoft.com/office/drawing/2010/main" xmlns:ma14="http://schemas.microsoft.com/office/mac/drawingml/2011/main" xmlns="" val="1"/>
             </a:ext>
           </a:extLst>
         </p:spPr>
@@ -13741,7 +13752,7 @@
           </a:ln>
           <a:extLst>
             <a:ext uri="{C572A759-6A51-4108-AA02-DFA0A04FC94B}">
-              <ma14:wrappingTextBoxFlag xmlns:ma14="http://schemas.microsoft.com/office/mac/drawingml/2011/main" xmlns:a14="http://schemas.microsoft.com/office/drawing/2010/main" xmlns:m="http://schemas.openxmlformats.org/officeDocument/2006/math" xmlns="" val="1"/>
+              <ma14:wrappingTextBoxFlag xmlns="" xmlns:m="http://schemas.openxmlformats.org/officeDocument/2006/math" xmlns:a14="http://schemas.microsoft.com/office/drawing/2010/main" xmlns:ma14="http://schemas.microsoft.com/office/mac/drawingml/2011/main" val="1"/>
             </a:ext>
           </a:extLst>
         </p:spPr>
@@ -13866,7 +13877,22 @@
                 <a:ea typeface="Source Sans Pro" panose="020B0503030403020204" pitchFamily="34" charset="0"/>
                 <a:sym typeface="Source Sans Pro"/>
               </a:rPr>
-              <a:t>, Kaiāulu functions can be called in parallel, enabling server-side analysis of large projects.</a:t>
+              <a:t>, Kaiāulu functions can be called in parallel, enabling </a:t>
+            </a:r>
+            <a:r>
+              <a:rPr lang="en-US" dirty="0">
+                <a:latin typeface="Source Sans Pro" panose="020B0503030403020204" pitchFamily="34" charset="0"/>
+                <a:ea typeface="Source Sans Pro" panose="020B0503030403020204" pitchFamily="34" charset="0"/>
+              </a:rPr>
+              <a:t>concurrent</a:t>
+            </a:r>
+            <a:r>
+              <a:rPr lang="en-US" dirty="0">
+                <a:latin typeface="Source Sans Pro" panose="020B0503030403020204" pitchFamily="34" charset="0"/>
+                <a:ea typeface="Source Sans Pro" panose="020B0503030403020204" pitchFamily="34" charset="0"/>
+                <a:sym typeface="Source Sans Pro"/>
+              </a:rPr>
+              <a:t> analysis of large projects.</a:t>
             </a:r>
           </a:p>
         </p:txBody>
@@ -13902,7 +13928,7 @@
         </p:blipFill>
         <p:spPr>
           <a:xfrm>
-            <a:off x="10045641" y="6976731"/>
+            <a:off x="9932229" y="6976731"/>
             <a:ext cx="527267" cy="527267"/>
           </a:xfrm>
           <a:prstGeom prst="rect">
@@ -13924,7 +13950,7 @@
         </p:nvSpPr>
         <p:spPr>
           <a:xfrm>
-            <a:off x="9930730" y="7412153"/>
+            <a:off x="9861279" y="7411211"/>
             <a:ext cx="781573" cy="258964"/>
           </a:xfrm>
           <a:prstGeom prst="rect">
@@ -13994,10 +14020,10 @@
       </p:sp>
       <p:pic>
         <p:nvPicPr>
-          <p:cNvPr id="458" name="Graphic 457" descr="Folder outline">
+          <p:cNvPr id="460" name="Graphic 459" descr="Paper outline">
             <a:extLst>
               <a:ext uri="{FF2B5EF4-FFF2-40B4-BE49-F238E27FC236}">
-                <a16:creationId xmlns:a16="http://schemas.microsoft.com/office/drawing/2014/main" id="{AB2E20B4-B980-CD14-663B-5BBED3C89CC2}"/>
+                <a16:creationId xmlns:a16="http://schemas.microsoft.com/office/drawing/2014/main" id="{AB4948A8-E2F0-B484-1C7D-C6BF08B81893}"/>
               </a:ext>
             </a:extLst>
           </p:cNvPr>
@@ -14007,13 +14033,13 @@
           <p:nvPr/>
         </p:nvPicPr>
         <p:blipFill>
-          <a:blip r:embed="rId10">
+          <a:blip r:embed="rId12">
             <a:extLst>
               <a:ext uri="{28A0092B-C50C-407E-A947-70E740481C1C}">
                 <a14:useLocalDpi xmlns:a14="http://schemas.microsoft.com/office/drawing/2010/main" val="0"/>
               </a:ext>
               <a:ext uri="{96DAC541-7B7A-43D3-8B79-37D633B846F1}">
-                <asvg:svgBlip xmlns:asvg="http://schemas.microsoft.com/office/drawing/2016/SVG/main" r:embed="rId11"/>
+                <asvg:svgBlip xmlns:asvg="http://schemas.microsoft.com/office/drawing/2016/SVG/main" r:embed="rId13"/>
               </a:ext>
             </a:extLst>
           </a:blip>
@@ -14023,8 +14049,8 @@
         </p:blipFill>
         <p:spPr>
           <a:xfrm>
-            <a:off x="9281819" y="6883294"/>
-            <a:ext cx="674740" cy="674740"/>
+            <a:off x="11374936" y="6464108"/>
+            <a:ext cx="527267" cy="527267"/>
           </a:xfrm>
           <a:prstGeom prst="rect">
             <a:avLst/>
@@ -14033,10 +14059,10 @@
       </p:pic>
       <p:sp>
         <p:nvSpPr>
-          <p:cNvPr id="459" name="TextBox 458">
+          <p:cNvPr id="465" name="TextBox 464">
             <a:extLst>
               <a:ext uri="{FF2B5EF4-FFF2-40B4-BE49-F238E27FC236}">
-                <a16:creationId xmlns:a16="http://schemas.microsoft.com/office/drawing/2014/main" id="{AB9A242A-C3AF-FE0D-DA0B-D92AF16A0199}"/>
+                <a16:creationId xmlns:a16="http://schemas.microsoft.com/office/drawing/2014/main" id="{17572B7F-C0FA-5C8A-8BB5-6A1FA8A4AF07}"/>
               </a:ext>
             </a:extLst>
           </p:cNvPr>
@@ -14045,8 +14071,8 @@
         </p:nvSpPr>
         <p:spPr>
           <a:xfrm>
-            <a:off x="9424588" y="7106453"/>
-            <a:ext cx="453492" cy="258964"/>
+            <a:off x="11478843" y="6601251"/>
+            <a:ext cx="319451" cy="258964"/>
           </a:xfrm>
           <a:prstGeom prst="rect">
             <a:avLst/>
@@ -14094,19 +14120,19 @@
               <a:tabLst/>
             </a:pPr>
             <a:r>
-              <a:rPr lang="en-US" sz="800" b="0" dirty="0" err="1"/>
-              <a:t>mbox</a:t>
-            </a:r>
-            <a:r>
-              <a:rPr lang="en-US" sz="800" b="0" dirty="0"/>
-              <a:t> </a:t>
+              <a:rPr lang="en-US" sz="800" b="0" dirty="0">
+                <a:solidFill>
+                  <a:schemeClr val="accent1"/>
+                </a:solidFill>
+              </a:rPr>
+              <a:t>exec</a:t>
             </a:r>
             <a:endParaRPr kumimoji="0" lang="en-US" sz="800" b="0" i="0" u="none" strike="noStrike" cap="none" spc="0" normalizeH="0" baseline="0" dirty="0">
               <a:ln>
                 <a:noFill/>
               </a:ln>
               <a:solidFill>
-                <a:srgbClr val="4C4C4C"/>
+                <a:schemeClr val="accent1"/>
               </a:solidFill>
               <a:effectLst/>
               <a:uFillTx/>
@@ -14120,10 +14146,10 @@
       </p:sp>
       <p:pic>
         <p:nvPicPr>
-          <p:cNvPr id="460" name="Graphic 459" descr="Paper outline">
+          <p:cNvPr id="466" name="Graphic 465" descr="Paper outline">
             <a:extLst>
               <a:ext uri="{FF2B5EF4-FFF2-40B4-BE49-F238E27FC236}">
-                <a16:creationId xmlns:a16="http://schemas.microsoft.com/office/drawing/2014/main" id="{AB4948A8-E2F0-B484-1C7D-C6BF08B81893}"/>
+                <a16:creationId xmlns:a16="http://schemas.microsoft.com/office/drawing/2014/main" id="{A9BCD6BA-46C8-A3B9-2895-6182E50D8910}"/>
               </a:ext>
             </a:extLst>
           </p:cNvPr>
@@ -14149,46 +14175,7 @@
         </p:blipFill>
         <p:spPr>
           <a:xfrm>
-            <a:off x="10987744" y="6464108"/>
-            <a:ext cx="527267" cy="527267"/>
-          </a:xfrm>
-          <a:prstGeom prst="rect">
-            <a:avLst/>
-          </a:prstGeom>
-        </p:spPr>
-      </p:pic>
-      <p:pic>
-        <p:nvPicPr>
-          <p:cNvPr id="461" name="Graphic 460" descr="Paper outline">
-            <a:extLst>
-              <a:ext uri="{FF2B5EF4-FFF2-40B4-BE49-F238E27FC236}">
-                <a16:creationId xmlns:a16="http://schemas.microsoft.com/office/drawing/2014/main" id="{DE0FD8A3-6FC9-7AE2-045E-1580EE1AB044}"/>
-              </a:ext>
-            </a:extLst>
-          </p:cNvPr>
-          <p:cNvPicPr>
-            <a:picLocks noChangeAspect="1"/>
-          </p:cNvPicPr>
-          <p:nvPr/>
-        </p:nvPicPr>
-        <p:blipFill>
-          <a:blip r:embed="rId12">
-            <a:extLst>
-              <a:ext uri="{28A0092B-C50C-407E-A947-70E740481C1C}">
-                <a14:useLocalDpi xmlns:a14="http://schemas.microsoft.com/office/drawing/2010/main" val="0"/>
-              </a:ext>
-              <a:ext uri="{96DAC541-7B7A-43D3-8B79-37D633B846F1}">
-                <asvg:svgBlip xmlns:asvg="http://schemas.microsoft.com/office/drawing/2016/SVG/main" r:embed="rId13"/>
-              </a:ext>
-            </a:extLst>
-          </a:blip>
-          <a:stretch>
-            <a:fillRect/>
-          </a:stretch>
-        </p:blipFill>
-        <p:spPr>
-          <a:xfrm>
-            <a:off x="10997904" y="7436561"/>
+            <a:off x="11954204" y="6460966"/>
             <a:ext cx="527267" cy="527267"/>
           </a:xfrm>
           <a:prstGeom prst="rect">
@@ -14198,10 +14185,10 @@
       </p:pic>
       <p:sp>
         <p:nvSpPr>
-          <p:cNvPr id="462" name="TextBox 461">
+          <p:cNvPr id="470" name="TextBox 469">
             <a:extLst>
               <a:ext uri="{FF2B5EF4-FFF2-40B4-BE49-F238E27FC236}">
-                <a16:creationId xmlns:a16="http://schemas.microsoft.com/office/drawing/2014/main" id="{C1356EE5-576E-97D8-E34D-4C6A5D6408AB}"/>
+                <a16:creationId xmlns:a16="http://schemas.microsoft.com/office/drawing/2014/main" id="{25A8E869-D336-213B-305E-218F828D79BE}"/>
               </a:ext>
             </a:extLst>
           </p:cNvPr>
@@ -14210,8 +14197,8 @@
         </p:nvSpPr>
         <p:spPr>
           <a:xfrm>
-            <a:off x="10928756" y="7875044"/>
-            <a:ext cx="781573" cy="258964"/>
+            <a:off x="12033440" y="6604903"/>
+            <a:ext cx="423360" cy="258964"/>
           </a:xfrm>
           <a:prstGeom prst="rect">
             <a:avLst/>
@@ -14260,715 +14247,6 @@
             </a:pPr>
             <a:r>
               <a:rPr lang="en-US" sz="800" b="0" dirty="0" err="1"/>
-              <a:t>m</a:t>
-            </a:r>
-            <a:r>
-              <a:rPr kumimoji="0" lang="en-US" sz="800" b="0" i="0" u="none" strike="noStrike" cap="none" spc="0" normalizeH="0" baseline="0" dirty="0" err="1">
-                <a:ln>
-                  <a:noFill/>
-                </a:ln>
-                <a:solidFill>
-                  <a:srgbClr val="4C4C4C"/>
-                </a:solidFill>
-                <a:effectLst/>
-                <a:uFillTx/>
-                <a:latin typeface="Source Sans Pro"/>
-                <a:ea typeface="Source Sans Pro"/>
-                <a:cs typeface="Source Sans Pro"/>
-                <a:sym typeface="Source Sans Pro"/>
-              </a:rPr>
-              <a:t>ailinglist.R</a:t>
-            </a:r>
-            <a:endParaRPr kumimoji="0" lang="en-US" sz="800" b="0" i="0" u="none" strike="noStrike" cap="none" spc="0" normalizeH="0" baseline="0" dirty="0">
-              <a:ln>
-                <a:noFill/>
-              </a:ln>
-              <a:solidFill>
-                <a:srgbClr val="4C4C4C"/>
-              </a:solidFill>
-              <a:effectLst/>
-              <a:uFillTx/>
-              <a:latin typeface="Source Sans Pro"/>
-              <a:ea typeface="Source Sans Pro"/>
-              <a:cs typeface="Source Sans Pro"/>
-              <a:sym typeface="Source Sans Pro"/>
-            </a:endParaRPr>
-          </a:p>
-        </p:txBody>
-      </p:sp>
-      <p:sp>
-        <p:nvSpPr>
-          <p:cNvPr id="463" name="TextBox 462">
-            <a:extLst>
-              <a:ext uri="{FF2B5EF4-FFF2-40B4-BE49-F238E27FC236}">
-                <a16:creationId xmlns:a16="http://schemas.microsoft.com/office/drawing/2014/main" id="{BC4708C3-5F8D-0D2F-82D9-C37BC151EB2C}"/>
-              </a:ext>
-            </a:extLst>
-          </p:cNvPr>
-          <p:cNvSpPr txBox="1"/>
-          <p:nvPr/>
-        </p:nvSpPr>
-        <p:spPr>
-          <a:xfrm>
-            <a:off x="10918596" y="6895981"/>
-            <a:ext cx="781573" cy="258964"/>
-          </a:xfrm>
-          <a:prstGeom prst="rect">
-            <a:avLst/>
-          </a:prstGeom>
-          <a:noFill/>
-          <a:ln w="12700" cap="flat">
-            <a:noFill/>
-            <a:miter lim="400000"/>
-          </a:ln>
-          <a:effectLst/>
-          <a:sp3d/>
-        </p:spPr>
-        <p:style>
-          <a:lnRef idx="0">
-            <a:scrgbClr r="0" g="0" b="0"/>
-          </a:lnRef>
-          <a:fillRef idx="0">
-            <a:scrgbClr r="0" g="0" b="0"/>
-          </a:fillRef>
-          <a:effectRef idx="0">
-            <a:scrgbClr r="0" g="0" b="0"/>
-          </a:effectRef>
-          <a:fontRef idx="none"/>
-        </p:style>
-        <p:txBody>
-          <a:bodyPr rot="0" spcFirstLastPara="1" vertOverflow="overflow" horzOverflow="overflow" vert="horz" wrap="square" lIns="54570" tIns="54570" rIns="54570" bIns="54570" numCol="1" spcCol="38100" rtlCol="0" anchor="ctr">
-            <a:spAutoFit/>
-          </a:bodyPr>
-          <a:lstStyle/>
-          <a:p>
-            <a:pPr marL="0" marR="0" indent="0" algn="l" defTabSz="584200" rtl="0" fontAlgn="auto" latinLnBrk="0" hangingPunct="0">
-              <a:lnSpc>
-                <a:spcPct val="100000"/>
-              </a:lnSpc>
-              <a:spcBef>
-                <a:spcPts val="200"/>
-              </a:spcBef>
-              <a:spcAft>
-                <a:spcPts val="0"/>
-              </a:spcAft>
-              <a:buClrTx/>
-              <a:buSzTx/>
-              <a:buFontTx/>
-              <a:buNone/>
-              <a:tabLst/>
-            </a:pPr>
-            <a:r>
-              <a:rPr lang="en-US" sz="800" b="0" dirty="0" err="1"/>
-              <a:t>m</a:t>
-            </a:r>
-            <a:r>
-              <a:rPr kumimoji="0" lang="en-US" sz="800" b="0" i="0" u="none" strike="noStrike" cap="none" spc="0" normalizeH="0" baseline="0" dirty="0" err="1">
-                <a:ln>
-                  <a:noFill/>
-                </a:ln>
-                <a:solidFill>
-                  <a:srgbClr val="4C4C4C"/>
-                </a:solidFill>
-                <a:effectLst/>
-                <a:uFillTx/>
-                <a:latin typeface="Source Sans Pro"/>
-                <a:ea typeface="Source Sans Pro"/>
-                <a:cs typeface="Source Sans Pro"/>
-                <a:sym typeface="Source Sans Pro"/>
-              </a:rPr>
-              <a:t>ailinglist.R</a:t>
-            </a:r>
-            <a:endParaRPr kumimoji="0" lang="en-US" sz="800" b="0" i="0" u="none" strike="noStrike" cap="none" spc="0" normalizeH="0" baseline="0" dirty="0">
-              <a:ln>
-                <a:noFill/>
-              </a:ln>
-              <a:solidFill>
-                <a:srgbClr val="4C4C4C"/>
-              </a:solidFill>
-              <a:effectLst/>
-              <a:uFillTx/>
-              <a:latin typeface="Source Sans Pro"/>
-              <a:ea typeface="Source Sans Pro"/>
-              <a:cs typeface="Source Sans Pro"/>
-              <a:sym typeface="Source Sans Pro"/>
-            </a:endParaRPr>
-          </a:p>
-        </p:txBody>
-      </p:sp>
-      <p:sp>
-        <p:nvSpPr>
-          <p:cNvPr id="464" name="TextBox 463">
-            <a:extLst>
-              <a:ext uri="{FF2B5EF4-FFF2-40B4-BE49-F238E27FC236}">
-                <a16:creationId xmlns:a16="http://schemas.microsoft.com/office/drawing/2014/main" id="{A70BFC1C-79FB-899F-D60C-3EFAE785F80B}"/>
-              </a:ext>
-            </a:extLst>
-          </p:cNvPr>
-          <p:cNvSpPr txBox="1"/>
-          <p:nvPr/>
-        </p:nvSpPr>
-        <p:spPr>
-          <a:xfrm>
-            <a:off x="11101357" y="7601140"/>
-            <a:ext cx="319451" cy="258964"/>
-          </a:xfrm>
-          <a:prstGeom prst="rect">
-            <a:avLst/>
-          </a:prstGeom>
-          <a:noFill/>
-          <a:ln w="12700" cap="flat">
-            <a:noFill/>
-            <a:miter lim="400000"/>
-          </a:ln>
-          <a:effectLst/>
-          <a:sp3d/>
-        </p:spPr>
-        <p:style>
-          <a:lnRef idx="0">
-            <a:scrgbClr r="0" g="0" b="0"/>
-          </a:lnRef>
-          <a:fillRef idx="0">
-            <a:scrgbClr r="0" g="0" b="0"/>
-          </a:fillRef>
-          <a:effectRef idx="0">
-            <a:scrgbClr r="0" g="0" b="0"/>
-          </a:effectRef>
-          <a:fontRef idx="none"/>
-        </p:style>
-        <p:txBody>
-          <a:bodyPr rot="0" spcFirstLastPara="1" vertOverflow="overflow" horzOverflow="overflow" vert="horz" wrap="square" lIns="54570" tIns="54570" rIns="54570" bIns="54570" numCol="1" spcCol="38100" rtlCol="0" anchor="ctr">
-            <a:spAutoFit/>
-          </a:bodyPr>
-          <a:lstStyle/>
-          <a:p>
-            <a:pPr marL="0" marR="0" indent="0" algn="l" defTabSz="584200" rtl="0" fontAlgn="auto" latinLnBrk="0" hangingPunct="0">
-              <a:lnSpc>
-                <a:spcPct val="100000"/>
-              </a:lnSpc>
-              <a:spcBef>
-                <a:spcPts val="200"/>
-              </a:spcBef>
-              <a:spcAft>
-                <a:spcPts val="0"/>
-              </a:spcAft>
-              <a:buClrTx/>
-              <a:buSzTx/>
-              <a:buFontTx/>
-              <a:buNone/>
-              <a:tabLst/>
-            </a:pPr>
-            <a:r>
-              <a:rPr lang="en-US" sz="800" b="0" dirty="0">
-                <a:solidFill>
-                  <a:schemeClr val="accent1"/>
-                </a:solidFill>
-              </a:rPr>
-              <a:t>exec</a:t>
-            </a:r>
-            <a:endParaRPr kumimoji="0" lang="en-US" sz="800" b="0" i="0" u="none" strike="noStrike" cap="none" spc="0" normalizeH="0" baseline="0" dirty="0">
-              <a:ln>
-                <a:noFill/>
-              </a:ln>
-              <a:solidFill>
-                <a:schemeClr val="accent1"/>
-              </a:solidFill>
-              <a:effectLst/>
-              <a:uFillTx/>
-              <a:latin typeface="Source Sans Pro"/>
-              <a:ea typeface="Source Sans Pro"/>
-              <a:cs typeface="Source Sans Pro"/>
-              <a:sym typeface="Source Sans Pro"/>
-            </a:endParaRPr>
-          </a:p>
-        </p:txBody>
-      </p:sp>
-      <p:sp>
-        <p:nvSpPr>
-          <p:cNvPr id="465" name="TextBox 464">
-            <a:extLst>
-              <a:ext uri="{FF2B5EF4-FFF2-40B4-BE49-F238E27FC236}">
-                <a16:creationId xmlns:a16="http://schemas.microsoft.com/office/drawing/2014/main" id="{17572B7F-C0FA-5C8A-8BB5-6A1FA8A4AF07}"/>
-              </a:ext>
-            </a:extLst>
-          </p:cNvPr>
-          <p:cNvSpPr txBox="1"/>
-          <p:nvPr/>
-        </p:nvSpPr>
-        <p:spPr>
-          <a:xfrm>
-            <a:off x="11091651" y="6601251"/>
-            <a:ext cx="319451" cy="258964"/>
-          </a:xfrm>
-          <a:prstGeom prst="rect">
-            <a:avLst/>
-          </a:prstGeom>
-          <a:noFill/>
-          <a:ln w="12700" cap="flat">
-            <a:noFill/>
-            <a:miter lim="400000"/>
-          </a:ln>
-          <a:effectLst/>
-          <a:sp3d/>
-        </p:spPr>
-        <p:style>
-          <a:lnRef idx="0">
-            <a:scrgbClr r="0" g="0" b="0"/>
-          </a:lnRef>
-          <a:fillRef idx="0">
-            <a:scrgbClr r="0" g="0" b="0"/>
-          </a:fillRef>
-          <a:effectRef idx="0">
-            <a:scrgbClr r="0" g="0" b="0"/>
-          </a:effectRef>
-          <a:fontRef idx="none"/>
-        </p:style>
-        <p:txBody>
-          <a:bodyPr rot="0" spcFirstLastPara="1" vertOverflow="overflow" horzOverflow="overflow" vert="horz" wrap="square" lIns="54570" tIns="54570" rIns="54570" bIns="54570" numCol="1" spcCol="38100" rtlCol="0" anchor="ctr">
-            <a:spAutoFit/>
-          </a:bodyPr>
-          <a:lstStyle/>
-          <a:p>
-            <a:pPr marL="0" marR="0" indent="0" algn="l" defTabSz="584200" rtl="0" fontAlgn="auto" latinLnBrk="0" hangingPunct="0">
-              <a:lnSpc>
-                <a:spcPct val="100000"/>
-              </a:lnSpc>
-              <a:spcBef>
-                <a:spcPts val="200"/>
-              </a:spcBef>
-              <a:spcAft>
-                <a:spcPts val="0"/>
-              </a:spcAft>
-              <a:buClrTx/>
-              <a:buSzTx/>
-              <a:buFontTx/>
-              <a:buNone/>
-              <a:tabLst/>
-            </a:pPr>
-            <a:r>
-              <a:rPr lang="en-US" sz="800" b="0" dirty="0">
-                <a:solidFill>
-                  <a:schemeClr val="accent1"/>
-                </a:solidFill>
-              </a:rPr>
-              <a:t>exec</a:t>
-            </a:r>
-            <a:endParaRPr kumimoji="0" lang="en-US" sz="800" b="0" i="0" u="none" strike="noStrike" cap="none" spc="0" normalizeH="0" baseline="0" dirty="0">
-              <a:ln>
-                <a:noFill/>
-              </a:ln>
-              <a:solidFill>
-                <a:schemeClr val="accent1"/>
-              </a:solidFill>
-              <a:effectLst/>
-              <a:uFillTx/>
-              <a:latin typeface="Source Sans Pro"/>
-              <a:ea typeface="Source Sans Pro"/>
-              <a:cs typeface="Source Sans Pro"/>
-              <a:sym typeface="Source Sans Pro"/>
-            </a:endParaRPr>
-          </a:p>
-        </p:txBody>
-      </p:sp>
-      <p:pic>
-        <p:nvPicPr>
-          <p:cNvPr id="466" name="Graphic 465" descr="Paper outline">
-            <a:extLst>
-              <a:ext uri="{FF2B5EF4-FFF2-40B4-BE49-F238E27FC236}">
-                <a16:creationId xmlns:a16="http://schemas.microsoft.com/office/drawing/2014/main" id="{A9BCD6BA-46C8-A3B9-2895-6182E50D8910}"/>
-              </a:ext>
-            </a:extLst>
-          </p:cNvPr>
-          <p:cNvPicPr>
-            <a:picLocks noChangeAspect="1"/>
-          </p:cNvPicPr>
-          <p:nvPr/>
-        </p:nvPicPr>
-        <p:blipFill>
-          <a:blip r:embed="rId12">
-            <a:extLst>
-              <a:ext uri="{28A0092B-C50C-407E-A947-70E740481C1C}">
-                <a14:useLocalDpi xmlns:a14="http://schemas.microsoft.com/office/drawing/2010/main" val="0"/>
-              </a:ext>
-              <a:ext uri="{96DAC541-7B7A-43D3-8B79-37D633B846F1}">
-                <asvg:svgBlip xmlns:asvg="http://schemas.microsoft.com/office/drawing/2016/SVG/main" r:embed="rId13"/>
-              </a:ext>
-            </a:extLst>
-          </a:blip>
-          <a:stretch>
-            <a:fillRect/>
-          </a:stretch>
-        </p:blipFill>
-        <p:spPr>
-          <a:xfrm>
-            <a:off x="11691947" y="6460966"/>
-            <a:ext cx="527267" cy="527267"/>
-          </a:xfrm>
-          <a:prstGeom prst="rect">
-            <a:avLst/>
-          </a:prstGeom>
-        </p:spPr>
-      </p:pic>
-      <p:pic>
-        <p:nvPicPr>
-          <p:cNvPr id="467" name="Graphic 466" descr="Paper outline">
-            <a:extLst>
-              <a:ext uri="{FF2B5EF4-FFF2-40B4-BE49-F238E27FC236}">
-                <a16:creationId xmlns:a16="http://schemas.microsoft.com/office/drawing/2014/main" id="{4C75BD0C-A784-5A27-43F5-70BB47D97CD7}"/>
-              </a:ext>
-            </a:extLst>
-          </p:cNvPr>
-          <p:cNvPicPr>
-            <a:picLocks noChangeAspect="1"/>
-          </p:cNvPicPr>
-          <p:nvPr/>
-        </p:nvPicPr>
-        <p:blipFill>
-          <a:blip r:embed="rId12">
-            <a:extLst>
-              <a:ext uri="{28A0092B-C50C-407E-A947-70E740481C1C}">
-                <a14:useLocalDpi xmlns:a14="http://schemas.microsoft.com/office/drawing/2010/main" val="0"/>
-              </a:ext>
-              <a:ext uri="{96DAC541-7B7A-43D3-8B79-37D633B846F1}">
-                <asvg:svgBlip xmlns:asvg="http://schemas.microsoft.com/office/drawing/2016/SVG/main" r:embed="rId13"/>
-              </a:ext>
-            </a:extLst>
-          </a:blip>
-          <a:stretch>
-            <a:fillRect/>
-          </a:stretch>
-        </p:blipFill>
-        <p:spPr>
-          <a:xfrm>
-            <a:off x="11708819" y="7443436"/>
-            <a:ext cx="527267" cy="527267"/>
-          </a:xfrm>
-          <a:prstGeom prst="rect">
-            <a:avLst/>
-          </a:prstGeom>
-        </p:spPr>
-      </p:pic>
-      <p:sp>
-        <p:nvSpPr>
-          <p:cNvPr id="468" name="TextBox 467">
-            <a:extLst>
-              <a:ext uri="{FF2B5EF4-FFF2-40B4-BE49-F238E27FC236}">
-                <a16:creationId xmlns:a16="http://schemas.microsoft.com/office/drawing/2014/main" id="{AF3921CF-F78F-AAA6-6C62-7645EFD73D5C}"/>
-              </a:ext>
-            </a:extLst>
-          </p:cNvPr>
-          <p:cNvSpPr txBox="1"/>
-          <p:nvPr/>
-        </p:nvSpPr>
-        <p:spPr>
-          <a:xfrm>
-            <a:off x="11639671" y="7875044"/>
-            <a:ext cx="781573" cy="258964"/>
-          </a:xfrm>
-          <a:prstGeom prst="rect">
-            <a:avLst/>
-          </a:prstGeom>
-          <a:noFill/>
-          <a:ln w="12700" cap="flat">
-            <a:noFill/>
-            <a:miter lim="400000"/>
-          </a:ln>
-          <a:effectLst/>
-          <a:sp3d/>
-        </p:spPr>
-        <p:style>
-          <a:lnRef idx="0">
-            <a:scrgbClr r="0" g="0" b="0"/>
-          </a:lnRef>
-          <a:fillRef idx="0">
-            <a:scrgbClr r="0" g="0" b="0"/>
-          </a:fillRef>
-          <a:effectRef idx="0">
-            <a:scrgbClr r="0" g="0" b="0"/>
-          </a:effectRef>
-          <a:fontRef idx="none"/>
-        </p:style>
-        <p:txBody>
-          <a:bodyPr rot="0" spcFirstLastPara="1" vertOverflow="overflow" horzOverflow="overflow" vert="horz" wrap="square" lIns="54570" tIns="54570" rIns="54570" bIns="54570" numCol="1" spcCol="38100" rtlCol="0" anchor="ctr">
-            <a:spAutoFit/>
-          </a:bodyPr>
-          <a:lstStyle/>
-          <a:p>
-            <a:pPr marL="0" marR="0" indent="0" algn="l" defTabSz="584200" rtl="0" fontAlgn="auto" latinLnBrk="0" hangingPunct="0">
-              <a:lnSpc>
-                <a:spcPct val="100000"/>
-              </a:lnSpc>
-              <a:spcBef>
-                <a:spcPts val="200"/>
-              </a:spcBef>
-              <a:spcAft>
-                <a:spcPts val="0"/>
-              </a:spcAft>
-              <a:buClrTx/>
-              <a:buSzTx/>
-              <a:buFontTx/>
-              <a:buNone/>
-              <a:tabLst/>
-            </a:pPr>
-            <a:r>
-              <a:rPr lang="en-US" sz="800" b="0" dirty="0" err="1"/>
-              <a:t>parse_mbox</a:t>
-            </a:r>
-            <a:r>
-              <a:rPr lang="en-US" sz="800" b="0" dirty="0"/>
-              <a:t>()</a:t>
-            </a:r>
-            <a:endParaRPr kumimoji="0" lang="en-US" sz="800" b="0" i="0" u="none" strike="noStrike" cap="none" spc="0" normalizeH="0" baseline="0" dirty="0">
-              <a:ln>
-                <a:noFill/>
-              </a:ln>
-              <a:solidFill>
-                <a:srgbClr val="4C4C4C"/>
-              </a:solidFill>
-              <a:effectLst/>
-              <a:uFillTx/>
-              <a:latin typeface="Source Sans Pro"/>
-              <a:ea typeface="Source Sans Pro"/>
-              <a:cs typeface="Source Sans Pro"/>
-              <a:sym typeface="Source Sans Pro"/>
-            </a:endParaRPr>
-          </a:p>
-        </p:txBody>
-      </p:sp>
-      <p:sp>
-        <p:nvSpPr>
-          <p:cNvPr id="469" name="TextBox 468">
-            <a:extLst>
-              <a:ext uri="{FF2B5EF4-FFF2-40B4-BE49-F238E27FC236}">
-                <a16:creationId xmlns:a16="http://schemas.microsoft.com/office/drawing/2014/main" id="{B0777A3F-BCEA-DF03-E946-9EAA09AF9449}"/>
-              </a:ext>
-            </a:extLst>
-          </p:cNvPr>
-          <p:cNvSpPr txBox="1"/>
-          <p:nvPr/>
-        </p:nvSpPr>
-        <p:spPr>
-          <a:xfrm>
-            <a:off x="11622799" y="6885964"/>
-            <a:ext cx="781573" cy="258964"/>
-          </a:xfrm>
-          <a:prstGeom prst="rect">
-            <a:avLst/>
-          </a:prstGeom>
-          <a:noFill/>
-          <a:ln w="12700" cap="flat">
-            <a:noFill/>
-            <a:miter lim="400000"/>
-          </a:ln>
-          <a:effectLst/>
-          <a:sp3d/>
-        </p:spPr>
-        <p:style>
-          <a:lnRef idx="0">
-            <a:scrgbClr r="0" g="0" b="0"/>
-          </a:lnRef>
-          <a:fillRef idx="0">
-            <a:scrgbClr r="0" g="0" b="0"/>
-          </a:fillRef>
-          <a:effectRef idx="0">
-            <a:scrgbClr r="0" g="0" b="0"/>
-          </a:effectRef>
-          <a:fontRef idx="none"/>
-        </p:style>
-        <p:txBody>
-          <a:bodyPr rot="0" spcFirstLastPara="1" vertOverflow="overflow" horzOverflow="overflow" vert="horz" wrap="square" lIns="54570" tIns="54570" rIns="54570" bIns="54570" numCol="1" spcCol="38100" rtlCol="0" anchor="ctr">
-            <a:spAutoFit/>
-          </a:bodyPr>
-          <a:lstStyle/>
-          <a:p>
-            <a:pPr marL="0" marR="0" indent="0" algn="l" defTabSz="584200" rtl="0" fontAlgn="auto" latinLnBrk="0" hangingPunct="0">
-              <a:lnSpc>
-                <a:spcPct val="100000"/>
-              </a:lnSpc>
-              <a:spcBef>
-                <a:spcPts val="200"/>
-              </a:spcBef>
-              <a:spcAft>
-                <a:spcPts val="0"/>
-              </a:spcAft>
-              <a:buClrTx/>
-              <a:buSzTx/>
-              <a:buFontTx/>
-              <a:buNone/>
-              <a:tabLst/>
-            </a:pPr>
-            <a:r>
-              <a:rPr lang="en-US" sz="800" b="0" dirty="0" err="1"/>
-              <a:t>parse_mbox</a:t>
-            </a:r>
-            <a:r>
-              <a:rPr lang="en-US" sz="800" b="0" dirty="0"/>
-              <a:t>()</a:t>
-            </a:r>
-            <a:endParaRPr kumimoji="0" lang="en-US" sz="800" b="0" i="0" u="none" strike="noStrike" cap="none" spc="0" normalizeH="0" baseline="0" dirty="0">
-              <a:ln>
-                <a:noFill/>
-              </a:ln>
-              <a:solidFill>
-                <a:srgbClr val="4C4C4C"/>
-              </a:solidFill>
-              <a:effectLst/>
-              <a:uFillTx/>
-              <a:latin typeface="Source Sans Pro"/>
-              <a:ea typeface="Source Sans Pro"/>
-              <a:cs typeface="Source Sans Pro"/>
-              <a:sym typeface="Source Sans Pro"/>
-            </a:endParaRPr>
-          </a:p>
-        </p:txBody>
-      </p:sp>
-      <p:sp>
-        <p:nvSpPr>
-          <p:cNvPr id="470" name="TextBox 469">
-            <a:extLst>
-              <a:ext uri="{FF2B5EF4-FFF2-40B4-BE49-F238E27FC236}">
-                <a16:creationId xmlns:a16="http://schemas.microsoft.com/office/drawing/2014/main" id="{25A8E869-D336-213B-305E-218F828D79BE}"/>
-              </a:ext>
-            </a:extLst>
-          </p:cNvPr>
-          <p:cNvSpPr txBox="1"/>
-          <p:nvPr/>
-        </p:nvSpPr>
-        <p:spPr>
-          <a:xfrm>
-            <a:off x="11771183" y="6604903"/>
-            <a:ext cx="423360" cy="258964"/>
-          </a:xfrm>
-          <a:prstGeom prst="rect">
-            <a:avLst/>
-          </a:prstGeom>
-          <a:noFill/>
-          <a:ln w="12700" cap="flat">
-            <a:noFill/>
-            <a:miter lim="400000"/>
-          </a:ln>
-          <a:effectLst/>
-          <a:sp3d/>
-        </p:spPr>
-        <p:style>
-          <a:lnRef idx="0">
-            <a:scrgbClr r="0" g="0" b="0"/>
-          </a:lnRef>
-          <a:fillRef idx="0">
-            <a:scrgbClr r="0" g="0" b="0"/>
-          </a:fillRef>
-          <a:effectRef idx="0">
-            <a:scrgbClr r="0" g="0" b="0"/>
-          </a:effectRef>
-          <a:fontRef idx="none"/>
-        </p:style>
-        <p:txBody>
-          <a:bodyPr rot="0" spcFirstLastPara="1" vertOverflow="overflow" horzOverflow="overflow" vert="horz" wrap="square" lIns="54570" tIns="54570" rIns="54570" bIns="54570" numCol="1" spcCol="38100" rtlCol="0" anchor="ctr">
-            <a:spAutoFit/>
-          </a:bodyPr>
-          <a:lstStyle/>
-          <a:p>
-            <a:pPr marL="0" marR="0" indent="0" algn="l" defTabSz="584200" rtl="0" fontAlgn="auto" latinLnBrk="0" hangingPunct="0">
-              <a:lnSpc>
-                <a:spcPct val="100000"/>
-              </a:lnSpc>
-              <a:spcBef>
-                <a:spcPts val="200"/>
-              </a:spcBef>
-              <a:spcAft>
-                <a:spcPts val="0"/>
-              </a:spcAft>
-              <a:buClrTx/>
-              <a:buSzTx/>
-              <a:buFontTx/>
-              <a:buNone/>
-              <a:tabLst/>
-            </a:pPr>
-            <a:r>
-              <a:rPr lang="en-US" sz="800" b="0" dirty="0" err="1"/>
-              <a:t>mail.R</a:t>
-            </a:r>
-            <a:endParaRPr kumimoji="0" lang="en-US" sz="800" b="0" i="0" u="none" strike="noStrike" cap="none" spc="0" normalizeH="0" baseline="0" dirty="0">
-              <a:ln>
-                <a:noFill/>
-              </a:ln>
-              <a:solidFill>
-                <a:srgbClr val="4C4C4C"/>
-              </a:solidFill>
-              <a:effectLst/>
-              <a:uFillTx/>
-              <a:latin typeface="Source Sans Pro"/>
-              <a:ea typeface="Source Sans Pro"/>
-              <a:cs typeface="Source Sans Pro"/>
-              <a:sym typeface="Source Sans Pro"/>
-            </a:endParaRPr>
-          </a:p>
-        </p:txBody>
-      </p:sp>
-      <p:sp>
-        <p:nvSpPr>
-          <p:cNvPr id="471" name="TextBox 470">
-            <a:extLst>
-              <a:ext uri="{FF2B5EF4-FFF2-40B4-BE49-F238E27FC236}">
-                <a16:creationId xmlns:a16="http://schemas.microsoft.com/office/drawing/2014/main" id="{8D3B62AF-E6E2-B74E-D86E-ACE7153D5479}"/>
-              </a:ext>
-            </a:extLst>
-          </p:cNvPr>
-          <p:cNvSpPr txBox="1"/>
-          <p:nvPr/>
-        </p:nvSpPr>
-        <p:spPr>
-          <a:xfrm>
-            <a:off x="11780721" y="7577587"/>
-            <a:ext cx="423360" cy="258964"/>
-          </a:xfrm>
-          <a:prstGeom prst="rect">
-            <a:avLst/>
-          </a:prstGeom>
-          <a:noFill/>
-          <a:ln w="12700" cap="flat">
-            <a:noFill/>
-            <a:miter lim="400000"/>
-          </a:ln>
-          <a:effectLst/>
-          <a:sp3d/>
-        </p:spPr>
-        <p:style>
-          <a:lnRef idx="0">
-            <a:scrgbClr r="0" g="0" b="0"/>
-          </a:lnRef>
-          <a:fillRef idx="0">
-            <a:scrgbClr r="0" g="0" b="0"/>
-          </a:fillRef>
-          <a:effectRef idx="0">
-            <a:scrgbClr r="0" g="0" b="0"/>
-          </a:effectRef>
-          <a:fontRef idx="none"/>
-        </p:style>
-        <p:txBody>
-          <a:bodyPr rot="0" spcFirstLastPara="1" vertOverflow="overflow" horzOverflow="overflow" vert="horz" wrap="square" lIns="54570" tIns="54570" rIns="54570" bIns="54570" numCol="1" spcCol="38100" rtlCol="0" anchor="ctr">
-            <a:spAutoFit/>
-          </a:bodyPr>
-          <a:lstStyle/>
-          <a:p>
-            <a:pPr marL="0" marR="0" indent="0" algn="l" defTabSz="584200" rtl="0" fontAlgn="auto" latinLnBrk="0" hangingPunct="0">
-              <a:lnSpc>
-                <a:spcPct val="100000"/>
-              </a:lnSpc>
-              <a:spcBef>
-                <a:spcPts val="200"/>
-              </a:spcBef>
-              <a:spcAft>
-                <a:spcPts val="0"/>
-              </a:spcAft>
-              <a:buClrTx/>
-              <a:buSzTx/>
-              <a:buFontTx/>
-              <a:buNone/>
-              <a:tabLst/>
-            </a:pPr>
-            <a:r>
-              <a:rPr lang="en-US" sz="800" b="0" dirty="0" err="1"/>
               <a:t>mail.R</a:t>
             </a:r>
             <a:endParaRPr kumimoji="0" lang="en-US" sz="800" b="0" i="0" u="none" strike="noStrike" cap="none" spc="0" normalizeH="0" baseline="0" dirty="0">
@@ -15001,14 +14279,14 @@
           <p:nvPr>
             <p:extLst>
               <p:ext uri="{D42A27DB-BD31-4B8C-83A1-F6EECF244321}">
-                <p14:modId xmlns:p14="http://schemas.microsoft.com/office/powerpoint/2010/main" val="1072663476"/>
+                <p14:modId xmlns:p14="http://schemas.microsoft.com/office/powerpoint/2010/main" val="4129999772"/>
               </p:ext>
             </p:extLst>
           </p:nvPr>
         </p:nvGraphicFramePr>
         <p:xfrm>
-          <a:off x="12396150" y="6529982"/>
-          <a:ext cx="554556" cy="373251"/>
+          <a:off x="12614626" y="6529982"/>
+          <a:ext cx="369704" cy="373251"/>
         </p:xfrm>
         <a:graphic>
           <a:graphicData uri="http://schemas.openxmlformats.org/drawingml/2006/table">
@@ -15028,13 +14306,6 @@
                   <a:extLst>
                     <a:ext uri="{9D8B030D-6E8A-4147-A177-3AD203B41FA5}">
                       <a16:colId xmlns:a16="http://schemas.microsoft.com/office/drawing/2014/main" val="20001"/>
-                    </a:ext>
-                  </a:extLst>
-                </a:gridCol>
-                <a:gridCol w="184852">
-                  <a:extLst>
-                    <a:ext uri="{9D8B030D-6E8A-4147-A177-3AD203B41FA5}">
-                      <a16:colId xmlns:a16="http://schemas.microsoft.com/office/drawing/2014/main" val="20002"/>
                     </a:ext>
                   </a:extLst>
                 </a:gridCol>
@@ -15160,66 +14431,6 @@
                     </a:solidFill>
                   </a:tcPr>
                 </a:tc>
-                <a:tc>
-                  <a:txBody>
-                    <a:bodyPr/>
-                    <a:lstStyle/>
-                    <a:p>
-                      <a:pPr defTabSz="914400">
-                        <a:defRPr sz="700" b="0">
-                          <a:latin typeface="+mj-lt"/>
-                          <a:ea typeface="+mj-ea"/>
-                          <a:cs typeface="+mj-cs"/>
-                          <a:sym typeface="Source Sans Pro Regular"/>
-                        </a:defRPr>
-                      </a:pPr>
-                      <a:endParaRPr>
-                        <a:noFill/>
-                      </a:endParaRPr>
-                    </a:p>
-                  </a:txBody>
-                  <a:tcPr marL="0" marR="0" marT="0" marB="0" anchor="ctr" horzOverflow="overflow">
-                    <a:lnL w="12700" cap="flat" cmpd="sng" algn="ctr">
-                      <a:solidFill>
-                        <a:schemeClr val="bg1"/>
-                      </a:solidFill>
-                      <a:prstDash val="solid"/>
-                      <a:round/>
-                      <a:headEnd type="none" w="med" len="med"/>
-                      <a:tailEnd type="none" w="med" len="med"/>
-                    </a:lnL>
-                    <a:lnR w="12700" cap="flat" cmpd="sng" algn="ctr">
-                      <a:solidFill>
-                        <a:schemeClr val="bg1"/>
-                      </a:solidFill>
-                      <a:prstDash val="solid"/>
-                      <a:round/>
-                      <a:headEnd type="none" w="med" len="med"/>
-                      <a:tailEnd type="none" w="med" len="med"/>
-                    </a:lnR>
-                    <a:lnT w="12700" cap="flat" cmpd="sng" algn="ctr">
-                      <a:solidFill>
-                        <a:schemeClr val="bg1"/>
-                      </a:solidFill>
-                      <a:prstDash val="solid"/>
-                      <a:round/>
-                      <a:headEnd type="none" w="med" len="med"/>
-                      <a:tailEnd type="none" w="med" len="med"/>
-                    </a:lnT>
-                    <a:lnB w="12700" cap="flat" cmpd="sng" algn="ctr">
-                      <a:solidFill>
-                        <a:schemeClr val="bg1"/>
-                      </a:solidFill>
-                      <a:prstDash val="solid"/>
-                      <a:round/>
-                      <a:headEnd type="none" w="med" len="med"/>
-                      <a:tailEnd type="none" w="med" len="med"/>
-                    </a:lnB>
-                    <a:solidFill>
-                      <a:srgbClr val="C1C1C0"/>
-                    </a:solidFill>
-                  </a:tcPr>
-                </a:tc>
                 <a:extLst>
                   <a:ext uri="{0D108BD9-81ED-4DB2-BD59-A6C34878D82A}">
                     <a16:rowId xmlns:a16="http://schemas.microsoft.com/office/drawing/2014/main" val="10000"/>
@@ -15227,66 +14438,6 @@
                 </a:extLst>
               </a:tr>
               <a:tr h="124417">
-                <a:tc>
-                  <a:txBody>
-                    <a:bodyPr/>
-                    <a:lstStyle/>
-                    <a:p>
-                      <a:pPr defTabSz="914400">
-                        <a:defRPr sz="700">
-                          <a:sym typeface="Source Sans Pro Regular"/>
-                        </a:defRPr>
-                      </a:pPr>
-                      <a:endParaRPr dirty="0">
-                        <a:noFill/>
-                        <a:highlight>
-                          <a:srgbClr val="FFFF00"/>
-                        </a:highlight>
-                      </a:endParaRPr>
-                    </a:p>
-                  </a:txBody>
-                  <a:tcPr marL="0" marR="0" marT="0" marB="0" anchor="ctr" horzOverflow="overflow">
-                    <a:lnL w="12700" cap="flat" cmpd="sng" algn="ctr">
-                      <a:solidFill>
-                        <a:schemeClr val="bg1"/>
-                      </a:solidFill>
-                      <a:prstDash val="solid"/>
-                      <a:round/>
-                      <a:headEnd type="none" w="med" len="med"/>
-                      <a:tailEnd type="none" w="med" len="med"/>
-                    </a:lnL>
-                    <a:lnR w="12700" cap="flat" cmpd="sng" algn="ctr">
-                      <a:solidFill>
-                        <a:schemeClr val="bg1"/>
-                      </a:solidFill>
-                      <a:prstDash val="solid"/>
-                      <a:round/>
-                      <a:headEnd type="none" w="med" len="med"/>
-                      <a:tailEnd type="none" w="med" len="med"/>
-                    </a:lnR>
-                    <a:lnT w="12700" cap="flat" cmpd="sng" algn="ctr">
-                      <a:solidFill>
-                        <a:schemeClr val="bg1"/>
-                      </a:solidFill>
-                      <a:prstDash val="solid"/>
-                      <a:round/>
-                      <a:headEnd type="none" w="med" len="med"/>
-                      <a:tailEnd type="none" w="med" len="med"/>
-                    </a:lnT>
-                    <a:lnB w="12700" cap="flat" cmpd="sng" algn="ctr">
-                      <a:solidFill>
-                        <a:schemeClr val="bg1"/>
-                      </a:solidFill>
-                      <a:prstDash val="solid"/>
-                      <a:round/>
-                      <a:headEnd type="none" w="med" len="med"/>
-                      <a:tailEnd type="none" w="med" len="med"/>
-                    </a:lnB>
-                    <a:solidFill>
-                      <a:schemeClr val="accent3"/>
-                    </a:solidFill>
-                  </a:tcPr>
-                </a:tc>
                 <a:tc>
                   <a:txBody>
                     <a:bodyPr/>
@@ -15528,670 +14679,6 @@
                     </a:solidFill>
                   </a:tcPr>
                 </a:tc>
-                <a:tc>
-                  <a:txBody>
-                    <a:bodyPr/>
-                    <a:lstStyle/>
-                    <a:p>
-                      <a:pPr defTabSz="914400">
-                        <a:defRPr sz="700">
-                          <a:sym typeface="Source Sans Pro Regular"/>
-                        </a:defRPr>
-                      </a:pPr>
-                      <a:endParaRPr dirty="0">
-                        <a:noFill/>
-                      </a:endParaRPr>
-                    </a:p>
-                  </a:txBody>
-                  <a:tcPr marL="0" marR="0" marT="0" marB="0" anchor="ctr" horzOverflow="overflow">
-                    <a:lnL w="12700" cap="flat" cmpd="sng" algn="ctr">
-                      <a:solidFill>
-                        <a:schemeClr val="bg1"/>
-                      </a:solidFill>
-                      <a:prstDash val="solid"/>
-                      <a:round/>
-                      <a:headEnd type="none" w="med" len="med"/>
-                      <a:tailEnd type="none" w="med" len="med"/>
-                    </a:lnL>
-                    <a:lnR w="12700" cap="flat" cmpd="sng" algn="ctr">
-                      <a:solidFill>
-                        <a:schemeClr val="bg1"/>
-                      </a:solidFill>
-                      <a:prstDash val="solid"/>
-                      <a:round/>
-                      <a:headEnd type="none" w="med" len="med"/>
-                      <a:tailEnd type="none" w="med" len="med"/>
-                    </a:lnR>
-                    <a:lnT w="12700" cap="flat" cmpd="sng" algn="ctr">
-                      <a:solidFill>
-                        <a:schemeClr val="bg1"/>
-                      </a:solidFill>
-                      <a:prstDash val="solid"/>
-                      <a:round/>
-                      <a:headEnd type="none" w="med" len="med"/>
-                      <a:tailEnd type="none" w="med" len="med"/>
-                    </a:lnT>
-                    <a:lnB w="12700" cap="flat" cmpd="sng" algn="ctr">
-                      <a:solidFill>
-                        <a:schemeClr val="bg1"/>
-                      </a:solidFill>
-                      <a:prstDash val="solid"/>
-                      <a:round/>
-                      <a:headEnd type="none" w="med" len="med"/>
-                      <a:tailEnd type="none" w="med" len="med"/>
-                    </a:lnB>
-                    <a:solidFill>
-                      <a:schemeClr val="accent3"/>
-                    </a:solidFill>
-                  </a:tcPr>
-                </a:tc>
-                <a:extLst>
-                  <a:ext uri="{0D108BD9-81ED-4DB2-BD59-A6C34878D82A}">
-                    <a16:rowId xmlns:a16="http://schemas.microsoft.com/office/drawing/2014/main" val="10002"/>
-                  </a:ext>
-                </a:extLst>
-              </a:tr>
-            </a:tbl>
-          </a:graphicData>
-        </a:graphic>
-      </p:graphicFrame>
-      <p:graphicFrame>
-        <p:nvGraphicFramePr>
-          <p:cNvPr id="473" name="Table">
-            <a:extLst>
-              <a:ext uri="{FF2B5EF4-FFF2-40B4-BE49-F238E27FC236}">
-                <a16:creationId xmlns:a16="http://schemas.microsoft.com/office/drawing/2014/main" id="{3995FE7B-5335-FB78-9ABA-35992E855E24}"/>
-              </a:ext>
-            </a:extLst>
-          </p:cNvPr>
-          <p:cNvGraphicFramePr/>
-          <p:nvPr>
-            <p:extLst>
-              <p:ext uri="{D42A27DB-BD31-4B8C-83A1-F6EECF244321}">
-                <p14:modId xmlns:p14="http://schemas.microsoft.com/office/powerpoint/2010/main" val="3623033422"/>
-              </p:ext>
-            </p:extLst>
-          </p:nvPr>
-        </p:nvGraphicFramePr>
-        <p:xfrm>
-          <a:off x="12406310" y="7540248"/>
-          <a:ext cx="554556" cy="373251"/>
-        </p:xfrm>
-        <a:graphic>
-          <a:graphicData uri="http://schemas.openxmlformats.org/drawingml/2006/table">
-            <a:tbl>
-              <a:tblPr firstRow="1">
-                <a:tableStyleId>{4C3C2611-4C71-4FC5-86AE-919BDF0F9419}</a:tableStyleId>
-              </a:tblPr>
-              <a:tblGrid>
-                <a:gridCol w="184852">
-                  <a:extLst>
-                    <a:ext uri="{9D8B030D-6E8A-4147-A177-3AD203B41FA5}">
-                      <a16:colId xmlns:a16="http://schemas.microsoft.com/office/drawing/2014/main" val="20000"/>
-                    </a:ext>
-                  </a:extLst>
-                </a:gridCol>
-                <a:gridCol w="184852">
-                  <a:extLst>
-                    <a:ext uri="{9D8B030D-6E8A-4147-A177-3AD203B41FA5}">
-                      <a16:colId xmlns:a16="http://schemas.microsoft.com/office/drawing/2014/main" val="20001"/>
-                    </a:ext>
-                  </a:extLst>
-                </a:gridCol>
-                <a:gridCol w="184852">
-                  <a:extLst>
-                    <a:ext uri="{9D8B030D-6E8A-4147-A177-3AD203B41FA5}">
-                      <a16:colId xmlns:a16="http://schemas.microsoft.com/office/drawing/2014/main" val="20002"/>
-                    </a:ext>
-                  </a:extLst>
-                </a:gridCol>
-              </a:tblGrid>
-              <a:tr h="124417">
-                <a:tc>
-                  <a:txBody>
-                    <a:bodyPr/>
-                    <a:lstStyle/>
-                    <a:p>
-                      <a:pPr defTabSz="914400">
-                        <a:defRPr sz="700" b="0">
-                          <a:latin typeface="+mj-lt"/>
-                          <a:ea typeface="+mj-ea"/>
-                          <a:cs typeface="+mj-cs"/>
-                          <a:sym typeface="Source Sans Pro Regular"/>
-                        </a:defRPr>
-                      </a:pPr>
-                      <a:endParaRPr dirty="0">
-                        <a:noFill/>
-                      </a:endParaRPr>
-                    </a:p>
-                  </a:txBody>
-                  <a:tcPr marL="0" marR="0" marT="0" marB="0" anchor="ctr" horzOverflow="overflow">
-                    <a:lnL w="12700" cap="flat" cmpd="sng" algn="ctr">
-                      <a:solidFill>
-                        <a:schemeClr val="bg1"/>
-                      </a:solidFill>
-                      <a:prstDash val="solid"/>
-                      <a:round/>
-                      <a:headEnd type="none" w="med" len="med"/>
-                      <a:tailEnd type="none" w="med" len="med"/>
-                    </a:lnL>
-                    <a:lnR w="12700" cap="flat" cmpd="sng" algn="ctr">
-                      <a:solidFill>
-                        <a:schemeClr val="bg1"/>
-                      </a:solidFill>
-                      <a:prstDash val="solid"/>
-                      <a:round/>
-                      <a:headEnd type="none" w="med" len="med"/>
-                      <a:tailEnd type="none" w="med" len="med"/>
-                    </a:lnR>
-                    <a:lnT w="12700" cap="flat" cmpd="sng" algn="ctr">
-                      <a:solidFill>
-                        <a:schemeClr val="bg1"/>
-                      </a:solidFill>
-                      <a:prstDash val="solid"/>
-                      <a:round/>
-                      <a:headEnd type="none" w="med" len="med"/>
-                      <a:tailEnd type="none" w="med" len="med"/>
-                    </a:lnT>
-                    <a:lnB w="12700" cap="flat" cmpd="sng" algn="ctr">
-                      <a:solidFill>
-                        <a:schemeClr val="bg1"/>
-                      </a:solidFill>
-                      <a:prstDash val="solid"/>
-                      <a:round/>
-                      <a:headEnd type="none" w="med" len="med"/>
-                      <a:tailEnd type="none" w="med" len="med"/>
-                    </a:lnB>
-                    <a:solidFill>
-                      <a:srgbClr val="C1C1C0"/>
-                    </a:solidFill>
-                  </a:tcPr>
-                </a:tc>
-                <a:tc>
-                  <a:txBody>
-                    <a:bodyPr/>
-                    <a:lstStyle/>
-                    <a:p>
-                      <a:pPr defTabSz="914400">
-                        <a:defRPr sz="700" b="0">
-                          <a:latin typeface="+mj-lt"/>
-                          <a:ea typeface="+mj-ea"/>
-                          <a:cs typeface="+mj-cs"/>
-                          <a:sym typeface="Source Sans Pro Regular"/>
-                        </a:defRPr>
-                      </a:pPr>
-                      <a:endParaRPr dirty="0">
-                        <a:noFill/>
-                      </a:endParaRPr>
-                    </a:p>
-                  </a:txBody>
-                  <a:tcPr marL="0" marR="0" marT="0" marB="0" anchor="ctr" horzOverflow="overflow">
-                    <a:lnL w="12700" cap="flat" cmpd="sng" algn="ctr">
-                      <a:solidFill>
-                        <a:schemeClr val="bg1"/>
-                      </a:solidFill>
-                      <a:prstDash val="solid"/>
-                      <a:round/>
-                      <a:headEnd type="none" w="med" len="med"/>
-                      <a:tailEnd type="none" w="med" len="med"/>
-                    </a:lnL>
-                    <a:lnR w="12700" cap="flat" cmpd="sng" algn="ctr">
-                      <a:solidFill>
-                        <a:schemeClr val="bg1"/>
-                      </a:solidFill>
-                      <a:prstDash val="solid"/>
-                      <a:round/>
-                      <a:headEnd type="none" w="med" len="med"/>
-                      <a:tailEnd type="none" w="med" len="med"/>
-                    </a:lnR>
-                    <a:lnT w="12700" cap="flat" cmpd="sng" algn="ctr">
-                      <a:solidFill>
-                        <a:schemeClr val="bg1"/>
-                      </a:solidFill>
-                      <a:prstDash val="solid"/>
-                      <a:round/>
-                      <a:headEnd type="none" w="med" len="med"/>
-                      <a:tailEnd type="none" w="med" len="med"/>
-                    </a:lnT>
-                    <a:lnB w="12700" cap="flat" cmpd="sng" algn="ctr">
-                      <a:solidFill>
-                        <a:schemeClr val="bg1"/>
-                      </a:solidFill>
-                      <a:prstDash val="solid"/>
-                      <a:round/>
-                      <a:headEnd type="none" w="med" len="med"/>
-                      <a:tailEnd type="none" w="med" len="med"/>
-                    </a:lnB>
-                    <a:solidFill>
-                      <a:srgbClr val="C1C1C0"/>
-                    </a:solidFill>
-                  </a:tcPr>
-                </a:tc>
-                <a:tc>
-                  <a:txBody>
-                    <a:bodyPr/>
-                    <a:lstStyle/>
-                    <a:p>
-                      <a:pPr defTabSz="914400">
-                        <a:defRPr sz="700" b="0">
-                          <a:latin typeface="+mj-lt"/>
-                          <a:ea typeface="+mj-ea"/>
-                          <a:cs typeface="+mj-cs"/>
-                          <a:sym typeface="Source Sans Pro Regular"/>
-                        </a:defRPr>
-                      </a:pPr>
-                      <a:endParaRPr>
-                        <a:noFill/>
-                      </a:endParaRPr>
-                    </a:p>
-                  </a:txBody>
-                  <a:tcPr marL="0" marR="0" marT="0" marB="0" anchor="ctr" horzOverflow="overflow">
-                    <a:lnL w="12700" cap="flat" cmpd="sng" algn="ctr">
-                      <a:solidFill>
-                        <a:schemeClr val="bg1"/>
-                      </a:solidFill>
-                      <a:prstDash val="solid"/>
-                      <a:round/>
-                      <a:headEnd type="none" w="med" len="med"/>
-                      <a:tailEnd type="none" w="med" len="med"/>
-                    </a:lnL>
-                    <a:lnR w="12700" cap="flat" cmpd="sng" algn="ctr">
-                      <a:solidFill>
-                        <a:schemeClr val="bg1"/>
-                      </a:solidFill>
-                      <a:prstDash val="solid"/>
-                      <a:round/>
-                      <a:headEnd type="none" w="med" len="med"/>
-                      <a:tailEnd type="none" w="med" len="med"/>
-                    </a:lnR>
-                    <a:lnT w="12700" cap="flat" cmpd="sng" algn="ctr">
-                      <a:solidFill>
-                        <a:schemeClr val="bg1"/>
-                      </a:solidFill>
-                      <a:prstDash val="solid"/>
-                      <a:round/>
-                      <a:headEnd type="none" w="med" len="med"/>
-                      <a:tailEnd type="none" w="med" len="med"/>
-                    </a:lnT>
-                    <a:lnB w="12700" cap="flat" cmpd="sng" algn="ctr">
-                      <a:solidFill>
-                        <a:schemeClr val="bg1"/>
-                      </a:solidFill>
-                      <a:prstDash val="solid"/>
-                      <a:round/>
-                      <a:headEnd type="none" w="med" len="med"/>
-                      <a:tailEnd type="none" w="med" len="med"/>
-                    </a:lnB>
-                    <a:solidFill>
-                      <a:srgbClr val="C1C1C0"/>
-                    </a:solidFill>
-                  </a:tcPr>
-                </a:tc>
-                <a:extLst>
-                  <a:ext uri="{0D108BD9-81ED-4DB2-BD59-A6C34878D82A}">
-                    <a16:rowId xmlns:a16="http://schemas.microsoft.com/office/drawing/2014/main" val="10000"/>
-                  </a:ext>
-                </a:extLst>
-              </a:tr>
-              <a:tr h="124417">
-                <a:tc>
-                  <a:txBody>
-                    <a:bodyPr/>
-                    <a:lstStyle/>
-                    <a:p>
-                      <a:pPr defTabSz="914400">
-                        <a:defRPr sz="700">
-                          <a:sym typeface="Source Sans Pro Regular"/>
-                        </a:defRPr>
-                      </a:pPr>
-                      <a:endParaRPr dirty="0">
-                        <a:noFill/>
-                        <a:highlight>
-                          <a:srgbClr val="FFFF00"/>
-                        </a:highlight>
-                      </a:endParaRPr>
-                    </a:p>
-                  </a:txBody>
-                  <a:tcPr marL="0" marR="0" marT="0" marB="0" anchor="ctr" horzOverflow="overflow">
-                    <a:lnL w="12700" cap="flat" cmpd="sng" algn="ctr">
-                      <a:solidFill>
-                        <a:schemeClr val="bg1"/>
-                      </a:solidFill>
-                      <a:prstDash val="solid"/>
-                      <a:round/>
-                      <a:headEnd type="none" w="med" len="med"/>
-                      <a:tailEnd type="none" w="med" len="med"/>
-                    </a:lnL>
-                    <a:lnR w="12700" cap="flat" cmpd="sng" algn="ctr">
-                      <a:solidFill>
-                        <a:schemeClr val="bg1"/>
-                      </a:solidFill>
-                      <a:prstDash val="solid"/>
-                      <a:round/>
-                      <a:headEnd type="none" w="med" len="med"/>
-                      <a:tailEnd type="none" w="med" len="med"/>
-                    </a:lnR>
-                    <a:lnT w="12700" cap="flat" cmpd="sng" algn="ctr">
-                      <a:solidFill>
-                        <a:schemeClr val="bg1"/>
-                      </a:solidFill>
-                      <a:prstDash val="solid"/>
-                      <a:round/>
-                      <a:headEnd type="none" w="med" len="med"/>
-                      <a:tailEnd type="none" w="med" len="med"/>
-                    </a:lnT>
-                    <a:lnB w="12700" cap="flat" cmpd="sng" algn="ctr">
-                      <a:solidFill>
-                        <a:schemeClr val="bg1"/>
-                      </a:solidFill>
-                      <a:prstDash val="solid"/>
-                      <a:round/>
-                      <a:headEnd type="none" w="med" len="med"/>
-                      <a:tailEnd type="none" w="med" len="med"/>
-                    </a:lnB>
-                    <a:solidFill>
-                      <a:schemeClr val="accent3"/>
-                    </a:solidFill>
-                  </a:tcPr>
-                </a:tc>
-                <a:tc>
-                  <a:txBody>
-                    <a:bodyPr/>
-                    <a:lstStyle/>
-                    <a:p>
-                      <a:pPr defTabSz="914400">
-                        <a:defRPr sz="700">
-                          <a:sym typeface="Source Sans Pro Regular"/>
-                        </a:defRPr>
-                      </a:pPr>
-                      <a:endParaRPr dirty="0">
-                        <a:noFill/>
-                        <a:highlight>
-                          <a:srgbClr val="FFFF00"/>
-                        </a:highlight>
-                      </a:endParaRPr>
-                    </a:p>
-                  </a:txBody>
-                  <a:tcPr marL="0" marR="0" marT="0" marB="0" anchor="ctr" horzOverflow="overflow">
-                    <a:lnL w="12700" cap="flat" cmpd="sng" algn="ctr">
-                      <a:solidFill>
-                        <a:schemeClr val="bg1"/>
-                      </a:solidFill>
-                      <a:prstDash val="solid"/>
-                      <a:round/>
-                      <a:headEnd type="none" w="med" len="med"/>
-                      <a:tailEnd type="none" w="med" len="med"/>
-                    </a:lnL>
-                    <a:lnR w="12700" cap="flat" cmpd="sng" algn="ctr">
-                      <a:solidFill>
-                        <a:schemeClr val="bg1"/>
-                      </a:solidFill>
-                      <a:prstDash val="solid"/>
-                      <a:round/>
-                      <a:headEnd type="none" w="med" len="med"/>
-                      <a:tailEnd type="none" w="med" len="med"/>
-                    </a:lnR>
-                    <a:lnT w="12700" cap="flat" cmpd="sng" algn="ctr">
-                      <a:solidFill>
-                        <a:schemeClr val="bg1"/>
-                      </a:solidFill>
-                      <a:prstDash val="solid"/>
-                      <a:round/>
-                      <a:headEnd type="none" w="med" len="med"/>
-                      <a:tailEnd type="none" w="med" len="med"/>
-                    </a:lnT>
-                    <a:lnB w="12700" cap="flat" cmpd="sng" algn="ctr">
-                      <a:solidFill>
-                        <a:schemeClr val="bg1"/>
-                      </a:solidFill>
-                      <a:prstDash val="solid"/>
-                      <a:round/>
-                      <a:headEnd type="none" w="med" len="med"/>
-                      <a:tailEnd type="none" w="med" len="med"/>
-                    </a:lnB>
-                    <a:solidFill>
-                      <a:schemeClr val="accent3"/>
-                    </a:solidFill>
-                  </a:tcPr>
-                </a:tc>
-                <a:tc>
-                  <a:txBody>
-                    <a:bodyPr/>
-                    <a:lstStyle/>
-                    <a:p>
-                      <a:pPr defTabSz="914400">
-                        <a:defRPr sz="700">
-                          <a:sym typeface="Source Sans Pro Regular"/>
-                        </a:defRPr>
-                      </a:pPr>
-                      <a:endParaRPr dirty="0">
-                        <a:noFill/>
-                        <a:highlight>
-                          <a:srgbClr val="FFFF00"/>
-                        </a:highlight>
-                      </a:endParaRPr>
-                    </a:p>
-                  </a:txBody>
-                  <a:tcPr marL="0" marR="0" marT="0" marB="0" anchor="ctr" horzOverflow="overflow">
-                    <a:lnL w="12700" cap="flat" cmpd="sng" algn="ctr">
-                      <a:solidFill>
-                        <a:schemeClr val="bg1"/>
-                      </a:solidFill>
-                      <a:prstDash val="solid"/>
-                      <a:round/>
-                      <a:headEnd type="none" w="med" len="med"/>
-                      <a:tailEnd type="none" w="med" len="med"/>
-                    </a:lnL>
-                    <a:lnR w="12700" cap="flat" cmpd="sng" algn="ctr">
-                      <a:solidFill>
-                        <a:schemeClr val="bg1"/>
-                      </a:solidFill>
-                      <a:prstDash val="solid"/>
-                      <a:round/>
-                      <a:headEnd type="none" w="med" len="med"/>
-                      <a:tailEnd type="none" w="med" len="med"/>
-                    </a:lnR>
-                    <a:lnT w="12700" cap="flat" cmpd="sng" algn="ctr">
-                      <a:solidFill>
-                        <a:schemeClr val="bg1"/>
-                      </a:solidFill>
-                      <a:prstDash val="solid"/>
-                      <a:round/>
-                      <a:headEnd type="none" w="med" len="med"/>
-                      <a:tailEnd type="none" w="med" len="med"/>
-                    </a:lnT>
-                    <a:lnB w="12700" cap="flat" cmpd="sng" algn="ctr">
-                      <a:solidFill>
-                        <a:schemeClr val="bg1"/>
-                      </a:solidFill>
-                      <a:prstDash val="solid"/>
-                      <a:round/>
-                      <a:headEnd type="none" w="med" len="med"/>
-                      <a:tailEnd type="none" w="med" len="med"/>
-                    </a:lnB>
-                    <a:solidFill>
-                      <a:schemeClr val="accent3"/>
-                    </a:solidFill>
-                  </a:tcPr>
-                </a:tc>
-                <a:extLst>
-                  <a:ext uri="{0D108BD9-81ED-4DB2-BD59-A6C34878D82A}">
-                    <a16:rowId xmlns:a16="http://schemas.microsoft.com/office/drawing/2014/main" val="10001"/>
-                  </a:ext>
-                </a:extLst>
-              </a:tr>
-              <a:tr h="124417">
-                <a:tc>
-                  <a:txBody>
-                    <a:bodyPr/>
-                    <a:lstStyle/>
-                    <a:p>
-                      <a:pPr defTabSz="914400">
-                        <a:defRPr sz="700">
-                          <a:sym typeface="Source Sans Pro Regular"/>
-                        </a:defRPr>
-                      </a:pPr>
-                      <a:endParaRPr dirty="0">
-                        <a:noFill/>
-                      </a:endParaRPr>
-                    </a:p>
-                  </a:txBody>
-                  <a:tcPr marL="0" marR="0" marT="0" marB="0" anchor="ctr" horzOverflow="overflow">
-                    <a:lnL w="12700" cap="flat" cmpd="sng" algn="ctr">
-                      <a:solidFill>
-                        <a:schemeClr val="bg1"/>
-                      </a:solidFill>
-                      <a:prstDash val="solid"/>
-                      <a:round/>
-                      <a:headEnd type="none" w="med" len="med"/>
-                      <a:tailEnd type="none" w="med" len="med"/>
-                    </a:lnL>
-                    <a:lnR w="12700" cap="flat" cmpd="sng" algn="ctr">
-                      <a:solidFill>
-                        <a:schemeClr val="bg1"/>
-                      </a:solidFill>
-                      <a:prstDash val="solid"/>
-                      <a:round/>
-                      <a:headEnd type="none" w="med" len="med"/>
-                      <a:tailEnd type="none" w="med" len="med"/>
-                    </a:lnR>
-                    <a:lnT w="12700" cap="flat" cmpd="sng" algn="ctr">
-                      <a:solidFill>
-                        <a:schemeClr val="bg1"/>
-                      </a:solidFill>
-                      <a:prstDash val="solid"/>
-                      <a:round/>
-                      <a:headEnd type="none" w="med" len="med"/>
-                      <a:tailEnd type="none" w="med" len="med"/>
-                    </a:lnT>
-                    <a:lnB w="12700" cap="flat" cmpd="sng" algn="ctr">
-                      <a:solidFill>
-                        <a:schemeClr val="bg1"/>
-                      </a:solidFill>
-                      <a:prstDash val="solid"/>
-                      <a:round/>
-                      <a:headEnd type="none" w="med" len="med"/>
-                      <a:tailEnd type="none" w="med" len="med"/>
-                    </a:lnB>
-                    <a:solidFill>
-                      <a:schemeClr val="accent3"/>
-                    </a:solidFill>
-                  </a:tcPr>
-                </a:tc>
-                <a:tc>
-                  <a:txBody>
-                    <a:bodyPr/>
-                    <a:lstStyle/>
-                    <a:p>
-                      <a:pPr defTabSz="914400">
-                        <a:defRPr sz="700">
-                          <a:sym typeface="Source Sans Pro Regular"/>
-                        </a:defRPr>
-                      </a:pPr>
-                      <a:endParaRPr dirty="0">
-                        <a:noFill/>
-                      </a:endParaRPr>
-                    </a:p>
-                  </a:txBody>
-                  <a:tcPr marL="0" marR="0" marT="0" marB="0" anchor="ctr" horzOverflow="overflow">
-                    <a:lnL w="12700" cap="flat" cmpd="sng" algn="ctr">
-                      <a:solidFill>
-                        <a:schemeClr val="bg1"/>
-                      </a:solidFill>
-                      <a:prstDash val="solid"/>
-                      <a:round/>
-                      <a:headEnd type="none" w="med" len="med"/>
-                      <a:tailEnd type="none" w="med" len="med"/>
-                    </a:lnL>
-                    <a:lnR w="12700" cap="flat" cmpd="sng" algn="ctr">
-                      <a:solidFill>
-                        <a:schemeClr val="bg1"/>
-                      </a:solidFill>
-                      <a:prstDash val="solid"/>
-                      <a:round/>
-                      <a:headEnd type="none" w="med" len="med"/>
-                      <a:tailEnd type="none" w="med" len="med"/>
-                    </a:lnR>
-                    <a:lnT w="12700" cap="flat" cmpd="sng" algn="ctr">
-                      <a:solidFill>
-                        <a:schemeClr val="bg1"/>
-                      </a:solidFill>
-                      <a:prstDash val="solid"/>
-                      <a:round/>
-                      <a:headEnd type="none" w="med" len="med"/>
-                      <a:tailEnd type="none" w="med" len="med"/>
-                    </a:lnT>
-                    <a:lnB w="12700" cap="flat" cmpd="sng" algn="ctr">
-                      <a:solidFill>
-                        <a:schemeClr val="bg1"/>
-                      </a:solidFill>
-                      <a:prstDash val="solid"/>
-                      <a:round/>
-                      <a:headEnd type="none" w="med" len="med"/>
-                      <a:tailEnd type="none" w="med" len="med"/>
-                    </a:lnB>
-                    <a:solidFill>
-                      <a:schemeClr val="accent3"/>
-                    </a:solidFill>
-                  </a:tcPr>
-                </a:tc>
-                <a:tc>
-                  <a:txBody>
-                    <a:bodyPr/>
-                    <a:lstStyle/>
-                    <a:p>
-                      <a:pPr defTabSz="914400">
-                        <a:defRPr sz="700">
-                          <a:sym typeface="Source Sans Pro Regular"/>
-                        </a:defRPr>
-                      </a:pPr>
-                      <a:endParaRPr dirty="0">
-                        <a:noFill/>
-                      </a:endParaRPr>
-                    </a:p>
-                  </a:txBody>
-                  <a:tcPr marL="0" marR="0" marT="0" marB="0" anchor="ctr" horzOverflow="overflow">
-                    <a:lnL w="12700" cap="flat" cmpd="sng" algn="ctr">
-                      <a:solidFill>
-                        <a:schemeClr val="bg1"/>
-                      </a:solidFill>
-                      <a:prstDash val="solid"/>
-                      <a:round/>
-                      <a:headEnd type="none" w="med" len="med"/>
-                      <a:tailEnd type="none" w="med" len="med"/>
-                    </a:lnL>
-                    <a:lnR w="12700" cap="flat" cmpd="sng" algn="ctr">
-                      <a:solidFill>
-                        <a:schemeClr val="bg1"/>
-                      </a:solidFill>
-                      <a:prstDash val="solid"/>
-                      <a:round/>
-                      <a:headEnd type="none" w="med" len="med"/>
-                      <a:tailEnd type="none" w="med" len="med"/>
-                    </a:lnR>
-                    <a:lnT w="12700" cap="flat" cmpd="sng" algn="ctr">
-                      <a:solidFill>
-                        <a:schemeClr val="bg1"/>
-                      </a:solidFill>
-                      <a:prstDash val="solid"/>
-                      <a:round/>
-                      <a:headEnd type="none" w="med" len="med"/>
-                      <a:tailEnd type="none" w="med" len="med"/>
-                    </a:lnT>
-                    <a:lnB w="12700" cap="flat" cmpd="sng" algn="ctr">
-                      <a:solidFill>
-                        <a:schemeClr val="bg1"/>
-                      </a:solidFill>
-                      <a:prstDash val="solid"/>
-                      <a:round/>
-                      <a:headEnd type="none" w="med" len="med"/>
-                      <a:tailEnd type="none" w="med" len="med"/>
-                    </a:lnB>
-                    <a:solidFill>
-                      <a:schemeClr val="accent3"/>
-                    </a:solidFill>
-                  </a:tcPr>
-                </a:tc>
                 <a:extLst>
                   <a:ext uri="{0D108BD9-81ED-4DB2-BD59-A6C34878D82A}">
                     <a16:rowId xmlns:a16="http://schemas.microsoft.com/office/drawing/2014/main" val="10002"/>
@@ -16346,7 +14833,7 @@
         </p:nvSpPr>
         <p:spPr>
           <a:xfrm>
-            <a:off x="10909794" y="6082519"/>
+            <a:off x="10672402" y="6063272"/>
             <a:ext cx="781573" cy="258964"/>
           </a:xfrm>
           <a:prstGeom prst="rect">
@@ -16435,7 +14922,7 @@
         </p:nvCxnSpPr>
         <p:spPr>
           <a:xfrm>
-            <a:off x="9919330" y="7235935"/>
+            <a:off x="9756302" y="7235935"/>
             <a:ext cx="167561" cy="4430"/>
           </a:xfrm>
           <a:prstGeom prst="straightConnector1">
@@ -16482,7 +14969,7 @@
         </p:nvCxnSpPr>
         <p:spPr>
           <a:xfrm flipV="1">
-            <a:off x="10566899" y="7011918"/>
+            <a:off x="10403871" y="7011918"/>
             <a:ext cx="239813" cy="224017"/>
           </a:xfrm>
           <a:prstGeom prst="straightConnector1">
@@ -16529,7 +15016,7 @@
         </p:nvCxnSpPr>
         <p:spPr>
           <a:xfrm>
-            <a:off x="11489812" y="6724620"/>
+            <a:off x="11858397" y="6724620"/>
             <a:ext cx="167561" cy="4430"/>
           </a:xfrm>
           <a:prstGeom prst="straightConnector1">
@@ -16562,10 +15049,10 @@
       </p:cxnSp>
       <p:cxnSp>
         <p:nvCxnSpPr>
-          <p:cNvPr id="480" name="Straight Arrow Connector 479">
+          <p:cNvPr id="483" name="Straight Arrow Connector 482">
             <a:extLst>
               <a:ext uri="{FF2B5EF4-FFF2-40B4-BE49-F238E27FC236}">
-                <a16:creationId xmlns:a16="http://schemas.microsoft.com/office/drawing/2014/main" id="{41BDD874-2A8F-5F24-917E-6A720BC4F947}"/>
+                <a16:creationId xmlns:a16="http://schemas.microsoft.com/office/drawing/2014/main" id="{4B4BC862-1168-7836-331C-15CAAF4AE5B4}"/>
               </a:ext>
             </a:extLst>
           </p:cNvPr>
@@ -16576,141 +15063,7 @@
         </p:nvCxnSpPr>
         <p:spPr>
           <a:xfrm>
-            <a:off x="11499971" y="7719276"/>
-            <a:ext cx="167561" cy="4430"/>
-          </a:xfrm>
-          <a:prstGeom prst="straightConnector1">
-            <a:avLst/>
-          </a:prstGeom>
-          <a:noFill/>
-          <a:ln w="12700" cap="flat">
-            <a:solidFill>
-              <a:srgbClr val="000000"/>
-            </a:solidFill>
-            <a:prstDash val="solid"/>
-            <a:miter lim="400000"/>
-            <a:tailEnd type="triangle"/>
-          </a:ln>
-          <a:effectLst/>
-          <a:sp3d/>
-        </p:spPr>
-        <p:style>
-          <a:lnRef idx="0">
-            <a:scrgbClr r="0" g="0" b="0"/>
-          </a:lnRef>
-          <a:fillRef idx="0">
-            <a:scrgbClr r="0" g="0" b="0"/>
-          </a:fillRef>
-          <a:effectRef idx="0">
-            <a:scrgbClr r="0" g="0" b="0"/>
-          </a:effectRef>
-          <a:fontRef idx="none"/>
-        </p:style>
-      </p:cxnSp>
-      <p:sp>
-        <p:nvSpPr>
-          <p:cNvPr id="482" name="Rectangle 481">
-            <a:extLst>
-              <a:ext uri="{FF2B5EF4-FFF2-40B4-BE49-F238E27FC236}">
-                <a16:creationId xmlns:a16="http://schemas.microsoft.com/office/drawing/2014/main" id="{F53488AE-298B-5D52-4E5F-CDB1266A9062}"/>
-              </a:ext>
-            </a:extLst>
-          </p:cNvPr>
-          <p:cNvSpPr/>
-          <p:nvPr/>
-        </p:nvSpPr>
-        <p:spPr>
-          <a:xfrm>
-            <a:off x="10918748" y="7383407"/>
-            <a:ext cx="2157867" cy="799189"/>
-          </a:xfrm>
-          <a:prstGeom prst="rect">
-            <a:avLst/>
-          </a:prstGeom>
-          <a:noFill/>
-          <a:ln w="12700" cap="flat">
-            <a:solidFill>
-              <a:schemeClr val="accent1"/>
-            </a:solidFill>
-            <a:miter lim="400000"/>
-          </a:ln>
-          <a:effectLst>
-            <a:outerShdw blurRad="38100" dist="25400" dir="5400000" rotWithShape="0">
-              <a:srgbClr val="000000">
-                <a:alpha val="50000"/>
-              </a:srgbClr>
-            </a:outerShdw>
-          </a:effectLst>
-          <a:sp3d/>
-        </p:spPr>
-        <p:style>
-          <a:lnRef idx="0">
-            <a:scrgbClr r="0" g="0" b="0"/>
-          </a:lnRef>
-          <a:fillRef idx="0">
-            <a:scrgbClr r="0" g="0" b="0"/>
-          </a:fillRef>
-          <a:effectRef idx="0">
-            <a:scrgbClr r="0" g="0" b="0"/>
-          </a:effectRef>
-          <a:fontRef idx="none"/>
-        </p:style>
-        <p:txBody>
-          <a:bodyPr rot="0" spcFirstLastPara="1" vertOverflow="overflow" horzOverflow="overflow" vert="horz" wrap="square" lIns="54570" tIns="54570" rIns="54570" bIns="54570" numCol="1" spcCol="38100" rtlCol="0" anchor="ctr">
-            <a:spAutoFit/>
-          </a:bodyPr>
-          <a:lstStyle/>
-          <a:p>
-            <a:pPr marL="0" marR="0" indent="0" algn="l" defTabSz="584200" rtl="0" fontAlgn="auto" latinLnBrk="0" hangingPunct="0">
-              <a:lnSpc>
-                <a:spcPct val="80000"/>
-              </a:lnSpc>
-              <a:spcBef>
-                <a:spcPts val="0"/>
-              </a:spcBef>
-              <a:spcAft>
-                <a:spcPts val="0"/>
-              </a:spcAft>
-              <a:buClrTx/>
-              <a:buSzTx/>
-              <a:buFontTx/>
-              <a:buNone/>
-              <a:tabLst/>
-            </a:pPr>
-            <a:endParaRPr kumimoji="0" lang="en-US" sz="1200" b="0" i="0" u="none" strike="noStrike" cap="none" spc="0" normalizeH="0" baseline="0">
-              <a:ln>
-                <a:noFill/>
-              </a:ln>
-              <a:solidFill>
-                <a:srgbClr val="000000"/>
-              </a:solidFill>
-              <a:effectLst/>
-              <a:uFillTx/>
-              <a:latin typeface="Source Sans Pro"/>
-              <a:ea typeface="Source Sans Pro"/>
-              <a:cs typeface="Source Sans Pro"/>
-              <a:sym typeface="Source Sans Pro"/>
-            </a:endParaRPr>
-          </a:p>
-        </p:txBody>
-      </p:sp>
-      <p:cxnSp>
-        <p:nvCxnSpPr>
-          <p:cNvPr id="483" name="Straight Arrow Connector 482">
-            <a:extLst>
-              <a:ext uri="{FF2B5EF4-FFF2-40B4-BE49-F238E27FC236}">
-                <a16:creationId xmlns:a16="http://schemas.microsoft.com/office/drawing/2014/main" id="{4B4BC862-1168-7836-331C-15CAAF4AE5B4}"/>
-              </a:ext>
-            </a:extLst>
-          </p:cNvPr>
-          <p:cNvCxnSpPr>
-            <a:cxnSpLocks/>
-          </p:cNvCxnSpPr>
-          <p:nvPr/>
-        </p:nvCxnSpPr>
-        <p:spPr>
-          <a:xfrm>
-            <a:off x="10568487" y="7235935"/>
+            <a:off x="10405459" y="7235935"/>
             <a:ext cx="222607" cy="227211"/>
           </a:xfrm>
           <a:prstGeom prst="straightConnector1">
@@ -16757,54 +15110,7 @@
         </p:nvCxnSpPr>
         <p:spPr>
           <a:xfrm>
-            <a:off x="12181273" y="6727044"/>
-            <a:ext cx="167561" cy="4430"/>
-          </a:xfrm>
-          <a:prstGeom prst="straightConnector1">
-            <a:avLst/>
-          </a:prstGeom>
-          <a:noFill/>
-          <a:ln w="12700" cap="flat">
-            <a:solidFill>
-              <a:srgbClr val="000000"/>
-            </a:solidFill>
-            <a:prstDash val="solid"/>
-            <a:miter lim="400000"/>
-            <a:tailEnd type="triangle"/>
-          </a:ln>
-          <a:effectLst/>
-          <a:sp3d/>
-        </p:spPr>
-        <p:style>
-          <a:lnRef idx="0">
-            <a:scrgbClr r="0" g="0" b="0"/>
-          </a:lnRef>
-          <a:fillRef idx="0">
-            <a:scrgbClr r="0" g="0" b="0"/>
-          </a:fillRef>
-          <a:effectRef idx="0">
-            <a:scrgbClr r="0" g="0" b="0"/>
-          </a:effectRef>
-          <a:fontRef idx="none"/>
-        </p:style>
-      </p:cxnSp>
-      <p:cxnSp>
-        <p:nvCxnSpPr>
-          <p:cNvPr id="485" name="Straight Arrow Connector 484">
-            <a:extLst>
-              <a:ext uri="{FF2B5EF4-FFF2-40B4-BE49-F238E27FC236}">
-                <a16:creationId xmlns:a16="http://schemas.microsoft.com/office/drawing/2014/main" id="{4451925F-C4D3-A875-78F3-8B43660F15AB}"/>
-              </a:ext>
-            </a:extLst>
-          </p:cNvPr>
-          <p:cNvCxnSpPr>
-            <a:cxnSpLocks/>
-          </p:cNvCxnSpPr>
-          <p:nvPr/>
-        </p:nvCxnSpPr>
-        <p:spPr>
-          <a:xfrm>
-            <a:off x="12201937" y="7714846"/>
+            <a:off x="12413702" y="6727044"/>
             <a:ext cx="167561" cy="4430"/>
           </a:xfrm>
           <a:prstGeom prst="straightConnector1">
@@ -16898,7 +15204,7 @@
         </p:nvCxnSpPr>
         <p:spPr>
           <a:xfrm>
-            <a:off x="13080279" y="7386965"/>
+            <a:off x="13073191" y="7386965"/>
             <a:ext cx="167561" cy="4430"/>
           </a:xfrm>
           <a:prstGeom prst="straightConnector1">
@@ -17112,93 +15418,6 @@
               </a:rPr>
               <a:t>serve as interface between Kaiāulu functions and external tools, allowing a subset of capabilities to be accessed via the command line in other languages.</a:t>
             </a:r>
-          </a:p>
-        </p:txBody>
-      </p:sp>
-      <p:sp>
-        <p:nvSpPr>
-          <p:cNvPr id="27" name="Rectangle 26">
-            <a:extLst>
-              <a:ext uri="{FF2B5EF4-FFF2-40B4-BE49-F238E27FC236}">
-                <a16:creationId xmlns:a16="http://schemas.microsoft.com/office/drawing/2014/main" id="{9C186F55-0A3C-D905-26B1-7928EA96F1A5}"/>
-              </a:ext>
-            </a:extLst>
-          </p:cNvPr>
-          <p:cNvSpPr/>
-          <p:nvPr/>
-        </p:nvSpPr>
-        <p:spPr>
-          <a:xfrm>
-            <a:off x="10918596" y="6341483"/>
-            <a:ext cx="2157867" cy="799189"/>
-          </a:xfrm>
-          <a:prstGeom prst="rect">
-            <a:avLst/>
-          </a:prstGeom>
-          <a:noFill/>
-          <a:ln w="12700" cap="flat">
-            <a:solidFill>
-              <a:schemeClr val="accent1"/>
-            </a:solidFill>
-            <a:miter lim="400000"/>
-          </a:ln>
-          <a:effectLst>
-            <a:outerShdw blurRad="38100" dist="25400" dir="5400000" rotWithShape="0">
-              <a:srgbClr val="000000">
-                <a:alpha val="50000"/>
-              </a:srgbClr>
-            </a:outerShdw>
-          </a:effectLst>
-          <a:sp3d/>
-        </p:spPr>
-        <p:style>
-          <a:lnRef idx="0">
-            <a:scrgbClr r="0" g="0" b="0"/>
-          </a:lnRef>
-          <a:fillRef idx="0">
-            <a:scrgbClr r="0" g="0" b="0"/>
-          </a:fillRef>
-          <a:effectRef idx="0">
-            <a:scrgbClr r="0" g="0" b="0"/>
-          </a:effectRef>
-          <a:fontRef idx="none"/>
-        </p:style>
-        <p:txBody>
-          <a:bodyPr rot="0" spcFirstLastPara="1" vertOverflow="overflow" horzOverflow="overflow" vert="horz" wrap="square" lIns="54570" tIns="54570" rIns="54570" bIns="54570" numCol="1" spcCol="38100" rtlCol="0" anchor="ctr">
-            <a:spAutoFit/>
-          </a:bodyPr>
-          <a:lstStyle/>
-          <a:p>
-            <a:pPr marL="0" marR="0" indent="0" algn="l" defTabSz="584200" rtl="0" fontAlgn="auto" latinLnBrk="0" hangingPunct="0">
-              <a:lnSpc>
-                <a:spcPct val="80000"/>
-              </a:lnSpc>
-              <a:spcBef>
-                <a:spcPts val="0"/>
-              </a:spcBef>
-              <a:spcAft>
-                <a:spcPts val="0"/>
-              </a:spcAft>
-              <a:buClrTx/>
-              <a:buSzTx/>
-              <a:buFontTx/>
-              <a:buNone/>
-              <a:tabLst/>
-            </a:pPr>
-            <a:endParaRPr kumimoji="0" lang="en-US" sz="1200" b="0" i="0" u="none" strike="noStrike" cap="none" spc="0" normalizeH="0" baseline="0">
-              <a:ln>
-                <a:noFill/>
-              </a:ln>
-              <a:solidFill>
-                <a:srgbClr val="000000"/>
-              </a:solidFill>
-              <a:effectLst/>
-              <a:uFillTx/>
-              <a:latin typeface="Source Sans Pro"/>
-              <a:ea typeface="Source Sans Pro"/>
-              <a:cs typeface="Source Sans Pro"/>
-              <a:sym typeface="Source Sans Pro"/>
-            </a:endParaRPr>
           </a:p>
         </p:txBody>
       </p:sp>
@@ -20593,6 +18812,2157 @@
               </a:rPr>
               <a:t>Analysis Output</a:t>
             </a:r>
+          </a:p>
+        </p:txBody>
+      </p:sp>
+      <p:sp>
+        <p:nvSpPr>
+          <p:cNvPr id="13" name="TextBox 12">
+            <a:extLst>
+              <a:ext uri="{FF2B5EF4-FFF2-40B4-BE49-F238E27FC236}">
+                <a16:creationId xmlns:a16="http://schemas.microsoft.com/office/drawing/2014/main" id="{9D40B8F4-6468-4B94-4619-144C3AFD935B}"/>
+              </a:ext>
+            </a:extLst>
+          </p:cNvPr>
+          <p:cNvSpPr txBox="1"/>
+          <p:nvPr/>
+        </p:nvSpPr>
+        <p:spPr>
+          <a:xfrm>
+            <a:off x="8932015" y="6578970"/>
+            <a:ext cx="1075025" cy="258964"/>
+          </a:xfrm>
+          <a:prstGeom prst="rect">
+            <a:avLst/>
+          </a:prstGeom>
+          <a:noFill/>
+          <a:ln w="12700" cap="flat">
+            <a:noFill/>
+            <a:miter lim="400000"/>
+          </a:ln>
+          <a:effectLst/>
+          <a:sp3d/>
+        </p:spPr>
+        <p:style>
+          <a:lnRef idx="0">
+            <a:scrgbClr r="0" g="0" b="0"/>
+          </a:lnRef>
+          <a:fillRef idx="0">
+            <a:scrgbClr r="0" g="0" b="0"/>
+          </a:fillRef>
+          <a:effectRef idx="0">
+            <a:scrgbClr r="0" g="0" b="0"/>
+          </a:effectRef>
+          <a:fontRef idx="none"/>
+        </p:style>
+        <p:txBody>
+          <a:bodyPr rot="0" spcFirstLastPara="1" vertOverflow="overflow" horzOverflow="overflow" vert="horz" wrap="square" lIns="54570" tIns="54570" rIns="54570" bIns="54570" numCol="1" spcCol="38100" rtlCol="0" anchor="ctr">
+            <a:spAutoFit/>
+          </a:bodyPr>
+          <a:lstStyle/>
+          <a:p>
+            <a:pPr marL="0" marR="0" indent="0" algn="l" defTabSz="584200" rtl="0" fontAlgn="auto" latinLnBrk="0" hangingPunct="0">
+              <a:lnSpc>
+                <a:spcPct val="100000"/>
+              </a:lnSpc>
+              <a:spcBef>
+                <a:spcPts val="200"/>
+              </a:spcBef>
+              <a:spcAft>
+                <a:spcPts val="0"/>
+              </a:spcAft>
+              <a:buClrTx/>
+              <a:buSzTx/>
+              <a:buFontTx/>
+              <a:buNone/>
+              <a:tabLst/>
+            </a:pPr>
+            <a:r>
+              <a:rPr lang="en-US" sz="800" b="0" dirty="0"/>
+              <a:t>kaiaulu</a:t>
+            </a:r>
+            <a:r>
+              <a:rPr kumimoji="0" lang="en-US" sz="800" b="0" i="0" u="none" strike="noStrike" cap="none" spc="0" normalizeH="0" baseline="0" dirty="0">
+                <a:ln>
+                  <a:noFill/>
+                </a:ln>
+                <a:solidFill>
+                  <a:srgbClr val="4C4C4C"/>
+                </a:solidFill>
+                <a:effectLst/>
+                <a:uFillTx/>
+                <a:latin typeface="Source Sans Pro"/>
+                <a:ea typeface="Source Sans Pro"/>
+                <a:cs typeface="Source Sans Pro"/>
+                <a:sym typeface="Source Sans Pro"/>
+              </a:rPr>
+              <a:t>_</a:t>
+            </a:r>
+            <a:r>
+              <a:rPr kumimoji="0" lang="en-US" sz="800" i="0" u="none" strike="noStrike" cap="none" spc="0" normalizeH="0" baseline="0" dirty="0">
+                <a:ln>
+                  <a:noFill/>
+                </a:ln>
+                <a:solidFill>
+                  <a:srgbClr val="4C4C4C"/>
+                </a:solidFill>
+                <a:effectLst/>
+                <a:uFillTx/>
+                <a:latin typeface="Source Sans Pro"/>
+                <a:ea typeface="Source Sans Pro"/>
+                <a:cs typeface="Source Sans Pro"/>
+                <a:sym typeface="Source Sans Pro"/>
+              </a:rPr>
+              <a:t>202410</a:t>
+            </a:r>
+            <a:r>
+              <a:rPr kumimoji="0" lang="en-US" sz="800" b="0" i="0" u="none" strike="noStrike" cap="none" spc="0" normalizeH="0" baseline="0" dirty="0">
+                <a:ln>
+                  <a:noFill/>
+                </a:ln>
+                <a:solidFill>
+                  <a:srgbClr val="4C4C4C"/>
+                </a:solidFill>
+                <a:effectLst/>
+                <a:uFillTx/>
+                <a:latin typeface="Source Sans Pro"/>
+                <a:ea typeface="Source Sans Pro"/>
+                <a:cs typeface="Source Sans Pro"/>
+                <a:sym typeface="Source Sans Pro"/>
+              </a:rPr>
+              <a:t>.mbox</a:t>
+            </a:r>
+          </a:p>
+        </p:txBody>
+      </p:sp>
+      <p:pic>
+        <p:nvPicPr>
+          <p:cNvPr id="15" name="Graphic 14" descr="Paper outline">
+            <a:extLst>
+              <a:ext uri="{FF2B5EF4-FFF2-40B4-BE49-F238E27FC236}">
+                <a16:creationId xmlns:a16="http://schemas.microsoft.com/office/drawing/2014/main" id="{E3AC43D7-093F-4EB5-452C-CB38436C0A69}"/>
+              </a:ext>
+            </a:extLst>
+          </p:cNvPr>
+          <p:cNvPicPr>
+            <a:picLocks noChangeAspect="1"/>
+          </p:cNvPicPr>
+          <p:nvPr/>
+        </p:nvPicPr>
+        <p:blipFill>
+          <a:blip r:embed="rId12">
+            <a:extLst>
+              <a:ext uri="{28A0092B-C50C-407E-A947-70E740481C1C}">
+                <a14:useLocalDpi xmlns:a14="http://schemas.microsoft.com/office/drawing/2010/main" val="0"/>
+              </a:ext>
+              <a:ext uri="{96DAC541-7B7A-43D3-8B79-37D633B846F1}">
+                <asvg:svgBlip xmlns:asvg="http://schemas.microsoft.com/office/drawing/2016/SVG/main" r:embed="rId13"/>
+              </a:ext>
+            </a:extLst>
+          </a:blip>
+          <a:stretch>
+            <a:fillRect/>
+          </a:stretch>
+        </p:blipFill>
+        <p:spPr>
+          <a:xfrm>
+            <a:off x="9180236" y="6151155"/>
+            <a:ext cx="527267" cy="527267"/>
+          </a:xfrm>
+          <a:prstGeom prst="rect">
+            <a:avLst/>
+          </a:prstGeom>
+        </p:spPr>
+      </p:pic>
+      <p:sp>
+        <p:nvSpPr>
+          <p:cNvPr id="21" name="TextBox 20">
+            <a:extLst>
+              <a:ext uri="{FF2B5EF4-FFF2-40B4-BE49-F238E27FC236}">
+                <a16:creationId xmlns:a16="http://schemas.microsoft.com/office/drawing/2014/main" id="{CF066A87-C848-B42E-E356-0982ACA7A663}"/>
+              </a:ext>
+            </a:extLst>
+          </p:cNvPr>
+          <p:cNvSpPr txBox="1"/>
+          <p:nvPr/>
+        </p:nvSpPr>
+        <p:spPr>
+          <a:xfrm>
+            <a:off x="8929315" y="7265788"/>
+            <a:ext cx="1093916" cy="258964"/>
+          </a:xfrm>
+          <a:prstGeom prst="rect">
+            <a:avLst/>
+          </a:prstGeom>
+          <a:noFill/>
+          <a:ln w="12700" cap="flat">
+            <a:noFill/>
+            <a:miter lim="400000"/>
+          </a:ln>
+          <a:effectLst/>
+          <a:sp3d/>
+        </p:spPr>
+        <p:style>
+          <a:lnRef idx="0">
+            <a:scrgbClr r="0" g="0" b="0"/>
+          </a:lnRef>
+          <a:fillRef idx="0">
+            <a:scrgbClr r="0" g="0" b="0"/>
+          </a:fillRef>
+          <a:effectRef idx="0">
+            <a:scrgbClr r="0" g="0" b="0"/>
+          </a:effectRef>
+          <a:fontRef idx="none"/>
+        </p:style>
+        <p:txBody>
+          <a:bodyPr rot="0" spcFirstLastPara="1" vertOverflow="overflow" horzOverflow="overflow" vert="horz" wrap="square" lIns="54570" tIns="54570" rIns="54570" bIns="54570" numCol="1" spcCol="38100" rtlCol="0" anchor="ctr">
+            <a:spAutoFit/>
+          </a:bodyPr>
+          <a:lstStyle/>
+          <a:p>
+            <a:pPr marL="0" marR="0" indent="0" algn="l" defTabSz="584200" rtl="0" fontAlgn="auto" latinLnBrk="0" hangingPunct="0">
+              <a:lnSpc>
+                <a:spcPct val="100000"/>
+              </a:lnSpc>
+              <a:spcBef>
+                <a:spcPts val="200"/>
+              </a:spcBef>
+              <a:spcAft>
+                <a:spcPts val="0"/>
+              </a:spcAft>
+              <a:buClrTx/>
+              <a:buSzTx/>
+              <a:buFontTx/>
+              <a:buNone/>
+              <a:tabLst/>
+            </a:pPr>
+            <a:r>
+              <a:rPr lang="en-US" sz="800" b="0" dirty="0"/>
+              <a:t>k</a:t>
+            </a:r>
+            <a:r>
+              <a:rPr kumimoji="0" lang="en-US" sz="800" b="0" i="0" u="none" strike="noStrike" cap="none" spc="0" normalizeH="0" baseline="0" dirty="0">
+                <a:ln>
+                  <a:noFill/>
+                </a:ln>
+                <a:solidFill>
+                  <a:srgbClr val="4C4C4C"/>
+                </a:solidFill>
+                <a:effectLst/>
+                <a:uFillTx/>
+                <a:sym typeface="Source Sans Pro"/>
+              </a:rPr>
+              <a:t>aiaulu_</a:t>
+            </a:r>
+            <a:r>
+              <a:rPr kumimoji="0" lang="en-US" sz="800" i="0" u="none" strike="noStrike" cap="none" spc="0" normalizeH="0" baseline="0" dirty="0">
+                <a:ln>
+                  <a:noFill/>
+                </a:ln>
+                <a:solidFill>
+                  <a:schemeClr val="tx1"/>
+                </a:solidFill>
+                <a:effectLst/>
+                <a:uFillTx/>
+                <a:sym typeface="Source Sans Pro"/>
+              </a:rPr>
+              <a:t>202411</a:t>
+            </a:r>
+            <a:r>
+              <a:rPr kumimoji="0" lang="en-US" sz="800" b="0" i="0" u="none" strike="noStrike" cap="none" spc="0" normalizeH="0" baseline="0" dirty="0">
+                <a:ln>
+                  <a:noFill/>
+                </a:ln>
+                <a:solidFill>
+                  <a:srgbClr val="4C4C4C"/>
+                </a:solidFill>
+                <a:effectLst/>
+                <a:uFillTx/>
+                <a:sym typeface="Source Sans Pro"/>
+              </a:rPr>
+              <a:t>.mbox</a:t>
+            </a:r>
+          </a:p>
+        </p:txBody>
+      </p:sp>
+      <p:pic>
+        <p:nvPicPr>
+          <p:cNvPr id="22" name="Graphic 21" descr="Paper outline">
+            <a:extLst>
+              <a:ext uri="{FF2B5EF4-FFF2-40B4-BE49-F238E27FC236}">
+                <a16:creationId xmlns:a16="http://schemas.microsoft.com/office/drawing/2014/main" id="{7B51269E-DCD1-75D7-81B7-8AA98CBCFD09}"/>
+              </a:ext>
+            </a:extLst>
+          </p:cNvPr>
+          <p:cNvPicPr>
+            <a:picLocks noChangeAspect="1"/>
+          </p:cNvPicPr>
+          <p:nvPr/>
+        </p:nvPicPr>
+        <p:blipFill>
+          <a:blip r:embed="rId12">
+            <a:extLst>
+              <a:ext uri="{28A0092B-C50C-407E-A947-70E740481C1C}">
+                <a14:useLocalDpi xmlns:a14="http://schemas.microsoft.com/office/drawing/2010/main" val="0"/>
+              </a:ext>
+              <a:ext uri="{96DAC541-7B7A-43D3-8B79-37D633B846F1}">
+                <asvg:svgBlip xmlns:asvg="http://schemas.microsoft.com/office/drawing/2016/SVG/main" r:embed="rId13"/>
+              </a:ext>
+            </a:extLst>
+          </a:blip>
+          <a:stretch>
+            <a:fillRect/>
+          </a:stretch>
+        </p:blipFill>
+        <p:spPr>
+          <a:xfrm>
+            <a:off x="9180035" y="6805926"/>
+            <a:ext cx="527267" cy="527267"/>
+          </a:xfrm>
+          <a:prstGeom prst="rect">
+            <a:avLst/>
+          </a:prstGeom>
+        </p:spPr>
+      </p:pic>
+      <p:sp>
+        <p:nvSpPr>
+          <p:cNvPr id="23" name="TextBox 22">
+            <a:extLst>
+              <a:ext uri="{FF2B5EF4-FFF2-40B4-BE49-F238E27FC236}">
+                <a16:creationId xmlns:a16="http://schemas.microsoft.com/office/drawing/2014/main" id="{FC1C9FDB-B21E-3612-13E3-4DACD5384525}"/>
+              </a:ext>
+            </a:extLst>
+          </p:cNvPr>
+          <p:cNvSpPr txBox="1"/>
+          <p:nvPr/>
+        </p:nvSpPr>
+        <p:spPr>
+          <a:xfrm>
+            <a:off x="8929315" y="7960535"/>
+            <a:ext cx="1087486" cy="258964"/>
+          </a:xfrm>
+          <a:prstGeom prst="rect">
+            <a:avLst/>
+          </a:prstGeom>
+          <a:noFill/>
+          <a:ln w="12700" cap="flat">
+            <a:noFill/>
+            <a:miter lim="400000"/>
+          </a:ln>
+          <a:effectLst/>
+          <a:sp3d/>
+        </p:spPr>
+        <p:style>
+          <a:lnRef idx="0">
+            <a:scrgbClr r="0" g="0" b="0"/>
+          </a:lnRef>
+          <a:fillRef idx="0">
+            <a:scrgbClr r="0" g="0" b="0"/>
+          </a:fillRef>
+          <a:effectRef idx="0">
+            <a:scrgbClr r="0" g="0" b="0"/>
+          </a:effectRef>
+          <a:fontRef idx="none"/>
+        </p:style>
+        <p:txBody>
+          <a:bodyPr rot="0" spcFirstLastPara="1" vertOverflow="overflow" horzOverflow="overflow" vert="horz" wrap="square" lIns="54570" tIns="54570" rIns="54570" bIns="54570" numCol="1" spcCol="38100" rtlCol="0" anchor="ctr">
+            <a:spAutoFit/>
+          </a:bodyPr>
+          <a:lstStyle/>
+          <a:p>
+            <a:pPr marL="0" marR="0" indent="0" algn="l" defTabSz="584200" rtl="0" fontAlgn="auto" latinLnBrk="0" hangingPunct="0">
+              <a:lnSpc>
+                <a:spcPct val="100000"/>
+              </a:lnSpc>
+              <a:spcBef>
+                <a:spcPts val="200"/>
+              </a:spcBef>
+              <a:spcAft>
+                <a:spcPts val="0"/>
+              </a:spcAft>
+              <a:buClrTx/>
+              <a:buSzTx/>
+              <a:buFontTx/>
+              <a:buNone/>
+              <a:tabLst/>
+            </a:pPr>
+            <a:r>
+              <a:rPr lang="en-US" sz="800" b="0" dirty="0"/>
+              <a:t>kaiaulu</a:t>
+            </a:r>
+            <a:r>
+              <a:rPr kumimoji="0" lang="en-US" sz="800" b="0" i="0" u="none" strike="noStrike" cap="none" spc="0" normalizeH="0" baseline="0" dirty="0">
+                <a:ln>
+                  <a:noFill/>
+                </a:ln>
+                <a:solidFill>
+                  <a:srgbClr val="4C4C4C"/>
+                </a:solidFill>
+                <a:effectLst/>
+                <a:uFillTx/>
+                <a:latin typeface="Source Sans Pro"/>
+                <a:ea typeface="Source Sans Pro"/>
+                <a:cs typeface="Source Sans Pro"/>
+                <a:sym typeface="Source Sans Pro"/>
+              </a:rPr>
+              <a:t>_</a:t>
+            </a:r>
+            <a:r>
+              <a:rPr kumimoji="0" lang="en-US" sz="800" i="0" u="none" strike="noStrike" cap="none" spc="0" normalizeH="0" baseline="0" dirty="0">
+                <a:ln>
+                  <a:noFill/>
+                </a:ln>
+                <a:solidFill>
+                  <a:srgbClr val="4C4C4C"/>
+                </a:solidFill>
+                <a:effectLst/>
+                <a:uFillTx/>
+                <a:latin typeface="Source Sans Pro"/>
+                <a:ea typeface="Source Sans Pro"/>
+                <a:cs typeface="Source Sans Pro"/>
+                <a:sym typeface="Source Sans Pro"/>
+              </a:rPr>
+              <a:t>202412</a:t>
+            </a:r>
+            <a:r>
+              <a:rPr kumimoji="0" lang="en-US" sz="800" b="0" i="0" u="none" strike="noStrike" cap="none" spc="0" normalizeH="0" baseline="0" dirty="0">
+                <a:ln>
+                  <a:noFill/>
+                </a:ln>
+                <a:solidFill>
+                  <a:srgbClr val="4C4C4C"/>
+                </a:solidFill>
+                <a:effectLst/>
+                <a:uFillTx/>
+                <a:latin typeface="Source Sans Pro"/>
+                <a:ea typeface="Source Sans Pro"/>
+                <a:cs typeface="Source Sans Pro"/>
+                <a:sym typeface="Source Sans Pro"/>
+              </a:rPr>
+              <a:t>.mbox</a:t>
+            </a:r>
+          </a:p>
+        </p:txBody>
+      </p:sp>
+      <p:pic>
+        <p:nvPicPr>
+          <p:cNvPr id="24" name="Graphic 23" descr="Paper outline">
+            <a:extLst>
+              <a:ext uri="{FF2B5EF4-FFF2-40B4-BE49-F238E27FC236}">
+                <a16:creationId xmlns:a16="http://schemas.microsoft.com/office/drawing/2014/main" id="{6CBDFF73-BC3E-3940-4DC8-C54E3D1F7AC2}"/>
+              </a:ext>
+            </a:extLst>
+          </p:cNvPr>
+          <p:cNvPicPr>
+            <a:picLocks noChangeAspect="1"/>
+          </p:cNvPicPr>
+          <p:nvPr/>
+        </p:nvPicPr>
+        <p:blipFill>
+          <a:blip r:embed="rId12">
+            <a:extLst>
+              <a:ext uri="{28A0092B-C50C-407E-A947-70E740481C1C}">
+                <a14:useLocalDpi xmlns:a14="http://schemas.microsoft.com/office/drawing/2010/main" val="0"/>
+              </a:ext>
+              <a:ext uri="{96DAC541-7B7A-43D3-8B79-37D633B846F1}">
+                <asvg:svgBlip xmlns:asvg="http://schemas.microsoft.com/office/drawing/2016/SVG/main" r:embed="rId13"/>
+              </a:ext>
+            </a:extLst>
+          </a:blip>
+          <a:stretch>
+            <a:fillRect/>
+          </a:stretch>
+        </p:blipFill>
+        <p:spPr>
+          <a:xfrm>
+            <a:off x="9179066" y="7488760"/>
+            <a:ext cx="527267" cy="527267"/>
+          </a:xfrm>
+          <a:prstGeom prst="rect">
+            <a:avLst/>
+          </a:prstGeom>
+        </p:spPr>
+      </p:pic>
+      <p:pic>
+        <p:nvPicPr>
+          <p:cNvPr id="26" name="Graphic 25" descr="Paper outline">
+            <a:extLst>
+              <a:ext uri="{FF2B5EF4-FFF2-40B4-BE49-F238E27FC236}">
+                <a16:creationId xmlns:a16="http://schemas.microsoft.com/office/drawing/2014/main" id="{C4A4496D-5B04-5E64-9EE4-A99F6DDE42B3}"/>
+              </a:ext>
+            </a:extLst>
+          </p:cNvPr>
+          <p:cNvPicPr>
+            <a:picLocks noChangeAspect="1"/>
+          </p:cNvPicPr>
+          <p:nvPr/>
+        </p:nvPicPr>
+        <p:blipFill>
+          <a:blip r:embed="rId12">
+            <a:extLst>
+              <a:ext uri="{28A0092B-C50C-407E-A947-70E740481C1C}">
+                <a14:useLocalDpi xmlns:a14="http://schemas.microsoft.com/office/drawing/2010/main" val="0"/>
+              </a:ext>
+              <a:ext uri="{96DAC541-7B7A-43D3-8B79-37D633B846F1}">
+                <asvg:svgBlip xmlns:asvg="http://schemas.microsoft.com/office/drawing/2016/SVG/main" r:embed="rId13"/>
+              </a:ext>
+            </a:extLst>
+          </a:blip>
+          <a:stretch>
+            <a:fillRect/>
+          </a:stretch>
+        </p:blipFill>
+        <p:spPr>
+          <a:xfrm>
+            <a:off x="10770193" y="6464166"/>
+            <a:ext cx="527267" cy="527267"/>
+          </a:xfrm>
+          <a:prstGeom prst="rect">
+            <a:avLst/>
+          </a:prstGeom>
+        </p:spPr>
+      </p:pic>
+      <p:sp>
+        <p:nvSpPr>
+          <p:cNvPr id="47" name="TextBox 46">
+            <a:extLst>
+              <a:ext uri="{FF2B5EF4-FFF2-40B4-BE49-F238E27FC236}">
+                <a16:creationId xmlns:a16="http://schemas.microsoft.com/office/drawing/2014/main" id="{21419341-B932-20A2-75E0-504D26E0CC6B}"/>
+              </a:ext>
+            </a:extLst>
+          </p:cNvPr>
+          <p:cNvSpPr txBox="1"/>
+          <p:nvPr/>
+        </p:nvSpPr>
+        <p:spPr>
+          <a:xfrm>
+            <a:off x="11325473" y="6890723"/>
+            <a:ext cx="781573" cy="258964"/>
+          </a:xfrm>
+          <a:prstGeom prst="rect">
+            <a:avLst/>
+          </a:prstGeom>
+          <a:noFill/>
+          <a:ln w="12700" cap="flat">
+            <a:noFill/>
+            <a:miter lim="400000"/>
+          </a:ln>
+          <a:effectLst/>
+          <a:sp3d/>
+        </p:spPr>
+        <p:style>
+          <a:lnRef idx="0">
+            <a:scrgbClr r="0" g="0" b="0"/>
+          </a:lnRef>
+          <a:fillRef idx="0">
+            <a:scrgbClr r="0" g="0" b="0"/>
+          </a:fillRef>
+          <a:effectRef idx="0">
+            <a:scrgbClr r="0" g="0" b="0"/>
+          </a:effectRef>
+          <a:fontRef idx="none"/>
+        </p:style>
+        <p:txBody>
+          <a:bodyPr rot="0" spcFirstLastPara="1" vertOverflow="overflow" horzOverflow="overflow" vert="horz" wrap="square" lIns="54570" tIns="54570" rIns="54570" bIns="54570" numCol="1" spcCol="38100" rtlCol="0" anchor="ctr">
+            <a:spAutoFit/>
+          </a:bodyPr>
+          <a:lstStyle/>
+          <a:p>
+            <a:pPr marL="0" marR="0" indent="0" algn="l" defTabSz="584200" rtl="0" fontAlgn="auto" latinLnBrk="0" hangingPunct="0">
+              <a:lnSpc>
+                <a:spcPct val="100000"/>
+              </a:lnSpc>
+              <a:spcBef>
+                <a:spcPts val="200"/>
+              </a:spcBef>
+              <a:spcAft>
+                <a:spcPts val="0"/>
+              </a:spcAft>
+              <a:buClrTx/>
+              <a:buSzTx/>
+              <a:buFontTx/>
+              <a:buNone/>
+              <a:tabLst/>
+            </a:pPr>
+            <a:r>
+              <a:rPr lang="en-US" sz="800" b="0" dirty="0" err="1"/>
+              <a:t>m</a:t>
+            </a:r>
+            <a:r>
+              <a:rPr kumimoji="0" lang="en-US" sz="800" b="0" i="0" u="none" strike="noStrike" cap="none" spc="0" normalizeH="0" baseline="0" dirty="0" err="1">
+                <a:ln>
+                  <a:noFill/>
+                </a:ln>
+                <a:solidFill>
+                  <a:srgbClr val="4C4C4C"/>
+                </a:solidFill>
+                <a:effectLst/>
+                <a:uFillTx/>
+                <a:latin typeface="Source Sans Pro"/>
+                <a:ea typeface="Source Sans Pro"/>
+                <a:cs typeface="Source Sans Pro"/>
+                <a:sym typeface="Source Sans Pro"/>
+              </a:rPr>
+              <a:t>ailinglist.R</a:t>
+            </a:r>
+            <a:endParaRPr kumimoji="0" lang="en-US" sz="800" b="0" i="0" u="none" strike="noStrike" cap="none" spc="0" normalizeH="0" baseline="0" dirty="0">
+              <a:ln>
+                <a:noFill/>
+              </a:ln>
+              <a:solidFill>
+                <a:srgbClr val="4C4C4C"/>
+              </a:solidFill>
+              <a:effectLst/>
+              <a:uFillTx/>
+              <a:latin typeface="Source Sans Pro"/>
+              <a:ea typeface="Source Sans Pro"/>
+              <a:cs typeface="Source Sans Pro"/>
+              <a:sym typeface="Source Sans Pro"/>
+            </a:endParaRPr>
+          </a:p>
+        </p:txBody>
+      </p:sp>
+      <p:sp>
+        <p:nvSpPr>
+          <p:cNvPr id="48" name="TextBox 47">
+            <a:extLst>
+              <a:ext uri="{FF2B5EF4-FFF2-40B4-BE49-F238E27FC236}">
+                <a16:creationId xmlns:a16="http://schemas.microsoft.com/office/drawing/2014/main" id="{8EFBF20C-9F16-016C-9E80-206897BF014B}"/>
+              </a:ext>
+            </a:extLst>
+          </p:cNvPr>
+          <p:cNvSpPr txBox="1"/>
+          <p:nvPr/>
+        </p:nvSpPr>
+        <p:spPr>
+          <a:xfrm>
+            <a:off x="11909754" y="6883635"/>
+            <a:ext cx="781573" cy="258964"/>
+          </a:xfrm>
+          <a:prstGeom prst="rect">
+            <a:avLst/>
+          </a:prstGeom>
+          <a:noFill/>
+          <a:ln w="12700" cap="flat">
+            <a:noFill/>
+            <a:miter lim="400000"/>
+          </a:ln>
+          <a:effectLst/>
+          <a:sp3d/>
+        </p:spPr>
+        <p:style>
+          <a:lnRef idx="0">
+            <a:scrgbClr r="0" g="0" b="0"/>
+          </a:lnRef>
+          <a:fillRef idx="0">
+            <a:scrgbClr r="0" g="0" b="0"/>
+          </a:fillRef>
+          <a:effectRef idx="0">
+            <a:scrgbClr r="0" g="0" b="0"/>
+          </a:effectRef>
+          <a:fontRef idx="none"/>
+        </p:style>
+        <p:txBody>
+          <a:bodyPr rot="0" spcFirstLastPara="1" vertOverflow="overflow" horzOverflow="overflow" vert="horz" wrap="square" lIns="54570" tIns="54570" rIns="54570" bIns="54570" numCol="1" spcCol="38100" rtlCol="0" anchor="ctr">
+            <a:spAutoFit/>
+          </a:bodyPr>
+          <a:lstStyle/>
+          <a:p>
+            <a:pPr marL="0" marR="0" indent="0" algn="l" defTabSz="584200" rtl="0" fontAlgn="auto" latinLnBrk="0" hangingPunct="0">
+              <a:lnSpc>
+                <a:spcPct val="100000"/>
+              </a:lnSpc>
+              <a:spcBef>
+                <a:spcPts val="200"/>
+              </a:spcBef>
+              <a:spcAft>
+                <a:spcPts val="0"/>
+              </a:spcAft>
+              <a:buClrTx/>
+              <a:buSzTx/>
+              <a:buFontTx/>
+              <a:buNone/>
+              <a:tabLst/>
+            </a:pPr>
+            <a:r>
+              <a:rPr lang="en-US" sz="800" b="0" dirty="0" err="1"/>
+              <a:t>parse_mbox</a:t>
+            </a:r>
+            <a:r>
+              <a:rPr lang="en-US" sz="800" b="0" dirty="0"/>
+              <a:t>()</a:t>
+            </a:r>
+            <a:endParaRPr kumimoji="0" lang="en-US" sz="800" b="0" i="0" u="none" strike="noStrike" cap="none" spc="0" normalizeH="0" baseline="0" dirty="0">
+              <a:ln>
+                <a:noFill/>
+              </a:ln>
+              <a:solidFill>
+                <a:srgbClr val="4C4C4C"/>
+              </a:solidFill>
+              <a:effectLst/>
+              <a:uFillTx/>
+              <a:latin typeface="Source Sans Pro"/>
+              <a:ea typeface="Source Sans Pro"/>
+              <a:cs typeface="Source Sans Pro"/>
+              <a:sym typeface="Source Sans Pro"/>
+            </a:endParaRPr>
+          </a:p>
+        </p:txBody>
+      </p:sp>
+      <p:sp>
+        <p:nvSpPr>
+          <p:cNvPr id="49" name="TextBox 48">
+            <a:extLst>
+              <a:ext uri="{FF2B5EF4-FFF2-40B4-BE49-F238E27FC236}">
+                <a16:creationId xmlns:a16="http://schemas.microsoft.com/office/drawing/2014/main" id="{65D6E084-DADC-C8E1-11F2-3E9AF798902D}"/>
+              </a:ext>
+            </a:extLst>
+          </p:cNvPr>
+          <p:cNvSpPr txBox="1"/>
+          <p:nvPr/>
+        </p:nvSpPr>
+        <p:spPr>
+          <a:xfrm>
+            <a:off x="10707134" y="6892779"/>
+            <a:ext cx="745139" cy="258964"/>
+          </a:xfrm>
+          <a:prstGeom prst="rect">
+            <a:avLst/>
+          </a:prstGeom>
+          <a:noFill/>
+          <a:ln w="12700" cap="flat">
+            <a:noFill/>
+            <a:miter lim="400000"/>
+          </a:ln>
+          <a:effectLst/>
+          <a:sp3d/>
+        </p:spPr>
+        <p:style>
+          <a:lnRef idx="0">
+            <a:scrgbClr r="0" g="0" b="0"/>
+          </a:lnRef>
+          <a:fillRef idx="0">
+            <a:scrgbClr r="0" g="0" b="0"/>
+          </a:fillRef>
+          <a:effectRef idx="0">
+            <a:scrgbClr r="0" g="0" b="0"/>
+          </a:effectRef>
+          <a:fontRef idx="none"/>
+        </p:style>
+        <p:txBody>
+          <a:bodyPr rot="0" spcFirstLastPara="1" vertOverflow="overflow" horzOverflow="overflow" vert="horz" wrap="square" lIns="54570" tIns="54570" rIns="54570" bIns="54570" numCol="1" spcCol="38100" rtlCol="0" anchor="ctr">
+            <a:spAutoFit/>
+          </a:bodyPr>
+          <a:lstStyle/>
+          <a:p>
+            <a:pPr marL="0" marR="0" indent="0" algn="l" defTabSz="584200" rtl="0" fontAlgn="auto" latinLnBrk="0" hangingPunct="0">
+              <a:lnSpc>
+                <a:spcPct val="100000"/>
+              </a:lnSpc>
+              <a:spcBef>
+                <a:spcPts val="200"/>
+              </a:spcBef>
+              <a:spcAft>
+                <a:spcPts val="0"/>
+              </a:spcAft>
+              <a:buClrTx/>
+              <a:buSzTx/>
+              <a:buFontTx/>
+              <a:buNone/>
+              <a:tabLst/>
+            </a:pPr>
+            <a:r>
+              <a:rPr kumimoji="0" lang="en-US" sz="800" i="0" u="none" strike="noStrike" cap="none" spc="0" normalizeH="0" baseline="0" dirty="0">
+                <a:ln>
+                  <a:noFill/>
+                </a:ln>
+                <a:solidFill>
+                  <a:srgbClr val="4C4C4C"/>
+                </a:solidFill>
+                <a:effectLst/>
+                <a:uFillTx/>
+                <a:latin typeface="Source Sans Pro"/>
+                <a:ea typeface="Source Sans Pro"/>
+                <a:cs typeface="Source Sans Pro"/>
+                <a:sym typeface="Source Sans Pro"/>
+              </a:rPr>
+              <a:t>202410</a:t>
+            </a:r>
+            <a:r>
+              <a:rPr kumimoji="0" lang="en-US" sz="800" b="0" i="0" u="none" strike="noStrike" cap="none" spc="0" normalizeH="0" baseline="0" dirty="0">
+                <a:ln>
+                  <a:noFill/>
+                </a:ln>
+                <a:solidFill>
+                  <a:srgbClr val="4C4C4C"/>
+                </a:solidFill>
+                <a:effectLst/>
+                <a:uFillTx/>
+                <a:latin typeface="Source Sans Pro"/>
+                <a:ea typeface="Source Sans Pro"/>
+                <a:cs typeface="Source Sans Pro"/>
+                <a:sym typeface="Source Sans Pro"/>
+              </a:rPr>
+              <a:t>.mbox</a:t>
+            </a:r>
+          </a:p>
+        </p:txBody>
+      </p:sp>
+      <p:cxnSp>
+        <p:nvCxnSpPr>
+          <p:cNvPr id="458" name="Straight Arrow Connector 457">
+            <a:extLst>
+              <a:ext uri="{FF2B5EF4-FFF2-40B4-BE49-F238E27FC236}">
+                <a16:creationId xmlns:a16="http://schemas.microsoft.com/office/drawing/2014/main" id="{56BEE57D-8C03-F458-A549-B98604E7E893}"/>
+              </a:ext>
+            </a:extLst>
+          </p:cNvPr>
+          <p:cNvCxnSpPr>
+            <a:cxnSpLocks/>
+          </p:cNvCxnSpPr>
+          <p:nvPr/>
+        </p:nvCxnSpPr>
+        <p:spPr>
+          <a:xfrm>
+            <a:off x="11262131" y="6725564"/>
+            <a:ext cx="167561" cy="4430"/>
+          </a:xfrm>
+          <a:prstGeom prst="straightConnector1">
+            <a:avLst/>
+          </a:prstGeom>
+          <a:noFill/>
+          <a:ln w="12700" cap="flat">
+            <a:solidFill>
+              <a:srgbClr val="000000"/>
+            </a:solidFill>
+            <a:prstDash val="solid"/>
+            <a:miter lim="400000"/>
+            <a:tailEnd type="triangle"/>
+          </a:ln>
+          <a:effectLst/>
+          <a:sp3d/>
+        </p:spPr>
+        <p:style>
+          <a:lnRef idx="0">
+            <a:scrgbClr r="0" g="0" b="0"/>
+          </a:lnRef>
+          <a:fillRef idx="0">
+            <a:scrgbClr r="0" g="0" b="0"/>
+          </a:fillRef>
+          <a:effectRef idx="0">
+            <a:scrgbClr r="0" g="0" b="0"/>
+          </a:effectRef>
+          <a:fontRef idx="none"/>
+        </p:style>
+      </p:cxnSp>
+      <p:sp>
+        <p:nvSpPr>
+          <p:cNvPr id="459" name="Rectangle 458">
+            <a:extLst>
+              <a:ext uri="{FF2B5EF4-FFF2-40B4-BE49-F238E27FC236}">
+                <a16:creationId xmlns:a16="http://schemas.microsoft.com/office/drawing/2014/main" id="{AA7300E8-BEDA-5082-1974-A38BFB8BDA35}"/>
+              </a:ext>
+            </a:extLst>
+          </p:cNvPr>
+          <p:cNvSpPr/>
+          <p:nvPr/>
+        </p:nvSpPr>
+        <p:spPr>
+          <a:xfrm>
+            <a:off x="10700238" y="6283327"/>
+            <a:ext cx="2365131" cy="899988"/>
+          </a:xfrm>
+          <a:prstGeom prst="rect">
+            <a:avLst/>
+          </a:prstGeom>
+          <a:noFill/>
+          <a:ln w="12700" cap="flat">
+            <a:solidFill>
+              <a:schemeClr val="accent1"/>
+            </a:solidFill>
+            <a:miter lim="400000"/>
+          </a:ln>
+          <a:effectLst>
+            <a:outerShdw blurRad="38100" dist="25400" dir="5400000" rotWithShape="0">
+              <a:srgbClr val="000000">
+                <a:alpha val="50000"/>
+              </a:srgbClr>
+            </a:outerShdw>
+          </a:effectLst>
+          <a:sp3d/>
+        </p:spPr>
+        <p:style>
+          <a:lnRef idx="0">
+            <a:scrgbClr r="0" g="0" b="0"/>
+          </a:lnRef>
+          <a:fillRef idx="0">
+            <a:scrgbClr r="0" g="0" b="0"/>
+          </a:fillRef>
+          <a:effectRef idx="0">
+            <a:scrgbClr r="0" g="0" b="0"/>
+          </a:effectRef>
+          <a:fontRef idx="none"/>
+        </p:style>
+        <p:txBody>
+          <a:bodyPr rot="0" spcFirstLastPara="1" vertOverflow="overflow" horzOverflow="overflow" vert="horz" wrap="square" lIns="54570" tIns="54570" rIns="54570" bIns="54570" numCol="1" spcCol="38100" rtlCol="0" anchor="ctr">
+            <a:spAutoFit/>
+          </a:bodyPr>
+          <a:lstStyle/>
+          <a:p>
+            <a:pPr marL="0" marR="0" indent="0" algn="l" defTabSz="584200" rtl="0" fontAlgn="auto" latinLnBrk="0" hangingPunct="0">
+              <a:lnSpc>
+                <a:spcPct val="80000"/>
+              </a:lnSpc>
+              <a:spcBef>
+                <a:spcPts val="0"/>
+              </a:spcBef>
+              <a:spcAft>
+                <a:spcPts val="0"/>
+              </a:spcAft>
+              <a:buClrTx/>
+              <a:buSzTx/>
+              <a:buFontTx/>
+              <a:buNone/>
+              <a:tabLst/>
+            </a:pPr>
+            <a:endParaRPr kumimoji="0" lang="en-US" sz="1200" b="0" i="0" u="none" strike="noStrike" cap="none" spc="0" normalizeH="0" baseline="0" dirty="0">
+              <a:ln>
+                <a:noFill/>
+              </a:ln>
+              <a:solidFill>
+                <a:srgbClr val="000000"/>
+              </a:solidFill>
+              <a:effectLst/>
+              <a:uFillTx/>
+              <a:latin typeface="Source Sans Pro"/>
+              <a:ea typeface="Source Sans Pro"/>
+              <a:cs typeface="Source Sans Pro"/>
+              <a:sym typeface="Source Sans Pro"/>
+            </a:endParaRPr>
+          </a:p>
+        </p:txBody>
+      </p:sp>
+      <p:pic>
+        <p:nvPicPr>
+          <p:cNvPr id="481" name="Graphic 480" descr="Paper outline">
+            <a:extLst>
+              <a:ext uri="{FF2B5EF4-FFF2-40B4-BE49-F238E27FC236}">
+                <a16:creationId xmlns:a16="http://schemas.microsoft.com/office/drawing/2014/main" id="{F6F2F3EC-4D74-D415-C28A-FD46070895EB}"/>
+              </a:ext>
+            </a:extLst>
+          </p:cNvPr>
+          <p:cNvPicPr>
+            <a:picLocks noChangeAspect="1"/>
+          </p:cNvPicPr>
+          <p:nvPr/>
+        </p:nvPicPr>
+        <p:blipFill>
+          <a:blip r:embed="rId12">
+            <a:extLst>
+              <a:ext uri="{28A0092B-C50C-407E-A947-70E740481C1C}">
+                <a14:useLocalDpi xmlns:a14="http://schemas.microsoft.com/office/drawing/2010/main" val="0"/>
+              </a:ext>
+              <a:ext uri="{96DAC541-7B7A-43D3-8B79-37D633B846F1}">
+                <asvg:svgBlip xmlns:asvg="http://schemas.microsoft.com/office/drawing/2016/SVG/main" r:embed="rId13"/>
+              </a:ext>
+            </a:extLst>
+          </a:blip>
+          <a:stretch>
+            <a:fillRect/>
+          </a:stretch>
+        </p:blipFill>
+        <p:spPr>
+          <a:xfrm>
+            <a:off x="11378995" y="7518941"/>
+            <a:ext cx="527267" cy="527267"/>
+          </a:xfrm>
+          <a:prstGeom prst="rect">
+            <a:avLst/>
+          </a:prstGeom>
+        </p:spPr>
+      </p:pic>
+      <p:sp>
+        <p:nvSpPr>
+          <p:cNvPr id="490" name="TextBox 489">
+            <a:extLst>
+              <a:ext uri="{FF2B5EF4-FFF2-40B4-BE49-F238E27FC236}">
+                <a16:creationId xmlns:a16="http://schemas.microsoft.com/office/drawing/2014/main" id="{1F3B287A-6356-C4DF-8DD5-F5C716FA407E}"/>
+              </a:ext>
+            </a:extLst>
+          </p:cNvPr>
+          <p:cNvSpPr txBox="1"/>
+          <p:nvPr/>
+        </p:nvSpPr>
+        <p:spPr>
+          <a:xfrm>
+            <a:off x="11482902" y="7656084"/>
+            <a:ext cx="319451" cy="258964"/>
+          </a:xfrm>
+          <a:prstGeom prst="rect">
+            <a:avLst/>
+          </a:prstGeom>
+          <a:noFill/>
+          <a:ln w="12700" cap="flat">
+            <a:noFill/>
+            <a:miter lim="400000"/>
+          </a:ln>
+          <a:effectLst/>
+          <a:sp3d/>
+        </p:spPr>
+        <p:style>
+          <a:lnRef idx="0">
+            <a:scrgbClr r="0" g="0" b="0"/>
+          </a:lnRef>
+          <a:fillRef idx="0">
+            <a:scrgbClr r="0" g="0" b="0"/>
+          </a:fillRef>
+          <a:effectRef idx="0">
+            <a:scrgbClr r="0" g="0" b="0"/>
+          </a:effectRef>
+          <a:fontRef idx="none"/>
+        </p:style>
+        <p:txBody>
+          <a:bodyPr rot="0" spcFirstLastPara="1" vertOverflow="overflow" horzOverflow="overflow" vert="horz" wrap="square" lIns="54570" tIns="54570" rIns="54570" bIns="54570" numCol="1" spcCol="38100" rtlCol="0" anchor="ctr">
+            <a:spAutoFit/>
+          </a:bodyPr>
+          <a:lstStyle/>
+          <a:p>
+            <a:pPr marL="0" marR="0" indent="0" algn="l" defTabSz="584200" rtl="0" fontAlgn="auto" latinLnBrk="0" hangingPunct="0">
+              <a:lnSpc>
+                <a:spcPct val="100000"/>
+              </a:lnSpc>
+              <a:spcBef>
+                <a:spcPts val="200"/>
+              </a:spcBef>
+              <a:spcAft>
+                <a:spcPts val="0"/>
+              </a:spcAft>
+              <a:buClrTx/>
+              <a:buSzTx/>
+              <a:buFontTx/>
+              <a:buNone/>
+              <a:tabLst/>
+            </a:pPr>
+            <a:r>
+              <a:rPr lang="en-US" sz="800" b="0" dirty="0">
+                <a:solidFill>
+                  <a:schemeClr val="accent1"/>
+                </a:solidFill>
+              </a:rPr>
+              <a:t>exec</a:t>
+            </a:r>
+            <a:endParaRPr kumimoji="0" lang="en-US" sz="800" b="0" i="0" u="none" strike="noStrike" cap="none" spc="0" normalizeH="0" baseline="0" dirty="0">
+              <a:ln>
+                <a:noFill/>
+              </a:ln>
+              <a:solidFill>
+                <a:schemeClr val="accent1"/>
+              </a:solidFill>
+              <a:effectLst/>
+              <a:uFillTx/>
+              <a:latin typeface="Source Sans Pro"/>
+              <a:ea typeface="Source Sans Pro"/>
+              <a:cs typeface="Source Sans Pro"/>
+              <a:sym typeface="Source Sans Pro"/>
+            </a:endParaRPr>
+          </a:p>
+        </p:txBody>
+      </p:sp>
+      <p:pic>
+        <p:nvPicPr>
+          <p:cNvPr id="491" name="Graphic 490" descr="Paper outline">
+            <a:extLst>
+              <a:ext uri="{FF2B5EF4-FFF2-40B4-BE49-F238E27FC236}">
+                <a16:creationId xmlns:a16="http://schemas.microsoft.com/office/drawing/2014/main" id="{D0A6C14A-1321-777B-FD90-9CBC75D8CDA8}"/>
+              </a:ext>
+            </a:extLst>
+          </p:cNvPr>
+          <p:cNvPicPr>
+            <a:picLocks noChangeAspect="1"/>
+          </p:cNvPicPr>
+          <p:nvPr/>
+        </p:nvPicPr>
+        <p:blipFill>
+          <a:blip r:embed="rId12">
+            <a:extLst>
+              <a:ext uri="{28A0092B-C50C-407E-A947-70E740481C1C}">
+                <a14:useLocalDpi xmlns:a14="http://schemas.microsoft.com/office/drawing/2010/main" val="0"/>
+              </a:ext>
+              <a:ext uri="{96DAC541-7B7A-43D3-8B79-37D633B846F1}">
+                <asvg:svgBlip xmlns:asvg="http://schemas.microsoft.com/office/drawing/2016/SVG/main" r:embed="rId13"/>
+              </a:ext>
+            </a:extLst>
+          </a:blip>
+          <a:stretch>
+            <a:fillRect/>
+          </a:stretch>
+        </p:blipFill>
+        <p:spPr>
+          <a:xfrm>
+            <a:off x="11958263" y="7515799"/>
+            <a:ext cx="527267" cy="527267"/>
+          </a:xfrm>
+          <a:prstGeom prst="rect">
+            <a:avLst/>
+          </a:prstGeom>
+        </p:spPr>
+      </p:pic>
+      <p:sp>
+        <p:nvSpPr>
+          <p:cNvPr id="494" name="TextBox 493">
+            <a:extLst>
+              <a:ext uri="{FF2B5EF4-FFF2-40B4-BE49-F238E27FC236}">
+                <a16:creationId xmlns:a16="http://schemas.microsoft.com/office/drawing/2014/main" id="{1F44BBB8-10D4-8C7A-97B9-DF4402D696BB}"/>
+              </a:ext>
+            </a:extLst>
+          </p:cNvPr>
+          <p:cNvSpPr txBox="1"/>
+          <p:nvPr/>
+        </p:nvSpPr>
+        <p:spPr>
+          <a:xfrm>
+            <a:off x="12037499" y="7659736"/>
+            <a:ext cx="423360" cy="258964"/>
+          </a:xfrm>
+          <a:prstGeom prst="rect">
+            <a:avLst/>
+          </a:prstGeom>
+          <a:noFill/>
+          <a:ln w="12700" cap="flat">
+            <a:noFill/>
+            <a:miter lim="400000"/>
+          </a:ln>
+          <a:effectLst/>
+          <a:sp3d/>
+        </p:spPr>
+        <p:style>
+          <a:lnRef idx="0">
+            <a:scrgbClr r="0" g="0" b="0"/>
+          </a:lnRef>
+          <a:fillRef idx="0">
+            <a:scrgbClr r="0" g="0" b="0"/>
+          </a:fillRef>
+          <a:effectRef idx="0">
+            <a:scrgbClr r="0" g="0" b="0"/>
+          </a:effectRef>
+          <a:fontRef idx="none"/>
+        </p:style>
+        <p:txBody>
+          <a:bodyPr rot="0" spcFirstLastPara="1" vertOverflow="overflow" horzOverflow="overflow" vert="horz" wrap="square" lIns="54570" tIns="54570" rIns="54570" bIns="54570" numCol="1" spcCol="38100" rtlCol="0" anchor="ctr">
+            <a:spAutoFit/>
+          </a:bodyPr>
+          <a:lstStyle/>
+          <a:p>
+            <a:pPr marL="0" marR="0" indent="0" algn="l" defTabSz="584200" rtl="0" fontAlgn="auto" latinLnBrk="0" hangingPunct="0">
+              <a:lnSpc>
+                <a:spcPct val="100000"/>
+              </a:lnSpc>
+              <a:spcBef>
+                <a:spcPts val="200"/>
+              </a:spcBef>
+              <a:spcAft>
+                <a:spcPts val="0"/>
+              </a:spcAft>
+              <a:buClrTx/>
+              <a:buSzTx/>
+              <a:buFontTx/>
+              <a:buNone/>
+              <a:tabLst/>
+            </a:pPr>
+            <a:r>
+              <a:rPr lang="en-US" sz="800" b="0" dirty="0" err="1"/>
+              <a:t>mail.R</a:t>
+            </a:r>
+            <a:endParaRPr kumimoji="0" lang="en-US" sz="800" b="0" i="0" u="none" strike="noStrike" cap="none" spc="0" normalizeH="0" baseline="0" dirty="0">
+              <a:ln>
+                <a:noFill/>
+              </a:ln>
+              <a:solidFill>
+                <a:srgbClr val="4C4C4C"/>
+              </a:solidFill>
+              <a:effectLst/>
+              <a:uFillTx/>
+              <a:latin typeface="Source Sans Pro"/>
+              <a:ea typeface="Source Sans Pro"/>
+              <a:cs typeface="Source Sans Pro"/>
+              <a:sym typeface="Source Sans Pro"/>
+            </a:endParaRPr>
+          </a:p>
+        </p:txBody>
+      </p:sp>
+      <p:graphicFrame>
+        <p:nvGraphicFramePr>
+          <p:cNvPr id="497" name="Table">
+            <a:extLst>
+              <a:ext uri="{FF2B5EF4-FFF2-40B4-BE49-F238E27FC236}">
+                <a16:creationId xmlns:a16="http://schemas.microsoft.com/office/drawing/2014/main" id="{A82139C6-D13A-C777-620F-3C8EDE0A8A69}"/>
+              </a:ext>
+            </a:extLst>
+          </p:cNvPr>
+          <p:cNvGraphicFramePr/>
+          <p:nvPr>
+            <p:extLst>
+              <p:ext uri="{D42A27DB-BD31-4B8C-83A1-F6EECF244321}">
+                <p14:modId xmlns:p14="http://schemas.microsoft.com/office/powerpoint/2010/main" val="2910518981"/>
+              </p:ext>
+            </p:extLst>
+          </p:nvPr>
+        </p:nvGraphicFramePr>
+        <p:xfrm>
+          <a:off x="12618685" y="7584815"/>
+          <a:ext cx="369704" cy="373251"/>
+        </p:xfrm>
+        <a:graphic>
+          <a:graphicData uri="http://schemas.openxmlformats.org/drawingml/2006/table">
+            <a:tbl>
+              <a:tblPr firstRow="1">
+                <a:tableStyleId>{4C3C2611-4C71-4FC5-86AE-919BDF0F9419}</a:tableStyleId>
+              </a:tblPr>
+              <a:tblGrid>
+                <a:gridCol w="184852">
+                  <a:extLst>
+                    <a:ext uri="{9D8B030D-6E8A-4147-A177-3AD203B41FA5}">
+                      <a16:colId xmlns:a16="http://schemas.microsoft.com/office/drawing/2014/main" val="20000"/>
+                    </a:ext>
+                  </a:extLst>
+                </a:gridCol>
+                <a:gridCol w="184852">
+                  <a:extLst>
+                    <a:ext uri="{9D8B030D-6E8A-4147-A177-3AD203B41FA5}">
+                      <a16:colId xmlns:a16="http://schemas.microsoft.com/office/drawing/2014/main" val="20001"/>
+                    </a:ext>
+                  </a:extLst>
+                </a:gridCol>
+              </a:tblGrid>
+              <a:tr h="124417">
+                <a:tc>
+                  <a:txBody>
+                    <a:bodyPr/>
+                    <a:lstStyle/>
+                    <a:p>
+                      <a:pPr defTabSz="914400">
+                        <a:defRPr sz="700" b="0">
+                          <a:latin typeface="+mj-lt"/>
+                          <a:ea typeface="+mj-ea"/>
+                          <a:cs typeface="+mj-cs"/>
+                          <a:sym typeface="Source Sans Pro Regular"/>
+                        </a:defRPr>
+                      </a:pPr>
+                      <a:endParaRPr dirty="0">
+                        <a:noFill/>
+                      </a:endParaRPr>
+                    </a:p>
+                  </a:txBody>
+                  <a:tcPr marL="0" marR="0" marT="0" marB="0" anchor="ctr" horzOverflow="overflow">
+                    <a:lnL w="12700" cap="flat" cmpd="sng" algn="ctr">
+                      <a:solidFill>
+                        <a:schemeClr val="bg1"/>
+                      </a:solidFill>
+                      <a:prstDash val="solid"/>
+                      <a:round/>
+                      <a:headEnd type="none" w="med" len="med"/>
+                      <a:tailEnd type="none" w="med" len="med"/>
+                    </a:lnL>
+                    <a:lnR w="12700" cap="flat" cmpd="sng" algn="ctr">
+                      <a:solidFill>
+                        <a:schemeClr val="bg1"/>
+                      </a:solidFill>
+                      <a:prstDash val="solid"/>
+                      <a:round/>
+                      <a:headEnd type="none" w="med" len="med"/>
+                      <a:tailEnd type="none" w="med" len="med"/>
+                    </a:lnR>
+                    <a:lnT w="12700" cap="flat" cmpd="sng" algn="ctr">
+                      <a:solidFill>
+                        <a:schemeClr val="bg1"/>
+                      </a:solidFill>
+                      <a:prstDash val="solid"/>
+                      <a:round/>
+                      <a:headEnd type="none" w="med" len="med"/>
+                      <a:tailEnd type="none" w="med" len="med"/>
+                    </a:lnT>
+                    <a:lnB w="12700" cap="flat" cmpd="sng" algn="ctr">
+                      <a:solidFill>
+                        <a:schemeClr val="bg1"/>
+                      </a:solidFill>
+                      <a:prstDash val="solid"/>
+                      <a:round/>
+                      <a:headEnd type="none" w="med" len="med"/>
+                      <a:tailEnd type="none" w="med" len="med"/>
+                    </a:lnB>
+                    <a:solidFill>
+                      <a:srgbClr val="C1C1C0"/>
+                    </a:solidFill>
+                  </a:tcPr>
+                </a:tc>
+                <a:tc>
+                  <a:txBody>
+                    <a:bodyPr/>
+                    <a:lstStyle/>
+                    <a:p>
+                      <a:pPr defTabSz="914400">
+                        <a:defRPr sz="700" b="0">
+                          <a:latin typeface="+mj-lt"/>
+                          <a:ea typeface="+mj-ea"/>
+                          <a:cs typeface="+mj-cs"/>
+                          <a:sym typeface="Source Sans Pro Regular"/>
+                        </a:defRPr>
+                      </a:pPr>
+                      <a:endParaRPr dirty="0">
+                        <a:noFill/>
+                      </a:endParaRPr>
+                    </a:p>
+                  </a:txBody>
+                  <a:tcPr marL="0" marR="0" marT="0" marB="0" anchor="ctr" horzOverflow="overflow">
+                    <a:lnL w="12700" cap="flat" cmpd="sng" algn="ctr">
+                      <a:solidFill>
+                        <a:schemeClr val="bg1"/>
+                      </a:solidFill>
+                      <a:prstDash val="solid"/>
+                      <a:round/>
+                      <a:headEnd type="none" w="med" len="med"/>
+                      <a:tailEnd type="none" w="med" len="med"/>
+                    </a:lnL>
+                    <a:lnR w="12700" cap="flat" cmpd="sng" algn="ctr">
+                      <a:solidFill>
+                        <a:schemeClr val="bg1"/>
+                      </a:solidFill>
+                      <a:prstDash val="solid"/>
+                      <a:round/>
+                      <a:headEnd type="none" w="med" len="med"/>
+                      <a:tailEnd type="none" w="med" len="med"/>
+                    </a:lnR>
+                    <a:lnT w="12700" cap="flat" cmpd="sng" algn="ctr">
+                      <a:solidFill>
+                        <a:schemeClr val="bg1"/>
+                      </a:solidFill>
+                      <a:prstDash val="solid"/>
+                      <a:round/>
+                      <a:headEnd type="none" w="med" len="med"/>
+                      <a:tailEnd type="none" w="med" len="med"/>
+                    </a:lnT>
+                    <a:lnB w="12700" cap="flat" cmpd="sng" algn="ctr">
+                      <a:solidFill>
+                        <a:schemeClr val="bg1"/>
+                      </a:solidFill>
+                      <a:prstDash val="solid"/>
+                      <a:round/>
+                      <a:headEnd type="none" w="med" len="med"/>
+                      <a:tailEnd type="none" w="med" len="med"/>
+                    </a:lnB>
+                    <a:solidFill>
+                      <a:srgbClr val="C1C1C0"/>
+                    </a:solidFill>
+                  </a:tcPr>
+                </a:tc>
+                <a:extLst>
+                  <a:ext uri="{0D108BD9-81ED-4DB2-BD59-A6C34878D82A}">
+                    <a16:rowId xmlns:a16="http://schemas.microsoft.com/office/drawing/2014/main" val="10000"/>
+                  </a:ext>
+                </a:extLst>
+              </a:tr>
+              <a:tr h="124417">
+                <a:tc>
+                  <a:txBody>
+                    <a:bodyPr/>
+                    <a:lstStyle/>
+                    <a:p>
+                      <a:pPr defTabSz="914400">
+                        <a:defRPr sz="700">
+                          <a:sym typeface="Source Sans Pro Regular"/>
+                        </a:defRPr>
+                      </a:pPr>
+                      <a:endParaRPr dirty="0">
+                        <a:noFill/>
+                        <a:highlight>
+                          <a:srgbClr val="FFFF00"/>
+                        </a:highlight>
+                      </a:endParaRPr>
+                    </a:p>
+                  </a:txBody>
+                  <a:tcPr marL="0" marR="0" marT="0" marB="0" anchor="ctr" horzOverflow="overflow">
+                    <a:lnL w="12700" cap="flat" cmpd="sng" algn="ctr">
+                      <a:solidFill>
+                        <a:schemeClr val="bg1"/>
+                      </a:solidFill>
+                      <a:prstDash val="solid"/>
+                      <a:round/>
+                      <a:headEnd type="none" w="med" len="med"/>
+                      <a:tailEnd type="none" w="med" len="med"/>
+                    </a:lnL>
+                    <a:lnR w="12700" cap="flat" cmpd="sng" algn="ctr">
+                      <a:solidFill>
+                        <a:schemeClr val="bg1"/>
+                      </a:solidFill>
+                      <a:prstDash val="solid"/>
+                      <a:round/>
+                      <a:headEnd type="none" w="med" len="med"/>
+                      <a:tailEnd type="none" w="med" len="med"/>
+                    </a:lnR>
+                    <a:lnT w="12700" cap="flat" cmpd="sng" algn="ctr">
+                      <a:solidFill>
+                        <a:schemeClr val="bg1"/>
+                      </a:solidFill>
+                      <a:prstDash val="solid"/>
+                      <a:round/>
+                      <a:headEnd type="none" w="med" len="med"/>
+                      <a:tailEnd type="none" w="med" len="med"/>
+                    </a:lnT>
+                    <a:lnB w="12700" cap="flat" cmpd="sng" algn="ctr">
+                      <a:solidFill>
+                        <a:schemeClr val="bg1"/>
+                      </a:solidFill>
+                      <a:prstDash val="solid"/>
+                      <a:round/>
+                      <a:headEnd type="none" w="med" len="med"/>
+                      <a:tailEnd type="none" w="med" len="med"/>
+                    </a:lnB>
+                    <a:solidFill>
+                      <a:schemeClr val="accent3"/>
+                    </a:solidFill>
+                  </a:tcPr>
+                </a:tc>
+                <a:tc>
+                  <a:txBody>
+                    <a:bodyPr/>
+                    <a:lstStyle/>
+                    <a:p>
+                      <a:pPr defTabSz="914400">
+                        <a:defRPr sz="700">
+                          <a:sym typeface="Source Sans Pro Regular"/>
+                        </a:defRPr>
+                      </a:pPr>
+                      <a:endParaRPr dirty="0">
+                        <a:noFill/>
+                        <a:highlight>
+                          <a:srgbClr val="FFFF00"/>
+                        </a:highlight>
+                      </a:endParaRPr>
+                    </a:p>
+                  </a:txBody>
+                  <a:tcPr marL="0" marR="0" marT="0" marB="0" anchor="ctr" horzOverflow="overflow">
+                    <a:lnL w="12700" cap="flat" cmpd="sng" algn="ctr">
+                      <a:solidFill>
+                        <a:schemeClr val="bg1"/>
+                      </a:solidFill>
+                      <a:prstDash val="solid"/>
+                      <a:round/>
+                      <a:headEnd type="none" w="med" len="med"/>
+                      <a:tailEnd type="none" w="med" len="med"/>
+                    </a:lnL>
+                    <a:lnR w="12700" cap="flat" cmpd="sng" algn="ctr">
+                      <a:solidFill>
+                        <a:schemeClr val="bg1"/>
+                      </a:solidFill>
+                      <a:prstDash val="solid"/>
+                      <a:round/>
+                      <a:headEnd type="none" w="med" len="med"/>
+                      <a:tailEnd type="none" w="med" len="med"/>
+                    </a:lnR>
+                    <a:lnT w="12700" cap="flat" cmpd="sng" algn="ctr">
+                      <a:solidFill>
+                        <a:schemeClr val="bg1"/>
+                      </a:solidFill>
+                      <a:prstDash val="solid"/>
+                      <a:round/>
+                      <a:headEnd type="none" w="med" len="med"/>
+                      <a:tailEnd type="none" w="med" len="med"/>
+                    </a:lnT>
+                    <a:lnB w="12700" cap="flat" cmpd="sng" algn="ctr">
+                      <a:solidFill>
+                        <a:schemeClr val="bg1"/>
+                      </a:solidFill>
+                      <a:prstDash val="solid"/>
+                      <a:round/>
+                      <a:headEnd type="none" w="med" len="med"/>
+                      <a:tailEnd type="none" w="med" len="med"/>
+                    </a:lnB>
+                    <a:solidFill>
+                      <a:schemeClr val="accent3"/>
+                    </a:solidFill>
+                  </a:tcPr>
+                </a:tc>
+                <a:extLst>
+                  <a:ext uri="{0D108BD9-81ED-4DB2-BD59-A6C34878D82A}">
+                    <a16:rowId xmlns:a16="http://schemas.microsoft.com/office/drawing/2014/main" val="10001"/>
+                  </a:ext>
+                </a:extLst>
+              </a:tr>
+              <a:tr h="124417">
+                <a:tc>
+                  <a:txBody>
+                    <a:bodyPr/>
+                    <a:lstStyle/>
+                    <a:p>
+                      <a:pPr defTabSz="914400">
+                        <a:defRPr sz="700">
+                          <a:sym typeface="Source Sans Pro Regular"/>
+                        </a:defRPr>
+                      </a:pPr>
+                      <a:endParaRPr dirty="0">
+                        <a:noFill/>
+                      </a:endParaRPr>
+                    </a:p>
+                  </a:txBody>
+                  <a:tcPr marL="0" marR="0" marT="0" marB="0" anchor="ctr" horzOverflow="overflow">
+                    <a:lnL w="12700" cap="flat" cmpd="sng" algn="ctr">
+                      <a:solidFill>
+                        <a:schemeClr val="bg1"/>
+                      </a:solidFill>
+                      <a:prstDash val="solid"/>
+                      <a:round/>
+                      <a:headEnd type="none" w="med" len="med"/>
+                      <a:tailEnd type="none" w="med" len="med"/>
+                    </a:lnL>
+                    <a:lnR w="12700" cap="flat" cmpd="sng" algn="ctr">
+                      <a:solidFill>
+                        <a:schemeClr val="bg1"/>
+                      </a:solidFill>
+                      <a:prstDash val="solid"/>
+                      <a:round/>
+                      <a:headEnd type="none" w="med" len="med"/>
+                      <a:tailEnd type="none" w="med" len="med"/>
+                    </a:lnR>
+                    <a:lnT w="12700" cap="flat" cmpd="sng" algn="ctr">
+                      <a:solidFill>
+                        <a:schemeClr val="bg1"/>
+                      </a:solidFill>
+                      <a:prstDash val="solid"/>
+                      <a:round/>
+                      <a:headEnd type="none" w="med" len="med"/>
+                      <a:tailEnd type="none" w="med" len="med"/>
+                    </a:lnT>
+                    <a:lnB w="12700" cap="flat" cmpd="sng" algn="ctr">
+                      <a:solidFill>
+                        <a:schemeClr val="bg1"/>
+                      </a:solidFill>
+                      <a:prstDash val="solid"/>
+                      <a:round/>
+                      <a:headEnd type="none" w="med" len="med"/>
+                      <a:tailEnd type="none" w="med" len="med"/>
+                    </a:lnB>
+                    <a:solidFill>
+                      <a:schemeClr val="accent3"/>
+                    </a:solidFill>
+                  </a:tcPr>
+                </a:tc>
+                <a:tc>
+                  <a:txBody>
+                    <a:bodyPr/>
+                    <a:lstStyle/>
+                    <a:p>
+                      <a:pPr defTabSz="914400">
+                        <a:defRPr sz="700">
+                          <a:sym typeface="Source Sans Pro Regular"/>
+                        </a:defRPr>
+                      </a:pPr>
+                      <a:endParaRPr dirty="0">
+                        <a:noFill/>
+                      </a:endParaRPr>
+                    </a:p>
+                  </a:txBody>
+                  <a:tcPr marL="0" marR="0" marT="0" marB="0" anchor="ctr" horzOverflow="overflow">
+                    <a:lnL w="12700" cap="flat" cmpd="sng" algn="ctr">
+                      <a:solidFill>
+                        <a:schemeClr val="bg1"/>
+                      </a:solidFill>
+                      <a:prstDash val="solid"/>
+                      <a:round/>
+                      <a:headEnd type="none" w="med" len="med"/>
+                      <a:tailEnd type="none" w="med" len="med"/>
+                    </a:lnL>
+                    <a:lnR w="12700" cap="flat" cmpd="sng" algn="ctr">
+                      <a:solidFill>
+                        <a:schemeClr val="bg1"/>
+                      </a:solidFill>
+                      <a:prstDash val="solid"/>
+                      <a:round/>
+                      <a:headEnd type="none" w="med" len="med"/>
+                      <a:tailEnd type="none" w="med" len="med"/>
+                    </a:lnR>
+                    <a:lnT w="12700" cap="flat" cmpd="sng" algn="ctr">
+                      <a:solidFill>
+                        <a:schemeClr val="bg1"/>
+                      </a:solidFill>
+                      <a:prstDash val="solid"/>
+                      <a:round/>
+                      <a:headEnd type="none" w="med" len="med"/>
+                      <a:tailEnd type="none" w="med" len="med"/>
+                    </a:lnT>
+                    <a:lnB w="12700" cap="flat" cmpd="sng" algn="ctr">
+                      <a:solidFill>
+                        <a:schemeClr val="bg1"/>
+                      </a:solidFill>
+                      <a:prstDash val="solid"/>
+                      <a:round/>
+                      <a:headEnd type="none" w="med" len="med"/>
+                      <a:tailEnd type="none" w="med" len="med"/>
+                    </a:lnB>
+                    <a:solidFill>
+                      <a:schemeClr val="accent3"/>
+                    </a:solidFill>
+                  </a:tcPr>
+                </a:tc>
+                <a:extLst>
+                  <a:ext uri="{0D108BD9-81ED-4DB2-BD59-A6C34878D82A}">
+                    <a16:rowId xmlns:a16="http://schemas.microsoft.com/office/drawing/2014/main" val="10002"/>
+                  </a:ext>
+                </a:extLst>
+              </a:tr>
+            </a:tbl>
+          </a:graphicData>
+        </a:graphic>
+      </p:graphicFrame>
+      <p:cxnSp>
+        <p:nvCxnSpPr>
+          <p:cNvPr id="498" name="Straight Arrow Connector 497">
+            <a:extLst>
+              <a:ext uri="{FF2B5EF4-FFF2-40B4-BE49-F238E27FC236}">
+                <a16:creationId xmlns:a16="http://schemas.microsoft.com/office/drawing/2014/main" id="{CB33CDE3-6E35-E0E4-CF1E-66E04EBD1CA8}"/>
+              </a:ext>
+            </a:extLst>
+          </p:cNvPr>
+          <p:cNvCxnSpPr>
+            <a:cxnSpLocks/>
+          </p:cNvCxnSpPr>
+          <p:nvPr/>
+        </p:nvCxnSpPr>
+        <p:spPr>
+          <a:xfrm>
+            <a:off x="11862456" y="7779453"/>
+            <a:ext cx="167561" cy="4430"/>
+          </a:xfrm>
+          <a:prstGeom prst="straightConnector1">
+            <a:avLst/>
+          </a:prstGeom>
+          <a:noFill/>
+          <a:ln w="12700" cap="flat">
+            <a:solidFill>
+              <a:srgbClr val="000000"/>
+            </a:solidFill>
+            <a:prstDash val="solid"/>
+            <a:miter lim="400000"/>
+            <a:tailEnd type="triangle"/>
+          </a:ln>
+          <a:effectLst/>
+          <a:sp3d/>
+        </p:spPr>
+        <p:style>
+          <a:lnRef idx="0">
+            <a:scrgbClr r="0" g="0" b="0"/>
+          </a:lnRef>
+          <a:fillRef idx="0">
+            <a:scrgbClr r="0" g="0" b="0"/>
+          </a:fillRef>
+          <a:effectRef idx="0">
+            <a:scrgbClr r="0" g="0" b="0"/>
+          </a:effectRef>
+          <a:fontRef idx="none"/>
+        </p:style>
+      </p:cxnSp>
+      <p:cxnSp>
+        <p:nvCxnSpPr>
+          <p:cNvPr id="499" name="Straight Arrow Connector 498">
+            <a:extLst>
+              <a:ext uri="{FF2B5EF4-FFF2-40B4-BE49-F238E27FC236}">
+                <a16:creationId xmlns:a16="http://schemas.microsoft.com/office/drawing/2014/main" id="{9AE57429-27AB-05FC-4A9C-DE8B53759629}"/>
+              </a:ext>
+            </a:extLst>
+          </p:cNvPr>
+          <p:cNvCxnSpPr>
+            <a:cxnSpLocks/>
+          </p:cNvCxnSpPr>
+          <p:nvPr/>
+        </p:nvCxnSpPr>
+        <p:spPr>
+          <a:xfrm>
+            <a:off x="12417761" y="7781877"/>
+            <a:ext cx="167561" cy="4430"/>
+          </a:xfrm>
+          <a:prstGeom prst="straightConnector1">
+            <a:avLst/>
+          </a:prstGeom>
+          <a:noFill/>
+          <a:ln w="12700" cap="flat">
+            <a:solidFill>
+              <a:srgbClr val="000000"/>
+            </a:solidFill>
+            <a:prstDash val="solid"/>
+            <a:miter lim="400000"/>
+            <a:tailEnd type="triangle"/>
+          </a:ln>
+          <a:effectLst/>
+          <a:sp3d/>
+        </p:spPr>
+        <p:style>
+          <a:lnRef idx="0">
+            <a:scrgbClr r="0" g="0" b="0"/>
+          </a:lnRef>
+          <a:fillRef idx="0">
+            <a:scrgbClr r="0" g="0" b="0"/>
+          </a:fillRef>
+          <a:effectRef idx="0">
+            <a:scrgbClr r="0" g="0" b="0"/>
+          </a:effectRef>
+          <a:fontRef idx="none"/>
+        </p:style>
+      </p:cxnSp>
+      <p:pic>
+        <p:nvPicPr>
+          <p:cNvPr id="500" name="Graphic 499" descr="Paper outline">
+            <a:extLst>
+              <a:ext uri="{FF2B5EF4-FFF2-40B4-BE49-F238E27FC236}">
+                <a16:creationId xmlns:a16="http://schemas.microsoft.com/office/drawing/2014/main" id="{987AABEB-9D8E-3180-0990-3BE9BF7A2536}"/>
+              </a:ext>
+            </a:extLst>
+          </p:cNvPr>
+          <p:cNvPicPr>
+            <a:picLocks noChangeAspect="1"/>
+          </p:cNvPicPr>
+          <p:nvPr/>
+        </p:nvPicPr>
+        <p:blipFill>
+          <a:blip r:embed="rId12">
+            <a:extLst>
+              <a:ext uri="{28A0092B-C50C-407E-A947-70E740481C1C}">
+                <a14:useLocalDpi xmlns:a14="http://schemas.microsoft.com/office/drawing/2010/main" val="0"/>
+              </a:ext>
+              <a:ext uri="{96DAC541-7B7A-43D3-8B79-37D633B846F1}">
+                <asvg:svgBlip xmlns:asvg="http://schemas.microsoft.com/office/drawing/2016/SVG/main" r:embed="rId13"/>
+              </a:ext>
+            </a:extLst>
+          </a:blip>
+          <a:stretch>
+            <a:fillRect/>
+          </a:stretch>
+        </p:blipFill>
+        <p:spPr>
+          <a:xfrm>
+            <a:off x="10774252" y="7518999"/>
+            <a:ext cx="527267" cy="527267"/>
+          </a:xfrm>
+          <a:prstGeom prst="rect">
+            <a:avLst/>
+          </a:prstGeom>
+        </p:spPr>
+      </p:pic>
+      <p:sp>
+        <p:nvSpPr>
+          <p:cNvPr id="501" name="TextBox 500">
+            <a:extLst>
+              <a:ext uri="{FF2B5EF4-FFF2-40B4-BE49-F238E27FC236}">
+                <a16:creationId xmlns:a16="http://schemas.microsoft.com/office/drawing/2014/main" id="{32D01911-A82F-5E2F-499E-E02D06DE989B}"/>
+              </a:ext>
+            </a:extLst>
+          </p:cNvPr>
+          <p:cNvSpPr txBox="1"/>
+          <p:nvPr/>
+        </p:nvSpPr>
+        <p:spPr>
+          <a:xfrm>
+            <a:off x="11329532" y="7945556"/>
+            <a:ext cx="781573" cy="258964"/>
+          </a:xfrm>
+          <a:prstGeom prst="rect">
+            <a:avLst/>
+          </a:prstGeom>
+          <a:noFill/>
+          <a:ln w="12700" cap="flat">
+            <a:noFill/>
+            <a:miter lim="400000"/>
+          </a:ln>
+          <a:effectLst/>
+          <a:sp3d/>
+        </p:spPr>
+        <p:style>
+          <a:lnRef idx="0">
+            <a:scrgbClr r="0" g="0" b="0"/>
+          </a:lnRef>
+          <a:fillRef idx="0">
+            <a:scrgbClr r="0" g="0" b="0"/>
+          </a:fillRef>
+          <a:effectRef idx="0">
+            <a:scrgbClr r="0" g="0" b="0"/>
+          </a:effectRef>
+          <a:fontRef idx="none"/>
+        </p:style>
+        <p:txBody>
+          <a:bodyPr rot="0" spcFirstLastPara="1" vertOverflow="overflow" horzOverflow="overflow" vert="horz" wrap="square" lIns="54570" tIns="54570" rIns="54570" bIns="54570" numCol="1" spcCol="38100" rtlCol="0" anchor="ctr">
+            <a:spAutoFit/>
+          </a:bodyPr>
+          <a:lstStyle/>
+          <a:p>
+            <a:pPr marL="0" marR="0" indent="0" algn="l" defTabSz="584200" rtl="0" fontAlgn="auto" latinLnBrk="0" hangingPunct="0">
+              <a:lnSpc>
+                <a:spcPct val="100000"/>
+              </a:lnSpc>
+              <a:spcBef>
+                <a:spcPts val="200"/>
+              </a:spcBef>
+              <a:spcAft>
+                <a:spcPts val="0"/>
+              </a:spcAft>
+              <a:buClrTx/>
+              <a:buSzTx/>
+              <a:buFontTx/>
+              <a:buNone/>
+              <a:tabLst/>
+            </a:pPr>
+            <a:r>
+              <a:rPr lang="en-US" sz="800" b="0" dirty="0" err="1"/>
+              <a:t>m</a:t>
+            </a:r>
+            <a:r>
+              <a:rPr kumimoji="0" lang="en-US" sz="800" b="0" i="0" u="none" strike="noStrike" cap="none" spc="0" normalizeH="0" baseline="0" dirty="0" err="1">
+                <a:ln>
+                  <a:noFill/>
+                </a:ln>
+                <a:solidFill>
+                  <a:srgbClr val="4C4C4C"/>
+                </a:solidFill>
+                <a:effectLst/>
+                <a:uFillTx/>
+                <a:latin typeface="Source Sans Pro"/>
+                <a:ea typeface="Source Sans Pro"/>
+                <a:cs typeface="Source Sans Pro"/>
+                <a:sym typeface="Source Sans Pro"/>
+              </a:rPr>
+              <a:t>ailinglist.R</a:t>
+            </a:r>
+            <a:endParaRPr kumimoji="0" lang="en-US" sz="800" b="0" i="0" u="none" strike="noStrike" cap="none" spc="0" normalizeH="0" baseline="0" dirty="0">
+              <a:ln>
+                <a:noFill/>
+              </a:ln>
+              <a:solidFill>
+                <a:srgbClr val="4C4C4C"/>
+              </a:solidFill>
+              <a:effectLst/>
+              <a:uFillTx/>
+              <a:latin typeface="Source Sans Pro"/>
+              <a:ea typeface="Source Sans Pro"/>
+              <a:cs typeface="Source Sans Pro"/>
+              <a:sym typeface="Source Sans Pro"/>
+            </a:endParaRPr>
+          </a:p>
+        </p:txBody>
+      </p:sp>
+      <p:sp>
+        <p:nvSpPr>
+          <p:cNvPr id="502" name="TextBox 501">
+            <a:extLst>
+              <a:ext uri="{FF2B5EF4-FFF2-40B4-BE49-F238E27FC236}">
+                <a16:creationId xmlns:a16="http://schemas.microsoft.com/office/drawing/2014/main" id="{92CEBE86-0A6C-3963-163D-73E4C8BBDA8E}"/>
+              </a:ext>
+            </a:extLst>
+          </p:cNvPr>
+          <p:cNvSpPr txBox="1"/>
+          <p:nvPr/>
+        </p:nvSpPr>
+        <p:spPr>
+          <a:xfrm>
+            <a:off x="11913813" y="7938468"/>
+            <a:ext cx="781573" cy="258964"/>
+          </a:xfrm>
+          <a:prstGeom prst="rect">
+            <a:avLst/>
+          </a:prstGeom>
+          <a:noFill/>
+          <a:ln w="12700" cap="flat">
+            <a:noFill/>
+            <a:miter lim="400000"/>
+          </a:ln>
+          <a:effectLst/>
+          <a:sp3d/>
+        </p:spPr>
+        <p:style>
+          <a:lnRef idx="0">
+            <a:scrgbClr r="0" g="0" b="0"/>
+          </a:lnRef>
+          <a:fillRef idx="0">
+            <a:scrgbClr r="0" g="0" b="0"/>
+          </a:fillRef>
+          <a:effectRef idx="0">
+            <a:scrgbClr r="0" g="0" b="0"/>
+          </a:effectRef>
+          <a:fontRef idx="none"/>
+        </p:style>
+        <p:txBody>
+          <a:bodyPr rot="0" spcFirstLastPara="1" vertOverflow="overflow" horzOverflow="overflow" vert="horz" wrap="square" lIns="54570" tIns="54570" rIns="54570" bIns="54570" numCol="1" spcCol="38100" rtlCol="0" anchor="ctr">
+            <a:spAutoFit/>
+          </a:bodyPr>
+          <a:lstStyle/>
+          <a:p>
+            <a:pPr marL="0" marR="0" indent="0" algn="l" defTabSz="584200" rtl="0" fontAlgn="auto" latinLnBrk="0" hangingPunct="0">
+              <a:lnSpc>
+                <a:spcPct val="100000"/>
+              </a:lnSpc>
+              <a:spcBef>
+                <a:spcPts val="200"/>
+              </a:spcBef>
+              <a:spcAft>
+                <a:spcPts val="0"/>
+              </a:spcAft>
+              <a:buClrTx/>
+              <a:buSzTx/>
+              <a:buFontTx/>
+              <a:buNone/>
+              <a:tabLst/>
+            </a:pPr>
+            <a:r>
+              <a:rPr lang="en-US" sz="800" b="0" dirty="0" err="1"/>
+              <a:t>parse_mbox</a:t>
+            </a:r>
+            <a:r>
+              <a:rPr lang="en-US" sz="800" b="0" dirty="0"/>
+              <a:t>()</a:t>
+            </a:r>
+            <a:endParaRPr kumimoji="0" lang="en-US" sz="800" b="0" i="0" u="none" strike="noStrike" cap="none" spc="0" normalizeH="0" baseline="0" dirty="0">
+              <a:ln>
+                <a:noFill/>
+              </a:ln>
+              <a:solidFill>
+                <a:srgbClr val="4C4C4C"/>
+              </a:solidFill>
+              <a:effectLst/>
+              <a:uFillTx/>
+              <a:latin typeface="Source Sans Pro"/>
+              <a:ea typeface="Source Sans Pro"/>
+              <a:cs typeface="Source Sans Pro"/>
+              <a:sym typeface="Source Sans Pro"/>
+            </a:endParaRPr>
+          </a:p>
+        </p:txBody>
+      </p:sp>
+      <p:sp>
+        <p:nvSpPr>
+          <p:cNvPr id="503" name="TextBox 502">
+            <a:extLst>
+              <a:ext uri="{FF2B5EF4-FFF2-40B4-BE49-F238E27FC236}">
+                <a16:creationId xmlns:a16="http://schemas.microsoft.com/office/drawing/2014/main" id="{5AE02DD3-63E3-D797-8A63-3AAC0256860C}"/>
+              </a:ext>
+            </a:extLst>
+          </p:cNvPr>
+          <p:cNvSpPr txBox="1"/>
+          <p:nvPr/>
+        </p:nvSpPr>
+        <p:spPr>
+          <a:xfrm>
+            <a:off x="10711193" y="7947612"/>
+            <a:ext cx="745139" cy="258964"/>
+          </a:xfrm>
+          <a:prstGeom prst="rect">
+            <a:avLst/>
+          </a:prstGeom>
+          <a:noFill/>
+          <a:ln w="12700" cap="flat">
+            <a:noFill/>
+            <a:miter lim="400000"/>
+          </a:ln>
+          <a:effectLst/>
+          <a:sp3d/>
+        </p:spPr>
+        <p:style>
+          <a:lnRef idx="0">
+            <a:scrgbClr r="0" g="0" b="0"/>
+          </a:lnRef>
+          <a:fillRef idx="0">
+            <a:scrgbClr r="0" g="0" b="0"/>
+          </a:fillRef>
+          <a:effectRef idx="0">
+            <a:scrgbClr r="0" g="0" b="0"/>
+          </a:effectRef>
+          <a:fontRef idx="none"/>
+        </p:style>
+        <p:txBody>
+          <a:bodyPr rot="0" spcFirstLastPara="1" vertOverflow="overflow" horzOverflow="overflow" vert="horz" wrap="square" lIns="54570" tIns="54570" rIns="54570" bIns="54570" numCol="1" spcCol="38100" rtlCol="0" anchor="ctr">
+            <a:spAutoFit/>
+          </a:bodyPr>
+          <a:lstStyle/>
+          <a:p>
+            <a:pPr marL="0" marR="0" indent="0" algn="l" defTabSz="584200" rtl="0" fontAlgn="auto" latinLnBrk="0" hangingPunct="0">
+              <a:lnSpc>
+                <a:spcPct val="100000"/>
+              </a:lnSpc>
+              <a:spcBef>
+                <a:spcPts val="200"/>
+              </a:spcBef>
+              <a:spcAft>
+                <a:spcPts val="0"/>
+              </a:spcAft>
+              <a:buClrTx/>
+              <a:buSzTx/>
+              <a:buFontTx/>
+              <a:buNone/>
+              <a:tabLst/>
+            </a:pPr>
+            <a:r>
+              <a:rPr kumimoji="0" lang="en-US" sz="800" i="0" u="none" strike="noStrike" cap="none" spc="0" normalizeH="0" baseline="0" dirty="0">
+                <a:ln>
+                  <a:noFill/>
+                </a:ln>
+                <a:solidFill>
+                  <a:srgbClr val="4C4C4C"/>
+                </a:solidFill>
+                <a:effectLst/>
+                <a:uFillTx/>
+                <a:latin typeface="Source Sans Pro"/>
+                <a:ea typeface="Source Sans Pro"/>
+                <a:cs typeface="Source Sans Pro"/>
+                <a:sym typeface="Source Sans Pro"/>
+              </a:rPr>
+              <a:t>202411</a:t>
+            </a:r>
+            <a:r>
+              <a:rPr kumimoji="0" lang="en-US" sz="800" b="0" i="0" u="none" strike="noStrike" cap="none" spc="0" normalizeH="0" baseline="0" dirty="0">
+                <a:ln>
+                  <a:noFill/>
+                </a:ln>
+                <a:solidFill>
+                  <a:srgbClr val="4C4C4C"/>
+                </a:solidFill>
+                <a:effectLst/>
+                <a:uFillTx/>
+                <a:latin typeface="Source Sans Pro"/>
+                <a:ea typeface="Source Sans Pro"/>
+                <a:cs typeface="Source Sans Pro"/>
+                <a:sym typeface="Source Sans Pro"/>
+              </a:rPr>
+              <a:t>.mbox</a:t>
+            </a:r>
+          </a:p>
+        </p:txBody>
+      </p:sp>
+      <p:cxnSp>
+        <p:nvCxnSpPr>
+          <p:cNvPr id="504" name="Straight Arrow Connector 503">
+            <a:extLst>
+              <a:ext uri="{FF2B5EF4-FFF2-40B4-BE49-F238E27FC236}">
+                <a16:creationId xmlns:a16="http://schemas.microsoft.com/office/drawing/2014/main" id="{00ECACF0-FF62-728A-B035-F2A6796E0EDA}"/>
+              </a:ext>
+            </a:extLst>
+          </p:cNvPr>
+          <p:cNvCxnSpPr>
+            <a:cxnSpLocks/>
+          </p:cNvCxnSpPr>
+          <p:nvPr/>
+        </p:nvCxnSpPr>
+        <p:spPr>
+          <a:xfrm>
+            <a:off x="11266190" y="7780397"/>
+            <a:ext cx="167561" cy="4430"/>
+          </a:xfrm>
+          <a:prstGeom prst="straightConnector1">
+            <a:avLst/>
+          </a:prstGeom>
+          <a:noFill/>
+          <a:ln w="12700" cap="flat">
+            <a:solidFill>
+              <a:srgbClr val="000000"/>
+            </a:solidFill>
+            <a:prstDash val="solid"/>
+            <a:miter lim="400000"/>
+            <a:tailEnd type="triangle"/>
+          </a:ln>
+          <a:effectLst/>
+          <a:sp3d/>
+        </p:spPr>
+        <p:style>
+          <a:lnRef idx="0">
+            <a:scrgbClr r="0" g="0" b="0"/>
+          </a:lnRef>
+          <a:fillRef idx="0">
+            <a:scrgbClr r="0" g="0" b="0"/>
+          </a:fillRef>
+          <a:effectRef idx="0">
+            <a:scrgbClr r="0" g="0" b="0"/>
+          </a:effectRef>
+          <a:fontRef idx="none"/>
+        </p:style>
+      </p:cxnSp>
+      <p:sp>
+        <p:nvSpPr>
+          <p:cNvPr id="505" name="Rectangle 504">
+            <a:extLst>
+              <a:ext uri="{FF2B5EF4-FFF2-40B4-BE49-F238E27FC236}">
+                <a16:creationId xmlns:a16="http://schemas.microsoft.com/office/drawing/2014/main" id="{03469667-1977-33CB-A584-A8B15E4B59C9}"/>
+              </a:ext>
+            </a:extLst>
+          </p:cNvPr>
+          <p:cNvSpPr/>
+          <p:nvPr/>
+        </p:nvSpPr>
+        <p:spPr>
+          <a:xfrm>
+            <a:off x="10704297" y="7338160"/>
+            <a:ext cx="2365131" cy="899988"/>
+          </a:xfrm>
+          <a:prstGeom prst="rect">
+            <a:avLst/>
+          </a:prstGeom>
+          <a:noFill/>
+          <a:ln w="12700" cap="flat">
+            <a:solidFill>
+              <a:schemeClr val="accent1"/>
+            </a:solidFill>
+            <a:miter lim="400000"/>
+          </a:ln>
+          <a:effectLst>
+            <a:outerShdw blurRad="38100" dist="25400" dir="5400000" rotWithShape="0">
+              <a:srgbClr val="000000">
+                <a:alpha val="50000"/>
+              </a:srgbClr>
+            </a:outerShdw>
+          </a:effectLst>
+          <a:sp3d/>
+        </p:spPr>
+        <p:style>
+          <a:lnRef idx="0">
+            <a:scrgbClr r="0" g="0" b="0"/>
+          </a:lnRef>
+          <a:fillRef idx="0">
+            <a:scrgbClr r="0" g="0" b="0"/>
+          </a:fillRef>
+          <a:effectRef idx="0">
+            <a:scrgbClr r="0" g="0" b="0"/>
+          </a:effectRef>
+          <a:fontRef idx="none"/>
+        </p:style>
+        <p:txBody>
+          <a:bodyPr rot="0" spcFirstLastPara="1" vertOverflow="overflow" horzOverflow="overflow" vert="horz" wrap="square" lIns="54570" tIns="54570" rIns="54570" bIns="54570" numCol="1" spcCol="38100" rtlCol="0" anchor="ctr">
+            <a:spAutoFit/>
+          </a:bodyPr>
+          <a:lstStyle/>
+          <a:p>
+            <a:pPr marL="0" marR="0" indent="0" algn="l" defTabSz="584200" rtl="0" fontAlgn="auto" latinLnBrk="0" hangingPunct="0">
+              <a:lnSpc>
+                <a:spcPct val="80000"/>
+              </a:lnSpc>
+              <a:spcBef>
+                <a:spcPts val="0"/>
+              </a:spcBef>
+              <a:spcAft>
+                <a:spcPts val="0"/>
+              </a:spcAft>
+              <a:buClrTx/>
+              <a:buSzTx/>
+              <a:buFontTx/>
+              <a:buNone/>
+              <a:tabLst/>
+            </a:pPr>
+            <a:endParaRPr kumimoji="0" lang="en-US" sz="1200" b="0" i="0" u="none" strike="noStrike" cap="none" spc="0" normalizeH="0" baseline="0" dirty="0">
+              <a:ln>
+                <a:noFill/>
+              </a:ln>
+              <a:solidFill>
+                <a:srgbClr val="000000"/>
+              </a:solidFill>
+              <a:effectLst/>
+              <a:uFillTx/>
+              <a:latin typeface="Source Sans Pro"/>
+              <a:ea typeface="Source Sans Pro"/>
+              <a:cs typeface="Source Sans Pro"/>
+              <a:sym typeface="Source Sans Pro"/>
+            </a:endParaRPr>
           </a:p>
         </p:txBody>
       </p:sp>

</xml_diff>

<commit_message>
i #10 Updated Spacing in Title
- project-analysis-cheatsheet had a mistake in the title (lack of a between the :: symbols and the title).
</commit_message>
<xml_diff>
--- a/cheatsheets/project-analysis-cheatsheet.pptx
+++ b/cheatsheets/project-analysis-cheatsheet.pptx
@@ -3361,7 +3361,7 @@
           <a:p>
             <a:r>
               <a:rPr lang="en-US" dirty="0"/>
-              <a:t>Analyzing Projects</a:t>
+              <a:t>Analyzing Projects </a:t>
             </a:r>
             <a:r>
               <a:rPr dirty="0"/>
@@ -4012,7 +4012,7 @@
         </p:nvSpPr>
         <p:spPr>
           <a:xfrm flipV="1">
-            <a:off x="9573838" y="4999777"/>
+            <a:off x="9573838" y="5390062"/>
             <a:ext cx="4178808" cy="0"/>
           </a:xfrm>
           <a:prstGeom prst="line">
@@ -7117,7 +7117,7 @@
         </p:nvSpPr>
         <p:spPr>
           <a:xfrm>
-            <a:off x="9573838" y="5127230"/>
+            <a:off x="9573838" y="5517515"/>
             <a:ext cx="2021387" cy="340029"/>
           </a:xfrm>
           <a:prstGeom prst="rect">
@@ -7172,7 +7172,7 @@
         </p:nvSpPr>
         <p:spPr>
           <a:xfrm>
-            <a:off x="9570182" y="5468032"/>
+            <a:off x="9570182" y="5858317"/>
             <a:ext cx="3968070" cy="481077"/>
           </a:xfrm>
           <a:prstGeom prst="rect">
@@ -7314,7 +7314,7 @@
         </p:blipFill>
         <p:spPr>
           <a:xfrm>
-            <a:off x="9859045" y="6989173"/>
+            <a:off x="9859045" y="7502119"/>
             <a:ext cx="527267" cy="527267"/>
           </a:xfrm>
           <a:prstGeom prst="rect">
@@ -7336,7 +7336,7 @@
         </p:nvSpPr>
         <p:spPr>
           <a:xfrm>
-            <a:off x="9788095" y="7423653"/>
+            <a:off x="9788095" y="7936599"/>
             <a:ext cx="781573" cy="258964"/>
           </a:xfrm>
           <a:prstGeom prst="rect">
@@ -7435,7 +7435,7 @@
         </p:blipFill>
         <p:spPr>
           <a:xfrm>
-            <a:off x="11301752" y="6476550"/>
+            <a:off x="11301752" y="6989496"/>
             <a:ext cx="527267" cy="527267"/>
           </a:xfrm>
           <a:prstGeom prst="rect">
@@ -7457,7 +7457,7 @@
         </p:nvSpPr>
         <p:spPr>
           <a:xfrm>
-            <a:off x="11405659" y="6613693"/>
+            <a:off x="11405659" y="7126639"/>
             <a:ext cx="319451" cy="258964"/>
           </a:xfrm>
           <a:prstGeom prst="rect">
@@ -7561,7 +7561,7 @@
         </p:blipFill>
         <p:spPr>
           <a:xfrm>
-            <a:off x="11881020" y="6473408"/>
+            <a:off x="11881020" y="6986354"/>
             <a:ext cx="527267" cy="527267"/>
           </a:xfrm>
           <a:prstGeom prst="rect">
@@ -7583,7 +7583,7 @@
         </p:nvSpPr>
         <p:spPr>
           <a:xfrm>
-            <a:off x="11960256" y="6617345"/>
+            <a:off x="11960256" y="7130291"/>
             <a:ext cx="423360" cy="258964"/>
           </a:xfrm>
           <a:prstGeom prst="rect">
@@ -7665,13 +7665,13 @@
           <p:nvPr>
             <p:extLst>
               <p:ext uri="{D42A27DB-BD31-4B8C-83A1-F6EECF244321}">
-                <p14:modId xmlns:p14="http://schemas.microsoft.com/office/powerpoint/2010/main" val="3105165955"/>
+                <p14:modId xmlns:p14="http://schemas.microsoft.com/office/powerpoint/2010/main" val="1392953760"/>
               </p:ext>
             </p:extLst>
           </p:nvPr>
         </p:nvGraphicFramePr>
         <p:xfrm>
-          <a:off x="12541442" y="6542424"/>
+          <a:off x="12541442" y="7055370"/>
           <a:ext cx="369704" cy="373251"/>
         </p:xfrm>
         <a:graphic>
@@ -8106,7 +8106,7 @@
         </p:blipFill>
         <p:spPr>
           <a:xfrm>
-            <a:off x="13130260" y="6939197"/>
+            <a:off x="13130260" y="7452143"/>
             <a:ext cx="674740" cy="674740"/>
           </a:xfrm>
           <a:prstGeom prst="rect">
@@ -8128,7 +8128,7 @@
         </p:nvSpPr>
         <p:spPr>
           <a:xfrm>
-            <a:off x="13266154" y="7088892"/>
+            <a:off x="13266154" y="7601838"/>
             <a:ext cx="453492" cy="382075"/>
           </a:xfrm>
           <a:prstGeom prst="rect">
@@ -8219,7 +8219,7 @@
         </p:nvSpPr>
         <p:spPr>
           <a:xfrm>
-            <a:off x="10599218" y="6075714"/>
+            <a:off x="10599218" y="6588660"/>
             <a:ext cx="781573" cy="258964"/>
           </a:xfrm>
           <a:prstGeom prst="rect">
@@ -8308,7 +8308,7 @@
         </p:nvCxnSpPr>
         <p:spPr>
           <a:xfrm>
-            <a:off x="9683118" y="7248377"/>
+            <a:off x="9683118" y="7761323"/>
             <a:ext cx="167561" cy="4430"/>
           </a:xfrm>
           <a:prstGeom prst="straightConnector1">
@@ -8355,7 +8355,7 @@
         </p:nvCxnSpPr>
         <p:spPr>
           <a:xfrm flipV="1">
-            <a:off x="10330687" y="7024360"/>
+            <a:off x="10330687" y="7537306"/>
             <a:ext cx="239813" cy="224017"/>
           </a:xfrm>
           <a:prstGeom prst="straightConnector1">
@@ -8402,7 +8402,7 @@
         </p:nvCxnSpPr>
         <p:spPr>
           <a:xfrm>
-            <a:off x="11785213" y="6737062"/>
+            <a:off x="11785213" y="7250008"/>
             <a:ext cx="167561" cy="4430"/>
           </a:xfrm>
           <a:prstGeom prst="straightConnector1">
@@ -8449,7 +8449,7 @@
         </p:nvCxnSpPr>
         <p:spPr>
           <a:xfrm>
-            <a:off x="10332275" y="7248377"/>
+            <a:off x="10332275" y="7761323"/>
             <a:ext cx="222607" cy="227211"/>
           </a:xfrm>
           <a:prstGeom prst="straightConnector1">
@@ -8496,7 +8496,7 @@
         </p:nvCxnSpPr>
         <p:spPr>
           <a:xfrm>
-            <a:off x="12340518" y="6739486"/>
+            <a:off x="12340518" y="7252432"/>
             <a:ext cx="167561" cy="4430"/>
           </a:xfrm>
           <a:prstGeom prst="straightConnector1">
@@ -8543,7 +8543,7 @@
         </p:nvCxnSpPr>
         <p:spPr>
           <a:xfrm>
-            <a:off x="12995626" y="7154916"/>
+            <a:off x="12995626" y="7667862"/>
             <a:ext cx="167561" cy="4430"/>
           </a:xfrm>
           <a:prstGeom prst="straightConnector1">
@@ -8590,7 +8590,7 @@
         </p:nvCxnSpPr>
         <p:spPr>
           <a:xfrm>
-            <a:off x="13000007" y="7399407"/>
+            <a:off x="13000007" y="7912353"/>
             <a:ext cx="167561" cy="4430"/>
           </a:xfrm>
           <a:prstGeom prst="straightConnector1">
@@ -8635,7 +8635,7 @@
         </p:nvSpPr>
         <p:spPr>
           <a:xfrm>
-            <a:off x="9530976" y="8314460"/>
+            <a:off x="9530976" y="9050430"/>
             <a:ext cx="3968070" cy="481077"/>
           </a:xfrm>
           <a:prstGeom prst="rect">
@@ -8848,7 +8848,7 @@
         </p:blipFill>
         <p:spPr>
           <a:xfrm>
-            <a:off x="9478983" y="3120910"/>
+            <a:off x="9478983" y="3288175"/>
             <a:ext cx="455550" cy="455550"/>
           </a:xfrm>
           <a:prstGeom prst="rect">
@@ -8887,7 +8887,7 @@
         </p:blipFill>
         <p:spPr>
           <a:xfrm>
-            <a:off x="10321323" y="2882646"/>
+            <a:off x="10321323" y="3049911"/>
             <a:ext cx="527267" cy="527267"/>
           </a:xfrm>
           <a:prstGeom prst="rect">
@@ -8909,7 +8909,7 @@
         </p:nvSpPr>
         <p:spPr>
           <a:xfrm>
-            <a:off x="10399145" y="3365455"/>
+            <a:off x="10399145" y="3532720"/>
             <a:ext cx="417059" cy="258964"/>
           </a:xfrm>
           <a:prstGeom prst="rect">
@@ -9009,7 +9009,7 @@
         </p:blipFill>
         <p:spPr>
           <a:xfrm>
-            <a:off x="10957410" y="3205427"/>
+            <a:off x="10957410" y="3372692"/>
             <a:ext cx="527267" cy="527267"/>
           </a:xfrm>
           <a:prstGeom prst="rect">
@@ -9031,7 +9031,7 @@
         </p:nvSpPr>
         <p:spPr>
           <a:xfrm>
-            <a:off x="11011208" y="3698416"/>
+            <a:off x="11011208" y="3865681"/>
             <a:ext cx="527267" cy="258964"/>
           </a:xfrm>
           <a:prstGeom prst="rect">
@@ -9105,13 +9105,13 @@
           <p:nvPr>
             <p:extLst>
               <p:ext uri="{D42A27DB-BD31-4B8C-83A1-F6EECF244321}">
-                <p14:modId xmlns:p14="http://schemas.microsoft.com/office/powerpoint/2010/main" val="1543345445"/>
+                <p14:modId xmlns:p14="http://schemas.microsoft.com/office/powerpoint/2010/main" val="3857453829"/>
               </p:ext>
             </p:extLst>
           </p:nvPr>
         </p:nvGraphicFramePr>
         <p:xfrm>
-          <a:off x="11658797" y="3276049"/>
+          <a:off x="11658797" y="3443314"/>
           <a:ext cx="554556" cy="373251"/>
         </p:xfrm>
         <a:graphic>
@@ -9715,7 +9715,7 @@
         </p:nvCxnSpPr>
         <p:spPr>
           <a:xfrm>
-            <a:off x="11443920" y="3473111"/>
+            <a:off x="11443920" y="3640376"/>
             <a:ext cx="167561" cy="4430"/>
           </a:xfrm>
           <a:prstGeom prst="straightConnector1">
@@ -9760,7 +9760,7 @@
         </p:nvSpPr>
         <p:spPr>
           <a:xfrm>
-            <a:off x="11730381" y="3709453"/>
+            <a:off x="11730381" y="3876718"/>
             <a:ext cx="527267" cy="258964"/>
           </a:xfrm>
           <a:prstGeom prst="rect">
@@ -9835,7 +9835,7 @@
         </p:nvSpPr>
         <p:spPr>
           <a:xfrm>
-            <a:off x="11072046" y="2769591"/>
+            <a:off x="11072046" y="2936856"/>
             <a:ext cx="527260" cy="208694"/>
           </a:xfrm>
           <a:prstGeom prst="rect">
@@ -9933,7 +9933,7 @@
         </p:nvCxnSpPr>
         <p:spPr>
           <a:xfrm flipV="1">
-            <a:off x="10776710" y="2939951"/>
+            <a:off x="10776710" y="3107216"/>
             <a:ext cx="239813" cy="224017"/>
           </a:xfrm>
           <a:prstGeom prst="straightConnector1">
@@ -9980,7 +9980,7 @@
         </p:nvCxnSpPr>
         <p:spPr>
           <a:xfrm>
-            <a:off x="10778298" y="3163968"/>
+            <a:off x="10778298" y="3331233"/>
             <a:ext cx="222607" cy="227211"/>
           </a:xfrm>
           <a:prstGeom prst="straightConnector1">
@@ -10027,7 +10027,7 @@
         </p:nvCxnSpPr>
         <p:spPr>
           <a:xfrm flipH="1">
-            <a:off x="10775064" y="2843816"/>
+            <a:off x="10775064" y="3011081"/>
             <a:ext cx="198127" cy="185077"/>
           </a:xfrm>
           <a:prstGeom prst="straightConnector1">
@@ -10072,7 +10072,7 @@
         </p:nvSpPr>
         <p:spPr>
           <a:xfrm>
-            <a:off x="10256229" y="2664396"/>
+            <a:off x="10256229" y="2831661"/>
             <a:ext cx="2367914" cy="1313879"/>
           </a:xfrm>
           <a:prstGeom prst="rect">
@@ -10161,7 +10161,7 @@
         </p:nvCxnSpPr>
         <p:spPr>
           <a:xfrm>
-            <a:off x="9974895" y="3312551"/>
+            <a:off x="9974895" y="3479816"/>
             <a:ext cx="167561" cy="4430"/>
           </a:xfrm>
           <a:prstGeom prst="straightConnector1">
@@ -10223,7 +10223,7 @@
         </p:blipFill>
         <p:spPr>
           <a:xfrm>
-            <a:off x="12857400" y="2965068"/>
+            <a:off x="12857400" y="3132333"/>
             <a:ext cx="674740" cy="674740"/>
           </a:xfrm>
           <a:prstGeom prst="rect">
@@ -10247,7 +10247,7 @@
         </p:nvCxnSpPr>
         <p:spPr>
           <a:xfrm>
-            <a:off x="12695395" y="3308354"/>
+            <a:off x="12695395" y="3475619"/>
             <a:ext cx="167561" cy="4430"/>
           </a:xfrm>
           <a:prstGeom prst="straightConnector1">
@@ -10292,7 +10292,7 @@
         </p:nvSpPr>
         <p:spPr>
           <a:xfrm>
-            <a:off x="9560056" y="4089261"/>
+            <a:off x="9560056" y="4479546"/>
             <a:ext cx="4001400" cy="813435"/>
           </a:xfrm>
           <a:prstGeom prst="rect">
@@ -12150,7 +12150,7 @@
         </p:nvSpPr>
         <p:spPr>
           <a:xfrm>
-            <a:off x="12978187" y="3125945"/>
+            <a:off x="12978187" y="3293210"/>
             <a:ext cx="527266" cy="382075"/>
           </a:xfrm>
           <a:prstGeom prst="rect">
@@ -12225,7 +12225,7 @@
         </p:nvSpPr>
         <p:spPr>
           <a:xfrm>
-            <a:off x="8858831" y="6591412"/>
+            <a:off x="8858831" y="7104358"/>
             <a:ext cx="1075025" cy="258964"/>
           </a:xfrm>
           <a:prstGeom prst="rect">
@@ -12362,7 +12362,7 @@
         </p:blipFill>
         <p:spPr>
           <a:xfrm>
-            <a:off x="9107052" y="6163597"/>
+            <a:off x="9107052" y="6676543"/>
             <a:ext cx="527267" cy="527267"/>
           </a:xfrm>
           <a:prstGeom prst="rect">
@@ -12384,7 +12384,7 @@
         </p:nvSpPr>
         <p:spPr>
           <a:xfrm>
-            <a:off x="8856131" y="7278230"/>
+            <a:off x="8856131" y="7791176"/>
             <a:ext cx="1093916" cy="258964"/>
           </a:xfrm>
           <a:prstGeom prst="rect">
@@ -12512,7 +12512,7 @@
         </p:blipFill>
         <p:spPr>
           <a:xfrm>
-            <a:off x="9106851" y="6818368"/>
+            <a:off x="9106851" y="7331314"/>
             <a:ext cx="527267" cy="527267"/>
           </a:xfrm>
           <a:prstGeom prst="rect">
@@ -12534,7 +12534,7 @@
         </p:nvSpPr>
         <p:spPr>
           <a:xfrm>
-            <a:off x="8856131" y="7972977"/>
+            <a:off x="8856131" y="8485923"/>
             <a:ext cx="1087486" cy="258964"/>
           </a:xfrm>
           <a:prstGeom prst="rect">
@@ -12671,7 +12671,7 @@
         </p:blipFill>
         <p:spPr>
           <a:xfrm>
-            <a:off x="9105882" y="7501202"/>
+            <a:off x="9105882" y="8014148"/>
             <a:ext cx="527267" cy="527267"/>
           </a:xfrm>
           <a:prstGeom prst="rect">
@@ -12710,7 +12710,7 @@
         </p:blipFill>
         <p:spPr>
           <a:xfrm>
-            <a:off x="10697009" y="6476608"/>
+            <a:off x="10697009" y="6989554"/>
             <a:ext cx="527267" cy="527267"/>
           </a:xfrm>
           <a:prstGeom prst="rect">
@@ -12732,7 +12732,7 @@
         </p:nvSpPr>
         <p:spPr>
           <a:xfrm>
-            <a:off x="11252289" y="6903165"/>
+            <a:off x="11252289" y="7416111"/>
             <a:ext cx="781573" cy="258964"/>
           </a:xfrm>
           <a:prstGeom prst="rect">
@@ -12832,7 +12832,7 @@
         </p:nvSpPr>
         <p:spPr>
           <a:xfrm>
-            <a:off x="11836570" y="6896077"/>
+            <a:off x="11836570" y="7409023"/>
             <a:ext cx="781573" cy="258964"/>
           </a:xfrm>
           <a:prstGeom prst="rect">
@@ -12919,7 +12919,7 @@
         </p:nvSpPr>
         <p:spPr>
           <a:xfrm>
-            <a:off x="10633950" y="6905221"/>
+            <a:off x="10633950" y="7418167"/>
             <a:ext cx="745139" cy="258964"/>
           </a:xfrm>
           <a:prstGeom prst="rect">
@@ -13020,7 +13020,7 @@
         </p:nvCxnSpPr>
         <p:spPr>
           <a:xfrm>
-            <a:off x="11188947" y="6738006"/>
+            <a:off x="11188947" y="7250952"/>
             <a:ext cx="167561" cy="4430"/>
           </a:xfrm>
           <a:prstGeom prst="straightConnector1">
@@ -13065,7 +13065,7 @@
         </p:nvSpPr>
         <p:spPr>
           <a:xfrm>
-            <a:off x="10627054" y="6295769"/>
+            <a:off x="10627054" y="6808715"/>
             <a:ext cx="2365131" cy="899988"/>
           </a:xfrm>
           <a:prstGeom prst="rect">
@@ -13169,7 +13169,7 @@
         </p:blipFill>
         <p:spPr>
           <a:xfrm>
-            <a:off x="11305811" y="7531383"/>
+            <a:off x="11305811" y="8044329"/>
             <a:ext cx="527267" cy="527267"/>
           </a:xfrm>
           <a:prstGeom prst="rect">
@@ -13191,7 +13191,7 @@
         </p:nvSpPr>
         <p:spPr>
           <a:xfrm>
-            <a:off x="11409718" y="7668526"/>
+            <a:off x="11409718" y="8181472"/>
             <a:ext cx="319451" cy="258964"/>
           </a:xfrm>
           <a:prstGeom prst="rect">
@@ -13295,7 +13295,7 @@
         </p:blipFill>
         <p:spPr>
           <a:xfrm>
-            <a:off x="11885079" y="7528241"/>
+            <a:off x="11885079" y="8041187"/>
             <a:ext cx="527267" cy="527267"/>
           </a:xfrm>
           <a:prstGeom prst="rect">
@@ -13317,7 +13317,7 @@
         </p:nvSpPr>
         <p:spPr>
           <a:xfrm>
-            <a:off x="11964315" y="7672178"/>
+            <a:off x="11964315" y="8185124"/>
             <a:ext cx="423360" cy="258964"/>
           </a:xfrm>
           <a:prstGeom prst="rect">
@@ -13399,13 +13399,13 @@
           <p:nvPr>
             <p:extLst>
               <p:ext uri="{D42A27DB-BD31-4B8C-83A1-F6EECF244321}">
-                <p14:modId xmlns:p14="http://schemas.microsoft.com/office/powerpoint/2010/main" val="703938673"/>
+                <p14:modId xmlns:p14="http://schemas.microsoft.com/office/powerpoint/2010/main" val="2308114841"/>
               </p:ext>
             </p:extLst>
           </p:nvPr>
         </p:nvGraphicFramePr>
         <p:xfrm>
-          <a:off x="12545501" y="7597257"/>
+          <a:off x="12545501" y="8110203"/>
           <a:ext cx="369704" cy="373251"/>
         </p:xfrm>
         <a:graphic>
@@ -13825,7 +13825,7 @@
         </p:nvCxnSpPr>
         <p:spPr>
           <a:xfrm>
-            <a:off x="11789272" y="7791895"/>
+            <a:off x="11789272" y="8304841"/>
             <a:ext cx="167561" cy="4430"/>
           </a:xfrm>
           <a:prstGeom prst="straightConnector1">
@@ -13872,7 +13872,7 @@
         </p:nvCxnSpPr>
         <p:spPr>
           <a:xfrm>
-            <a:off x="12344577" y="7794319"/>
+            <a:off x="12344577" y="8307265"/>
             <a:ext cx="167561" cy="4430"/>
           </a:xfrm>
           <a:prstGeom prst="straightConnector1">
@@ -13934,7 +13934,7 @@
         </p:blipFill>
         <p:spPr>
           <a:xfrm>
-            <a:off x="10701068" y="7531441"/>
+            <a:off x="10701068" y="8044387"/>
             <a:ext cx="527267" cy="527267"/>
           </a:xfrm>
           <a:prstGeom prst="rect">
@@ -13956,7 +13956,7 @@
         </p:nvSpPr>
         <p:spPr>
           <a:xfrm>
-            <a:off x="11256348" y="7957998"/>
+            <a:off x="11256348" y="8470944"/>
             <a:ext cx="781573" cy="258964"/>
           </a:xfrm>
           <a:prstGeom prst="rect">
@@ -14056,7 +14056,7 @@
         </p:nvSpPr>
         <p:spPr>
           <a:xfrm>
-            <a:off x="11840629" y="7950910"/>
+            <a:off x="11840629" y="8463856"/>
             <a:ext cx="781573" cy="258964"/>
           </a:xfrm>
           <a:prstGeom prst="rect">
@@ -14143,7 +14143,7 @@
         </p:nvSpPr>
         <p:spPr>
           <a:xfrm>
-            <a:off x="10638009" y="7960054"/>
+            <a:off x="10638009" y="8473000"/>
             <a:ext cx="745139" cy="258964"/>
           </a:xfrm>
           <a:prstGeom prst="rect">
@@ -14244,7 +14244,7 @@
         </p:nvCxnSpPr>
         <p:spPr>
           <a:xfrm>
-            <a:off x="11193006" y="7792839"/>
+            <a:off x="11193006" y="8305785"/>
             <a:ext cx="167561" cy="4430"/>
           </a:xfrm>
           <a:prstGeom prst="straightConnector1">
@@ -14289,7 +14289,7 @@
         </p:nvSpPr>
         <p:spPr>
           <a:xfrm>
-            <a:off x="10631113" y="7350602"/>
+            <a:off x="10631113" y="7863548"/>
             <a:ext cx="2365131" cy="899988"/>
           </a:xfrm>
           <a:prstGeom prst="rect">

</xml_diff>

<commit_message>
i #10 Blurriness in Folder Organization
- The folder organization diagram was blurry, but this has been resolved.
</commit_message>
<xml_diff>
--- a/cheatsheets/project-analysis-cheatsheet.pptx
+++ b/cheatsheets/project-analysis-cheatsheet.pptx
@@ -2201,7 +2201,7 @@
           </a:ln>
           <a:extLst>
             <a:ext uri="{C572A759-6A51-4108-AA02-DFA0A04FC94B}">
-              <ma14:wrappingTextBoxFlag xmlns:ma14="http://schemas.microsoft.com/office/mac/drawingml/2011/main" xmlns:a14="http://schemas.microsoft.com/office/drawing/2010/main" xmlns:m="http://schemas.openxmlformats.org/officeDocument/2006/math" xmlns="" val="1"/>
+              <ma14:wrappingTextBoxFlag xmlns="" xmlns:m="http://schemas.openxmlformats.org/officeDocument/2006/math" xmlns:a14="http://schemas.microsoft.com/office/drawing/2010/main" xmlns:ma14="http://schemas.microsoft.com/office/mac/drawingml/2011/main" val="1"/>
             </a:ext>
           </a:extLst>
         </p:spPr>
@@ -2240,7 +2240,7 @@
           </a:ln>
           <a:extLst>
             <a:ext uri="{C572A759-6A51-4108-AA02-DFA0A04FC94B}">
-              <ma14:wrappingTextBoxFlag xmlns:ma14="http://schemas.microsoft.com/office/mac/drawingml/2011/main" xmlns:a14="http://schemas.microsoft.com/office/drawing/2010/main" xmlns:m="http://schemas.openxmlformats.org/officeDocument/2006/math" xmlns="" val="1"/>
+              <ma14:wrappingTextBoxFlag xmlns="" xmlns:m="http://schemas.openxmlformats.org/officeDocument/2006/math" xmlns:a14="http://schemas.microsoft.com/office/drawing/2010/main" xmlns:ma14="http://schemas.microsoft.com/office/mac/drawingml/2011/main" val="1"/>
             </a:ext>
           </a:extLst>
         </p:spPr>
@@ -3252,7 +3252,7 @@
           </a:ln>
           <a:extLst>
             <a:ext uri="{C572A759-6A51-4108-AA02-DFA0A04FC94B}">
-              <ma14:wrappingTextBoxFlag xmlns:ma14="http://schemas.microsoft.com/office/mac/drawingml/2011/main" xmlns:a14="http://schemas.microsoft.com/office/drawing/2010/main" xmlns:m="http://schemas.openxmlformats.org/officeDocument/2006/math" xmlns="" val="1"/>
+              <ma14:wrappingTextBoxFlag xmlns="" xmlns:m="http://schemas.openxmlformats.org/officeDocument/2006/math" xmlns:a14="http://schemas.microsoft.com/office/drawing/2010/main" xmlns:ma14="http://schemas.microsoft.com/office/mac/drawingml/2011/main" val="1"/>
             </a:ext>
           </a:extLst>
         </p:spPr>
@@ -3304,7 +3304,7 @@
           </a:ln>
           <a:extLst>
             <a:ext uri="{C572A759-6A51-4108-AA02-DFA0A04FC94B}">
-              <ma14:wrappingTextBoxFlag xmlns:ma14="http://schemas.microsoft.com/office/mac/drawingml/2011/main" xmlns:a14="http://schemas.microsoft.com/office/drawing/2010/main" xmlns:m="http://schemas.openxmlformats.org/officeDocument/2006/math" xmlns="" val="1"/>
+              <ma14:wrappingTextBoxFlag xmlns="" xmlns:m="http://schemas.openxmlformats.org/officeDocument/2006/math" xmlns:a14="http://schemas.microsoft.com/office/drawing/2010/main" xmlns:ma14="http://schemas.microsoft.com/office/mac/drawingml/2011/main" val="1"/>
             </a:ext>
           </a:extLst>
         </p:spPr>
@@ -3402,7 +3402,7 @@
           </a:ln>
           <a:extLst>
             <a:ext uri="{C572A759-6A51-4108-AA02-DFA0A04FC94B}">
-              <ma14:wrappingTextBoxFlag xmlns:ma14="http://schemas.microsoft.com/office/mac/drawingml/2011/main" xmlns:a14="http://schemas.microsoft.com/office/drawing/2010/main" xmlns:m="http://schemas.openxmlformats.org/officeDocument/2006/math" xmlns="" val="1"/>
+              <ma14:wrappingTextBoxFlag xmlns="" xmlns:m="http://schemas.openxmlformats.org/officeDocument/2006/math" xmlns:a14="http://schemas.microsoft.com/office/drawing/2010/main" xmlns:ma14="http://schemas.microsoft.com/office/mac/drawingml/2011/main" val="1"/>
             </a:ext>
           </a:extLst>
         </p:spPr>
@@ -3513,7 +3513,7 @@
           </a:ln>
           <a:extLst>
             <a:ext uri="{C572A759-6A51-4108-AA02-DFA0A04FC94B}">
-              <ma14:wrappingTextBoxFlag xmlns:ma14="http://schemas.microsoft.com/office/mac/drawingml/2011/main" xmlns:a14="http://schemas.microsoft.com/office/drawing/2010/main" xmlns:m="http://schemas.openxmlformats.org/officeDocument/2006/math" xmlns="" val="1"/>
+              <ma14:wrappingTextBoxFlag xmlns="" xmlns:m="http://schemas.openxmlformats.org/officeDocument/2006/math" xmlns:a14="http://schemas.microsoft.com/office/drawing/2010/main" xmlns:ma14="http://schemas.microsoft.com/office/mac/drawingml/2011/main" val="1"/>
             </a:ext>
           </a:extLst>
         </p:spPr>
@@ -3562,7 +3562,7 @@
           </a:ln>
           <a:extLst>
             <a:ext uri="{C572A759-6A51-4108-AA02-DFA0A04FC94B}">
-              <ma14:wrappingTextBoxFlag xmlns:ma14="http://schemas.microsoft.com/office/mac/drawingml/2011/main" xmlns:a14="http://schemas.microsoft.com/office/drawing/2010/main" xmlns:m="http://schemas.openxmlformats.org/officeDocument/2006/math" xmlns="" val="1"/>
+              <ma14:wrappingTextBoxFlag xmlns="" xmlns:m="http://schemas.openxmlformats.org/officeDocument/2006/math" xmlns:a14="http://schemas.microsoft.com/office/drawing/2010/main" xmlns:ma14="http://schemas.microsoft.com/office/mac/drawingml/2011/main" val="1"/>
             </a:ext>
           </a:extLst>
         </p:spPr>
@@ -3881,7 +3881,7 @@
           </a:ln>
           <a:extLst>
             <a:ext uri="{C572A759-6A51-4108-AA02-DFA0A04FC94B}">
-              <ma14:wrappingTextBoxFlag xmlns:ma14="http://schemas.microsoft.com/office/mac/drawingml/2011/main" xmlns:a14="http://schemas.microsoft.com/office/drawing/2010/main" xmlns:m="http://schemas.openxmlformats.org/officeDocument/2006/math" xmlns="" val="1"/>
+              <ma14:wrappingTextBoxFlag xmlns="" xmlns:m="http://schemas.openxmlformats.org/officeDocument/2006/math" xmlns:a14="http://schemas.microsoft.com/office/drawing/2010/main" xmlns:ma14="http://schemas.microsoft.com/office/mac/drawingml/2011/main" val="1"/>
             </a:ext>
           </a:extLst>
         </p:spPr>
@@ -4119,7 +4119,7 @@
           </a:ln>
           <a:extLst>
             <a:ext uri="{C572A759-6A51-4108-AA02-DFA0A04FC94B}">
-              <ma14:wrappingTextBoxFlag xmlns:ma14="http://schemas.microsoft.com/office/mac/drawingml/2011/main" xmlns:a14="http://schemas.microsoft.com/office/drawing/2010/main" xmlns:m="http://schemas.openxmlformats.org/officeDocument/2006/math" xmlns="" val="1"/>
+              <ma14:wrappingTextBoxFlag xmlns="" xmlns:m="http://schemas.openxmlformats.org/officeDocument/2006/math" xmlns:a14="http://schemas.microsoft.com/office/drawing/2010/main" xmlns:ma14="http://schemas.microsoft.com/office/mac/drawingml/2011/main" val="1"/>
             </a:ext>
           </a:extLst>
         </p:spPr>
@@ -6138,7 +6138,7 @@
           </a:ln>
           <a:extLst>
             <a:ext uri="{C572A759-6A51-4108-AA02-DFA0A04FC94B}">
-              <ma14:wrappingTextBoxFlag xmlns:ma14="http://schemas.microsoft.com/office/mac/drawingml/2011/main" xmlns:a14="http://schemas.microsoft.com/office/drawing/2010/main" xmlns:m="http://schemas.openxmlformats.org/officeDocument/2006/math" xmlns="" val="1"/>
+              <ma14:wrappingTextBoxFlag xmlns="" xmlns:m="http://schemas.openxmlformats.org/officeDocument/2006/math" xmlns:a14="http://schemas.microsoft.com/office/drawing/2010/main" xmlns:ma14="http://schemas.microsoft.com/office/mac/drawingml/2011/main" val="1"/>
             </a:ext>
           </a:extLst>
         </p:spPr>
@@ -6495,7 +6495,7 @@
           </a:ln>
           <a:extLst>
             <a:ext uri="{C572A759-6A51-4108-AA02-DFA0A04FC94B}">
-              <ma14:wrappingTextBoxFlag xmlns:ma14="http://schemas.microsoft.com/office/mac/drawingml/2011/main" xmlns:a14="http://schemas.microsoft.com/office/drawing/2010/main" xmlns:m="http://schemas.openxmlformats.org/officeDocument/2006/math" xmlns="" val="1"/>
+              <ma14:wrappingTextBoxFlag xmlns="" xmlns:m="http://schemas.openxmlformats.org/officeDocument/2006/math" xmlns:a14="http://schemas.microsoft.com/office/drawing/2010/main" xmlns:ma14="http://schemas.microsoft.com/office/mac/drawingml/2011/main" val="1"/>
             </a:ext>
           </a:extLst>
         </p:spPr>
@@ -6686,7 +6686,7 @@
           </a:ln>
           <a:extLst>
             <a:ext uri="{C572A759-6A51-4108-AA02-DFA0A04FC94B}">
-              <ma14:wrappingTextBoxFlag xmlns:ma14="http://schemas.microsoft.com/office/mac/drawingml/2011/main" xmlns:a14="http://schemas.microsoft.com/office/drawing/2010/main" xmlns:m="http://schemas.openxmlformats.org/officeDocument/2006/math" xmlns="" val="1"/>
+              <ma14:wrappingTextBoxFlag xmlns="" xmlns:m="http://schemas.openxmlformats.org/officeDocument/2006/math" xmlns:a14="http://schemas.microsoft.com/office/drawing/2010/main" xmlns:ma14="http://schemas.microsoft.com/office/mac/drawingml/2011/main" val="1"/>
             </a:ext>
           </a:extLst>
         </p:spPr>
@@ -6859,7 +6859,7 @@
           </a:ln>
           <a:extLst>
             <a:ext uri="{C572A759-6A51-4108-AA02-DFA0A04FC94B}">
-              <ma14:wrappingTextBoxFlag xmlns:ma14="http://schemas.microsoft.com/office/mac/drawingml/2011/main" xmlns:a14="http://schemas.microsoft.com/office/drawing/2010/main" xmlns:m="http://schemas.openxmlformats.org/officeDocument/2006/math" xmlns="" val="1"/>
+              <ma14:wrappingTextBoxFlag xmlns="" xmlns:m="http://schemas.openxmlformats.org/officeDocument/2006/math" xmlns:a14="http://schemas.microsoft.com/office/drawing/2010/main" xmlns:ma14="http://schemas.microsoft.com/office/mac/drawingml/2011/main" val="1"/>
             </a:ext>
           </a:extLst>
         </p:spPr>
@@ -7072,7 +7072,7 @@
           </a:ln>
           <a:extLst>
             <a:ext uri="{C572A759-6A51-4108-AA02-DFA0A04FC94B}">
-              <ma14:wrappingTextBoxFlag xmlns:m="http://schemas.openxmlformats.org/officeDocument/2006/math" xmlns:a14="http://schemas.microsoft.com/office/drawing/2010/main" xmlns:ma14="http://schemas.microsoft.com/office/mac/drawingml/2011/main" xmlns="" val="1"/>
+              <ma14:wrappingTextBoxFlag xmlns="" xmlns:ma14="http://schemas.microsoft.com/office/mac/drawingml/2011/main" xmlns:a14="http://schemas.microsoft.com/office/drawing/2010/main" xmlns:m="http://schemas.openxmlformats.org/officeDocument/2006/math" val="1"/>
             </a:ext>
           </a:extLst>
         </p:spPr>
@@ -7128,7 +7128,7 @@
           </a:ln>
           <a:extLst>
             <a:ext uri="{C572A759-6A51-4108-AA02-DFA0A04FC94B}">
-              <ma14:wrappingTextBoxFlag xmlns="" xmlns:m="http://schemas.openxmlformats.org/officeDocument/2006/math" xmlns:a14="http://schemas.microsoft.com/office/drawing/2010/main" xmlns:ma14="http://schemas.microsoft.com/office/mac/drawingml/2011/main" val="1"/>
+              <ma14:wrappingTextBoxFlag xmlns:ma14="http://schemas.microsoft.com/office/mac/drawingml/2011/main" xmlns:a14="http://schemas.microsoft.com/office/drawing/2010/main" xmlns:m="http://schemas.openxmlformats.org/officeDocument/2006/math" xmlns="" val="1"/>
             </a:ext>
           </a:extLst>
         </p:spPr>
@@ -14364,10 +14364,10 @@
       </p:sp>
       <p:pic>
         <p:nvPicPr>
-          <p:cNvPr id="31" name="Picture 30">
+          <p:cNvPr id="27" name="Picture 26" descr="A screenshot of a computer&#10;&#10;Description automatically generated">
             <a:extLst>
               <a:ext uri="{FF2B5EF4-FFF2-40B4-BE49-F238E27FC236}">
-                <a16:creationId xmlns:a16="http://schemas.microsoft.com/office/drawing/2014/main" id="{F7BE3922-D306-4814-2549-B227C8A7AB8A}"/>
+                <a16:creationId xmlns:a16="http://schemas.microsoft.com/office/drawing/2014/main" id="{D205F759-4D04-FCC6-834D-4B385C6E14B0}"/>
               </a:ext>
             </a:extLst>
           </p:cNvPr>
@@ -14377,15 +14377,21 @@
           <p:nvPr/>
         </p:nvPicPr>
         <p:blipFill>
-          <a:blip r:embed="rId18"/>
+          <a:blip r:embed="rId18" cstate="print">
+            <a:extLst>
+              <a:ext uri="{28A0092B-C50C-407E-A947-70E740481C1C}">
+                <a14:useLocalDpi xmlns:a14="http://schemas.microsoft.com/office/drawing/2010/main" val="0"/>
+              </a:ext>
+            </a:extLst>
+          </a:blip>
           <a:stretch>
             <a:fillRect/>
           </a:stretch>
         </p:blipFill>
         <p:spPr>
           <a:xfrm>
-            <a:off x="165226" y="7702205"/>
-            <a:ext cx="4506678" cy="2366097"/>
+            <a:off x="170343" y="7601838"/>
+            <a:ext cx="4167062" cy="2327504"/>
           </a:xfrm>
           <a:prstGeom prst="rect">
             <a:avLst/>

</xml_diff>

<commit_message>
i #10 Misalignment and Consistency
- project-analysis-cheatsheet had the "Function" and "Output" text under the "Command Line Interface" section vertically aligned.
- project-analysis-cheatsheet had the "executable files" text renamed to "exec scripts" for consistency across the cheat sheet.
</commit_message>
<xml_diff>
--- a/cheatsheets/project-analysis-cheatsheet.pptx
+++ b/cheatsheets/project-analysis-cheatsheet.pptx
@@ -2201,7 +2201,7 @@
           </a:ln>
           <a:extLst>
             <a:ext uri="{C572A759-6A51-4108-AA02-DFA0A04FC94B}">
-              <ma14:wrappingTextBoxFlag xmlns="" xmlns:m="http://schemas.openxmlformats.org/officeDocument/2006/math" xmlns:a14="http://schemas.microsoft.com/office/drawing/2010/main" xmlns:ma14="http://schemas.microsoft.com/office/mac/drawingml/2011/main" val="1"/>
+              <ma14:wrappingTextBoxFlag xmlns:ma14="http://schemas.microsoft.com/office/mac/drawingml/2011/main" xmlns:a14="http://schemas.microsoft.com/office/drawing/2010/main" xmlns:m="http://schemas.openxmlformats.org/officeDocument/2006/math" xmlns="" val="1"/>
             </a:ext>
           </a:extLst>
         </p:spPr>
@@ -2240,7 +2240,7 @@
           </a:ln>
           <a:extLst>
             <a:ext uri="{C572A759-6A51-4108-AA02-DFA0A04FC94B}">
-              <ma14:wrappingTextBoxFlag xmlns="" xmlns:m="http://schemas.openxmlformats.org/officeDocument/2006/math" xmlns:a14="http://schemas.microsoft.com/office/drawing/2010/main" xmlns:ma14="http://schemas.microsoft.com/office/mac/drawingml/2011/main" val="1"/>
+              <ma14:wrappingTextBoxFlag xmlns:ma14="http://schemas.microsoft.com/office/mac/drawingml/2011/main" xmlns:a14="http://schemas.microsoft.com/office/drawing/2010/main" xmlns:m="http://schemas.openxmlformats.org/officeDocument/2006/math" xmlns="" val="1"/>
             </a:ext>
           </a:extLst>
         </p:spPr>
@@ -3252,7 +3252,7 @@
           </a:ln>
           <a:extLst>
             <a:ext uri="{C572A759-6A51-4108-AA02-DFA0A04FC94B}">
-              <ma14:wrappingTextBoxFlag xmlns="" xmlns:m="http://schemas.openxmlformats.org/officeDocument/2006/math" xmlns:a14="http://schemas.microsoft.com/office/drawing/2010/main" xmlns:ma14="http://schemas.microsoft.com/office/mac/drawingml/2011/main" val="1"/>
+              <ma14:wrappingTextBoxFlag xmlns:ma14="http://schemas.microsoft.com/office/mac/drawingml/2011/main" xmlns:a14="http://schemas.microsoft.com/office/drawing/2010/main" xmlns:m="http://schemas.openxmlformats.org/officeDocument/2006/math" xmlns="" val="1"/>
             </a:ext>
           </a:extLst>
         </p:spPr>
@@ -3304,7 +3304,7 @@
           </a:ln>
           <a:extLst>
             <a:ext uri="{C572A759-6A51-4108-AA02-DFA0A04FC94B}">
-              <ma14:wrappingTextBoxFlag xmlns="" xmlns:m="http://schemas.openxmlformats.org/officeDocument/2006/math" xmlns:a14="http://schemas.microsoft.com/office/drawing/2010/main" xmlns:ma14="http://schemas.microsoft.com/office/mac/drawingml/2011/main" val="1"/>
+              <ma14:wrappingTextBoxFlag xmlns:ma14="http://schemas.microsoft.com/office/mac/drawingml/2011/main" xmlns:a14="http://schemas.microsoft.com/office/drawing/2010/main" xmlns:m="http://schemas.openxmlformats.org/officeDocument/2006/math" xmlns="" val="1"/>
             </a:ext>
           </a:extLst>
         </p:spPr>
@@ -3391,7 +3391,7 @@
         </p:nvSpPr>
         <p:spPr>
           <a:xfrm>
-            <a:off x="198780" y="2092793"/>
+            <a:off x="180266" y="2092793"/>
             <a:ext cx="3949153" cy="1145874"/>
           </a:xfrm>
           <a:prstGeom prst="rect">
@@ -3402,7 +3402,7 @@
           </a:ln>
           <a:extLst>
             <a:ext uri="{C572A759-6A51-4108-AA02-DFA0A04FC94B}">
-              <ma14:wrappingTextBoxFlag xmlns="" xmlns:m="http://schemas.openxmlformats.org/officeDocument/2006/math" xmlns:a14="http://schemas.microsoft.com/office/drawing/2010/main" xmlns:ma14="http://schemas.microsoft.com/office/mac/drawingml/2011/main" val="1"/>
+              <ma14:wrappingTextBoxFlag xmlns:ma14="http://schemas.microsoft.com/office/mac/drawingml/2011/main" xmlns:a14="http://schemas.microsoft.com/office/drawing/2010/main" xmlns:m="http://schemas.openxmlformats.org/officeDocument/2006/math" xmlns="" val="1"/>
             </a:ext>
           </a:extLst>
         </p:spPr>
@@ -3513,7 +3513,7 @@
           </a:ln>
           <a:extLst>
             <a:ext uri="{C572A759-6A51-4108-AA02-DFA0A04FC94B}">
-              <ma14:wrappingTextBoxFlag xmlns="" xmlns:m="http://schemas.openxmlformats.org/officeDocument/2006/math" xmlns:a14="http://schemas.microsoft.com/office/drawing/2010/main" xmlns:ma14="http://schemas.microsoft.com/office/mac/drawingml/2011/main" val="1"/>
+              <ma14:wrappingTextBoxFlag xmlns:ma14="http://schemas.microsoft.com/office/mac/drawingml/2011/main" xmlns:a14="http://schemas.microsoft.com/office/drawing/2010/main" xmlns:m="http://schemas.openxmlformats.org/officeDocument/2006/math" xmlns="" val="1"/>
             </a:ext>
           </a:extLst>
         </p:spPr>
@@ -3562,7 +3562,7 @@
           </a:ln>
           <a:extLst>
             <a:ext uri="{C572A759-6A51-4108-AA02-DFA0A04FC94B}">
-              <ma14:wrappingTextBoxFlag xmlns="" xmlns:m="http://schemas.openxmlformats.org/officeDocument/2006/math" xmlns:a14="http://schemas.microsoft.com/office/drawing/2010/main" xmlns:ma14="http://schemas.microsoft.com/office/mac/drawingml/2011/main" val="1"/>
+              <ma14:wrappingTextBoxFlag xmlns:ma14="http://schemas.microsoft.com/office/mac/drawingml/2011/main" xmlns:a14="http://schemas.microsoft.com/office/drawing/2010/main" xmlns:m="http://schemas.openxmlformats.org/officeDocument/2006/math" xmlns="" val="1"/>
             </a:ext>
           </a:extLst>
         </p:spPr>
@@ -3881,7 +3881,7 @@
           </a:ln>
           <a:extLst>
             <a:ext uri="{C572A759-6A51-4108-AA02-DFA0A04FC94B}">
-              <ma14:wrappingTextBoxFlag xmlns="" xmlns:m="http://schemas.openxmlformats.org/officeDocument/2006/math" xmlns:a14="http://schemas.microsoft.com/office/drawing/2010/main" xmlns:ma14="http://schemas.microsoft.com/office/mac/drawingml/2011/main" val="1"/>
+              <ma14:wrappingTextBoxFlag xmlns:ma14="http://schemas.microsoft.com/office/mac/drawingml/2011/main" xmlns:a14="http://schemas.microsoft.com/office/drawing/2010/main" xmlns:m="http://schemas.openxmlformats.org/officeDocument/2006/math" xmlns="" val="1"/>
             </a:ext>
           </a:extLst>
         </p:spPr>
@@ -4119,7 +4119,7 @@
           </a:ln>
           <a:extLst>
             <a:ext uri="{C572A759-6A51-4108-AA02-DFA0A04FC94B}">
-              <ma14:wrappingTextBoxFlag xmlns="" xmlns:m="http://schemas.openxmlformats.org/officeDocument/2006/math" xmlns:a14="http://schemas.microsoft.com/office/drawing/2010/main" xmlns:ma14="http://schemas.microsoft.com/office/mac/drawingml/2011/main" val="1"/>
+              <ma14:wrappingTextBoxFlag xmlns:ma14="http://schemas.microsoft.com/office/mac/drawingml/2011/main" xmlns:a14="http://schemas.microsoft.com/office/drawing/2010/main" xmlns:m="http://schemas.openxmlformats.org/officeDocument/2006/math" xmlns="" val="1"/>
             </a:ext>
           </a:extLst>
         </p:spPr>
@@ -6127,7 +6127,7 @@
         </p:nvSpPr>
         <p:spPr>
           <a:xfrm>
-            <a:off x="4728517" y="7188040"/>
+            <a:off x="4716784" y="7188040"/>
             <a:ext cx="3616562" cy="3127955"/>
           </a:xfrm>
           <a:prstGeom prst="rect">
@@ -6138,7 +6138,7 @@
           </a:ln>
           <a:extLst>
             <a:ext uri="{C572A759-6A51-4108-AA02-DFA0A04FC94B}">
-              <ma14:wrappingTextBoxFlag xmlns="" xmlns:m="http://schemas.openxmlformats.org/officeDocument/2006/math" xmlns:a14="http://schemas.microsoft.com/office/drawing/2010/main" xmlns:ma14="http://schemas.microsoft.com/office/mac/drawingml/2011/main" val="1"/>
+              <ma14:wrappingTextBoxFlag xmlns:ma14="http://schemas.microsoft.com/office/mac/drawingml/2011/main" xmlns:a14="http://schemas.microsoft.com/office/drawing/2010/main" xmlns:m="http://schemas.openxmlformats.org/officeDocument/2006/math" xmlns="" val="1"/>
             </a:ext>
           </a:extLst>
         </p:spPr>
@@ -6495,7 +6495,7 @@
           </a:ln>
           <a:extLst>
             <a:ext uri="{C572A759-6A51-4108-AA02-DFA0A04FC94B}">
-              <ma14:wrappingTextBoxFlag xmlns="" xmlns:m="http://schemas.openxmlformats.org/officeDocument/2006/math" xmlns:a14="http://schemas.microsoft.com/office/drawing/2010/main" xmlns:ma14="http://schemas.microsoft.com/office/mac/drawingml/2011/main" val="1"/>
+              <ma14:wrappingTextBoxFlag xmlns:ma14="http://schemas.microsoft.com/office/mac/drawingml/2011/main" xmlns:a14="http://schemas.microsoft.com/office/drawing/2010/main" xmlns:m="http://schemas.openxmlformats.org/officeDocument/2006/math" xmlns="" val="1"/>
             </a:ext>
           </a:extLst>
         </p:spPr>
@@ -6675,7 +6675,7 @@
         </p:nvSpPr>
         <p:spPr>
           <a:xfrm>
-            <a:off x="7270693" y="4594663"/>
+            <a:off x="7270693" y="4568719"/>
             <a:ext cx="1537505" cy="1273601"/>
           </a:xfrm>
           <a:prstGeom prst="rect">
@@ -6686,7 +6686,7 @@
           </a:ln>
           <a:extLst>
             <a:ext uri="{C572A759-6A51-4108-AA02-DFA0A04FC94B}">
-              <ma14:wrappingTextBoxFlag xmlns="" xmlns:m="http://schemas.openxmlformats.org/officeDocument/2006/math" xmlns:a14="http://schemas.microsoft.com/office/drawing/2010/main" xmlns:ma14="http://schemas.microsoft.com/office/mac/drawingml/2011/main" val="1"/>
+              <ma14:wrappingTextBoxFlag xmlns:ma14="http://schemas.microsoft.com/office/mac/drawingml/2011/main" xmlns:a14="http://schemas.microsoft.com/office/drawing/2010/main" xmlns:m="http://schemas.openxmlformats.org/officeDocument/2006/math" xmlns="" val="1"/>
             </a:ext>
           </a:extLst>
         </p:spPr>
@@ -6848,7 +6848,7 @@
         </p:nvSpPr>
         <p:spPr>
           <a:xfrm>
-            <a:off x="4721426" y="5978925"/>
+            <a:off x="4716784" y="5978925"/>
             <a:ext cx="4032978" cy="775003"/>
           </a:xfrm>
           <a:prstGeom prst="rect">
@@ -6859,7 +6859,7 @@
           </a:ln>
           <a:extLst>
             <a:ext uri="{C572A759-6A51-4108-AA02-DFA0A04FC94B}">
-              <ma14:wrappingTextBoxFlag xmlns="" xmlns:m="http://schemas.openxmlformats.org/officeDocument/2006/math" xmlns:a14="http://schemas.microsoft.com/office/drawing/2010/main" xmlns:ma14="http://schemas.microsoft.com/office/mac/drawingml/2011/main" val="1"/>
+              <ma14:wrappingTextBoxFlag xmlns:ma14="http://schemas.microsoft.com/office/mac/drawingml/2011/main" xmlns:a14="http://schemas.microsoft.com/office/drawing/2010/main" xmlns:m="http://schemas.openxmlformats.org/officeDocument/2006/math" xmlns="" val="1"/>
             </a:ext>
           </a:extLst>
         </p:spPr>
@@ -6964,16 +6964,6 @@
               <a:t> and </a:t>
             </a:r>
             <a:r>
-              <a:rPr lang="en-US" b="0" dirty="0">
-                <a:solidFill>
-                  <a:schemeClr val="accent1"/>
-                </a:solidFill>
-                <a:latin typeface="Source Sans Pro" panose="020B0503030403020204" pitchFamily="34" charset="0"/>
-                <a:ea typeface="Source Sans Pro" panose="020B0503030403020204" pitchFamily="34" charset="0"/>
-              </a:rPr>
-              <a:t>E</a:t>
-            </a:r>
-            <a:r>
               <a:rPr lang="en-US" dirty="0">
                 <a:solidFill>
                   <a:schemeClr val="accent1"/>
@@ -6982,7 +6972,7 @@
                 <a:ea typeface="Source Sans Pro" panose="020B0503030403020204" pitchFamily="34" charset="0"/>
                 <a:sym typeface="Source Sans Pro"/>
               </a:rPr>
-              <a:t>xec scripts</a:t>
+              <a:t>exec scripts</a:t>
             </a:r>
             <a:r>
               <a:rPr lang="en-US" b="0" dirty="0">
@@ -7072,7 +7062,7 @@
           </a:ln>
           <a:extLst>
             <a:ext uri="{C572A759-6A51-4108-AA02-DFA0A04FC94B}">
-              <ma14:wrappingTextBoxFlag xmlns="" xmlns:ma14="http://schemas.microsoft.com/office/mac/drawingml/2011/main" xmlns:a14="http://schemas.microsoft.com/office/drawing/2010/main" xmlns:m="http://schemas.openxmlformats.org/officeDocument/2006/math" val="1"/>
+              <ma14:wrappingTextBoxFlag xmlns:m="http://schemas.openxmlformats.org/officeDocument/2006/math" xmlns:a14="http://schemas.microsoft.com/office/drawing/2010/main" xmlns:ma14="http://schemas.microsoft.com/office/mac/drawingml/2011/main" xmlns="" val="1"/>
             </a:ext>
           </a:extLst>
         </p:spPr>
@@ -7128,7 +7118,7 @@
           </a:ln>
           <a:extLst>
             <a:ext uri="{C572A759-6A51-4108-AA02-DFA0A04FC94B}">
-              <ma14:wrappingTextBoxFlag xmlns:ma14="http://schemas.microsoft.com/office/mac/drawingml/2011/main" xmlns:a14="http://schemas.microsoft.com/office/drawing/2010/main" xmlns:m="http://schemas.openxmlformats.org/officeDocument/2006/math" xmlns="" val="1"/>
+              <ma14:wrappingTextBoxFlag xmlns="" xmlns:m="http://schemas.openxmlformats.org/officeDocument/2006/math" xmlns:a14="http://schemas.microsoft.com/office/drawing/2010/main" xmlns:ma14="http://schemas.microsoft.com/office/mac/drawingml/2011/main" val="1"/>
             </a:ext>
           </a:extLst>
         </p:spPr>
@@ -7172,7 +7162,7 @@
         </p:nvSpPr>
         <p:spPr>
           <a:xfrm>
-            <a:off x="9570182" y="5858317"/>
+            <a:off x="9530976" y="5858317"/>
             <a:ext cx="3968070" cy="481077"/>
           </a:xfrm>
           <a:prstGeom prst="rect">
@@ -7243,19 +7233,9 @@
                 </a:solidFill>
                 <a:latin typeface="Source Sans Pro" panose="020B0503030403020204" pitchFamily="34" charset="0"/>
                 <a:ea typeface="Source Sans Pro" panose="020B0503030403020204" pitchFamily="34" charset="0"/>
-              </a:rPr>
-              <a:t>E</a:t>
-            </a:r>
-            <a:r>
-              <a:rPr lang="en-US" dirty="0">
-                <a:solidFill>
-                  <a:schemeClr val="accent1"/>
-                </a:solidFill>
-                <a:latin typeface="Source Sans Pro" panose="020B0503030403020204" pitchFamily="34" charset="0"/>
-                <a:ea typeface="Source Sans Pro" panose="020B0503030403020204" pitchFamily="34" charset="0"/>
                 <a:sym typeface="Source Sans Pro"/>
               </a:rPr>
-              <a:t>xec scripts</a:t>
+              <a:t>exec scripts</a:t>
             </a:r>
             <a:r>
               <a:rPr lang="en-US" dirty="0">
@@ -8710,7 +8690,7 @@
                 <a:latin typeface="Source Sans Pro" panose="020B0503030403020204" pitchFamily="34" charset="0"/>
                 <a:ea typeface="Source Sans Pro" panose="020B0503030403020204" pitchFamily="34" charset="0"/>
               </a:rPr>
-              <a:t>E</a:t>
+              <a:t>e</a:t>
             </a:r>
             <a:r>
               <a:rPr lang="en-US" b="0" dirty="0">
@@ -8751,7 +8731,7 @@
         </p:nvSpPr>
         <p:spPr>
           <a:xfrm>
-            <a:off x="9573838" y="1969106"/>
+            <a:off x="9560056" y="1969106"/>
             <a:ext cx="4001400" cy="647236"/>
           </a:xfrm>
           <a:prstGeom prst="rect">
@@ -9760,7 +9740,7 @@
         </p:nvSpPr>
         <p:spPr>
           <a:xfrm>
-            <a:off x="11730381" y="3876718"/>
+            <a:off x="11730381" y="3865681"/>
             <a:ext cx="527267" cy="258964"/>
           </a:xfrm>
           <a:prstGeom prst="rect">
@@ -10342,7 +10322,17 @@
                 <a:latin typeface="Source Sans Pro" panose="020B0503030403020204" pitchFamily="34" charset="0"/>
                 <a:ea typeface="Source Sans Pro" panose="020B0503030403020204" pitchFamily="34" charset="0"/>
               </a:rPr>
-              <a:t>Executable files </a:t>
+              <a:t>Exec </a:t>
+            </a:r>
+            <a:r>
+              <a:rPr lang="en-US" b="0" dirty="0">
+                <a:solidFill>
+                  <a:schemeClr val="accent1"/>
+                </a:solidFill>
+                <a:latin typeface="Source Sans Pro" panose="020B0503030403020204" pitchFamily="34" charset="0"/>
+                <a:ea typeface="Source Sans Pro" panose="020B0503030403020204" pitchFamily="34" charset="0"/>
+              </a:rPr>
+              <a:t>scripts </a:t>
             </a:r>
             <a:r>
               <a:rPr lang="en-US" b="0" i="0" u="none" strike="noStrike" dirty="0">
@@ -12225,7 +12215,7 @@
         </p:nvSpPr>
         <p:spPr>
           <a:xfrm>
-            <a:off x="8858831" y="7104358"/>
+            <a:off x="8856131" y="7104358"/>
             <a:ext cx="1075025" cy="258964"/>
           </a:xfrm>
           <a:prstGeom prst="rect">
@@ -12732,7 +12722,7 @@
         </p:nvSpPr>
         <p:spPr>
           <a:xfrm>
-            <a:off x="11252289" y="7416111"/>
+            <a:off x="11252289" y="7409023"/>
             <a:ext cx="781573" cy="258964"/>
           </a:xfrm>
           <a:prstGeom prst="rect">
@@ -12919,7 +12909,7 @@
         </p:nvSpPr>
         <p:spPr>
           <a:xfrm>
-            <a:off x="10633950" y="7418167"/>
+            <a:off x="10633950" y="7409023"/>
             <a:ext cx="745139" cy="258964"/>
           </a:xfrm>
           <a:prstGeom prst="rect">
@@ -13956,7 +13946,7 @@
         </p:nvSpPr>
         <p:spPr>
           <a:xfrm>
-            <a:off x="11256348" y="8470944"/>
+            <a:off x="11256348" y="8463856"/>
             <a:ext cx="781573" cy="258964"/>
           </a:xfrm>
           <a:prstGeom prst="rect">
@@ -14143,7 +14133,7 @@
         </p:nvSpPr>
         <p:spPr>
           <a:xfrm>
-            <a:off x="10638009" y="8473000"/>
+            <a:off x="10638009" y="8463856"/>
             <a:ext cx="745139" cy="258964"/>
           </a:xfrm>
           <a:prstGeom prst="rect">

</xml_diff>

<commit_message>
i #10 Fixed Year in Project Analysis Cheatsheet
- The year was set to 2025, when it should've been set to our current year.
</commit_message>
<xml_diff>
--- a/cheatsheets/project-analysis-cheatsheet.pptx
+++ b/cheatsheets/project-analysis-cheatsheet.pptx
@@ -2201,7 +2201,7 @@
           </a:ln>
           <a:extLst>
             <a:ext uri="{C572A759-6A51-4108-AA02-DFA0A04FC94B}">
-              <ma14:wrappingTextBoxFlag xmlns:ma14="http://schemas.microsoft.com/office/mac/drawingml/2011/main" xmlns:a14="http://schemas.microsoft.com/office/drawing/2010/main" xmlns:m="http://schemas.openxmlformats.org/officeDocument/2006/math" xmlns="" val="1"/>
+              <ma14:wrappingTextBoxFlag xmlns="" xmlns:m="http://schemas.openxmlformats.org/officeDocument/2006/math" xmlns:a14="http://schemas.microsoft.com/office/drawing/2010/main" xmlns:ma14="http://schemas.microsoft.com/office/mac/drawingml/2011/main" val="1"/>
             </a:ext>
           </a:extLst>
         </p:spPr>
@@ -2240,7 +2240,7 @@
           </a:ln>
           <a:extLst>
             <a:ext uri="{C572A759-6A51-4108-AA02-DFA0A04FC94B}">
-              <ma14:wrappingTextBoxFlag xmlns:ma14="http://schemas.microsoft.com/office/mac/drawingml/2011/main" xmlns:a14="http://schemas.microsoft.com/office/drawing/2010/main" xmlns:m="http://schemas.openxmlformats.org/officeDocument/2006/math" xmlns="" val="1"/>
+              <ma14:wrappingTextBoxFlag xmlns="" xmlns:m="http://schemas.openxmlformats.org/officeDocument/2006/math" xmlns:a14="http://schemas.microsoft.com/office/drawing/2010/main" xmlns:ma14="http://schemas.microsoft.com/office/mac/drawingml/2011/main" val="1"/>
             </a:ext>
           </a:extLst>
         </p:spPr>
@@ -3252,7 +3252,7 @@
           </a:ln>
           <a:extLst>
             <a:ext uri="{C572A759-6A51-4108-AA02-DFA0A04FC94B}">
-              <ma14:wrappingTextBoxFlag xmlns:ma14="http://schemas.microsoft.com/office/mac/drawingml/2011/main" xmlns:a14="http://schemas.microsoft.com/office/drawing/2010/main" xmlns:m="http://schemas.openxmlformats.org/officeDocument/2006/math" xmlns="" val="1"/>
+              <ma14:wrappingTextBoxFlag xmlns="" xmlns:m="http://schemas.openxmlformats.org/officeDocument/2006/math" xmlns:a14="http://schemas.microsoft.com/office/drawing/2010/main" xmlns:ma14="http://schemas.microsoft.com/office/mac/drawingml/2011/main" val="1"/>
             </a:ext>
           </a:extLst>
         </p:spPr>
@@ -3304,7 +3304,7 @@
           </a:ln>
           <a:extLst>
             <a:ext uri="{C572A759-6A51-4108-AA02-DFA0A04FC94B}">
-              <ma14:wrappingTextBoxFlag xmlns:ma14="http://schemas.microsoft.com/office/mac/drawingml/2011/main" xmlns:a14="http://schemas.microsoft.com/office/drawing/2010/main" xmlns:m="http://schemas.openxmlformats.org/officeDocument/2006/math" xmlns="" val="1"/>
+              <ma14:wrappingTextBoxFlag xmlns="" xmlns:m="http://schemas.openxmlformats.org/officeDocument/2006/math" xmlns:a14="http://schemas.microsoft.com/office/drawing/2010/main" xmlns:ma14="http://schemas.microsoft.com/office/mac/drawingml/2011/main" val="1"/>
             </a:ext>
           </a:extLst>
         </p:spPr>
@@ -3402,7 +3402,7 @@
           </a:ln>
           <a:extLst>
             <a:ext uri="{C572A759-6A51-4108-AA02-DFA0A04FC94B}">
-              <ma14:wrappingTextBoxFlag xmlns:ma14="http://schemas.microsoft.com/office/mac/drawingml/2011/main" xmlns:a14="http://schemas.microsoft.com/office/drawing/2010/main" xmlns:m="http://schemas.openxmlformats.org/officeDocument/2006/math" xmlns="" val="1"/>
+              <ma14:wrappingTextBoxFlag xmlns="" xmlns:m="http://schemas.openxmlformats.org/officeDocument/2006/math" xmlns:a14="http://schemas.microsoft.com/office/drawing/2010/main" xmlns:ma14="http://schemas.microsoft.com/office/mac/drawingml/2011/main" val="1"/>
             </a:ext>
           </a:extLst>
         </p:spPr>
@@ -3513,7 +3513,7 @@
           </a:ln>
           <a:extLst>
             <a:ext uri="{C572A759-6A51-4108-AA02-DFA0A04FC94B}">
-              <ma14:wrappingTextBoxFlag xmlns:ma14="http://schemas.microsoft.com/office/mac/drawingml/2011/main" xmlns:a14="http://schemas.microsoft.com/office/drawing/2010/main" xmlns:m="http://schemas.openxmlformats.org/officeDocument/2006/math" xmlns="" val="1"/>
+              <ma14:wrappingTextBoxFlag xmlns="" xmlns:m="http://schemas.openxmlformats.org/officeDocument/2006/math" xmlns:a14="http://schemas.microsoft.com/office/drawing/2010/main" xmlns:ma14="http://schemas.microsoft.com/office/mac/drawingml/2011/main" val="1"/>
             </a:ext>
           </a:extLst>
         </p:spPr>
@@ -3562,7 +3562,7 @@
           </a:ln>
           <a:extLst>
             <a:ext uri="{C572A759-6A51-4108-AA02-DFA0A04FC94B}">
-              <ma14:wrappingTextBoxFlag xmlns:ma14="http://schemas.microsoft.com/office/mac/drawingml/2011/main" xmlns:a14="http://schemas.microsoft.com/office/drawing/2010/main" xmlns:m="http://schemas.openxmlformats.org/officeDocument/2006/math" xmlns="" val="1"/>
+              <ma14:wrappingTextBoxFlag xmlns="" xmlns:m="http://schemas.openxmlformats.org/officeDocument/2006/math" xmlns:a14="http://schemas.microsoft.com/office/drawing/2010/main" xmlns:ma14="http://schemas.microsoft.com/office/mac/drawingml/2011/main" val="1"/>
             </a:ext>
           </a:extLst>
         </p:spPr>
@@ -3797,7 +3797,32 @@
                 <a:cs typeface="Source Sans Pro"/>
                 <a:sym typeface="Source Sans Pro"/>
               </a:rPr>
-              <a:t>ulu package version 0.0.0.9700 (in development) •  Updated: 2025-</a:t>
+              <a:t>ulu package version 0.0.0.9700 (in development) •  Updated: 202</a:t>
+            </a:r>
+            <a:r>
+              <a:rPr lang="en-US" sz="1000" b="0" dirty="0">
+                <a:solidFill>
+                  <a:schemeClr val="tx1"/>
+                </a:solidFill>
+              </a:rPr>
+              <a:t>4</a:t>
+            </a:r>
+            <a:r>
+              <a:rPr kumimoji="0" lang="en-US" sz="1000" b="0" i="0" u="none" strike="noStrike" cap="none" spc="0" normalizeH="0" baseline="0" dirty="0">
+                <a:ln>
+                  <a:noFill/>
+                </a:ln>
+                <a:solidFill>
+                  <a:schemeClr val="tx1"/>
+                </a:solidFill>
+                <a:effectLst/>
+                <a:uFillTx/>
+                <a:latin typeface="Source Sans Pro"/>
+                <a:ea typeface="Source Sans Pro"/>
+                <a:cs typeface="Source Sans Pro"/>
+                <a:sym typeface="Source Sans Pro"/>
+              </a:rPr>
+              <a:t>-</a:t>
             </a:r>
             <a:r>
               <a:rPr lang="en-US" sz="1000" b="0" dirty="0">
@@ -3881,7 +3906,7 @@
           </a:ln>
           <a:extLst>
             <a:ext uri="{C572A759-6A51-4108-AA02-DFA0A04FC94B}">
-              <ma14:wrappingTextBoxFlag xmlns:ma14="http://schemas.microsoft.com/office/mac/drawingml/2011/main" xmlns:a14="http://schemas.microsoft.com/office/drawing/2010/main" xmlns:m="http://schemas.openxmlformats.org/officeDocument/2006/math" xmlns="" val="1"/>
+              <ma14:wrappingTextBoxFlag xmlns="" xmlns:m="http://schemas.openxmlformats.org/officeDocument/2006/math" xmlns:a14="http://schemas.microsoft.com/office/drawing/2010/main" xmlns:ma14="http://schemas.microsoft.com/office/mac/drawingml/2011/main" val="1"/>
             </a:ext>
           </a:extLst>
         </p:spPr>
@@ -4119,7 +4144,7 @@
           </a:ln>
           <a:extLst>
             <a:ext uri="{C572A759-6A51-4108-AA02-DFA0A04FC94B}">
-              <ma14:wrappingTextBoxFlag xmlns:ma14="http://schemas.microsoft.com/office/mac/drawingml/2011/main" xmlns:a14="http://schemas.microsoft.com/office/drawing/2010/main" xmlns:m="http://schemas.openxmlformats.org/officeDocument/2006/math" xmlns="" val="1"/>
+              <ma14:wrappingTextBoxFlag xmlns="" xmlns:m="http://schemas.openxmlformats.org/officeDocument/2006/math" xmlns:a14="http://schemas.microsoft.com/office/drawing/2010/main" xmlns:ma14="http://schemas.microsoft.com/office/mac/drawingml/2011/main" val="1"/>
             </a:ext>
           </a:extLst>
         </p:spPr>
@@ -6138,7 +6163,7 @@
           </a:ln>
           <a:extLst>
             <a:ext uri="{C572A759-6A51-4108-AA02-DFA0A04FC94B}">
-              <ma14:wrappingTextBoxFlag xmlns:ma14="http://schemas.microsoft.com/office/mac/drawingml/2011/main" xmlns:a14="http://schemas.microsoft.com/office/drawing/2010/main" xmlns:m="http://schemas.openxmlformats.org/officeDocument/2006/math" xmlns="" val="1"/>
+              <ma14:wrappingTextBoxFlag xmlns="" xmlns:m="http://schemas.openxmlformats.org/officeDocument/2006/math" xmlns:a14="http://schemas.microsoft.com/office/drawing/2010/main" xmlns:ma14="http://schemas.microsoft.com/office/mac/drawingml/2011/main" val="1"/>
             </a:ext>
           </a:extLst>
         </p:spPr>
@@ -6495,7 +6520,7 @@
           </a:ln>
           <a:extLst>
             <a:ext uri="{C572A759-6A51-4108-AA02-DFA0A04FC94B}">
-              <ma14:wrappingTextBoxFlag xmlns:ma14="http://schemas.microsoft.com/office/mac/drawingml/2011/main" xmlns:a14="http://schemas.microsoft.com/office/drawing/2010/main" xmlns:m="http://schemas.openxmlformats.org/officeDocument/2006/math" xmlns="" val="1"/>
+              <ma14:wrappingTextBoxFlag xmlns="" xmlns:m="http://schemas.openxmlformats.org/officeDocument/2006/math" xmlns:a14="http://schemas.microsoft.com/office/drawing/2010/main" xmlns:ma14="http://schemas.microsoft.com/office/mac/drawingml/2011/main" val="1"/>
             </a:ext>
           </a:extLst>
         </p:spPr>
@@ -6686,7 +6711,7 @@
           </a:ln>
           <a:extLst>
             <a:ext uri="{C572A759-6A51-4108-AA02-DFA0A04FC94B}">
-              <ma14:wrappingTextBoxFlag xmlns:ma14="http://schemas.microsoft.com/office/mac/drawingml/2011/main" xmlns:a14="http://schemas.microsoft.com/office/drawing/2010/main" xmlns:m="http://schemas.openxmlformats.org/officeDocument/2006/math" xmlns="" val="1"/>
+              <ma14:wrappingTextBoxFlag xmlns="" xmlns:m="http://schemas.openxmlformats.org/officeDocument/2006/math" xmlns:a14="http://schemas.microsoft.com/office/drawing/2010/main" xmlns:ma14="http://schemas.microsoft.com/office/mac/drawingml/2011/main" val="1"/>
             </a:ext>
           </a:extLst>
         </p:spPr>
@@ -6859,7 +6884,7 @@
           </a:ln>
           <a:extLst>
             <a:ext uri="{C572A759-6A51-4108-AA02-DFA0A04FC94B}">
-              <ma14:wrappingTextBoxFlag xmlns:ma14="http://schemas.microsoft.com/office/mac/drawingml/2011/main" xmlns:a14="http://schemas.microsoft.com/office/drawing/2010/main" xmlns:m="http://schemas.openxmlformats.org/officeDocument/2006/math" xmlns="" val="1"/>
+              <ma14:wrappingTextBoxFlag xmlns="" xmlns:m="http://schemas.openxmlformats.org/officeDocument/2006/math" xmlns:a14="http://schemas.microsoft.com/office/drawing/2010/main" xmlns:ma14="http://schemas.microsoft.com/office/mac/drawingml/2011/main" val="1"/>
             </a:ext>
           </a:extLst>
         </p:spPr>
@@ -7062,7 +7087,7 @@
           </a:ln>
           <a:extLst>
             <a:ext uri="{C572A759-6A51-4108-AA02-DFA0A04FC94B}">
-              <ma14:wrappingTextBoxFlag xmlns:m="http://schemas.openxmlformats.org/officeDocument/2006/math" xmlns:a14="http://schemas.microsoft.com/office/drawing/2010/main" xmlns:ma14="http://schemas.microsoft.com/office/mac/drawingml/2011/main" xmlns="" val="1"/>
+              <ma14:wrappingTextBoxFlag xmlns="" xmlns:ma14="http://schemas.microsoft.com/office/mac/drawingml/2011/main" xmlns:a14="http://schemas.microsoft.com/office/drawing/2010/main" xmlns:m="http://schemas.openxmlformats.org/officeDocument/2006/math" val="1"/>
             </a:ext>
           </a:extLst>
         </p:spPr>
@@ -7118,7 +7143,7 @@
           </a:ln>
           <a:extLst>
             <a:ext uri="{C572A759-6A51-4108-AA02-DFA0A04FC94B}">
-              <ma14:wrappingTextBoxFlag xmlns="" xmlns:m="http://schemas.openxmlformats.org/officeDocument/2006/math" xmlns:a14="http://schemas.microsoft.com/office/drawing/2010/main" xmlns:ma14="http://schemas.microsoft.com/office/mac/drawingml/2011/main" val="1"/>
+              <ma14:wrappingTextBoxFlag xmlns:ma14="http://schemas.microsoft.com/office/mac/drawingml/2011/main" xmlns:a14="http://schemas.microsoft.com/office/drawing/2010/main" xmlns:m="http://schemas.openxmlformats.org/officeDocument/2006/math" xmlns="" val="1"/>
             </a:ext>
           </a:extLst>
         </p:spPr>

</xml_diff>